<commit_message>
Child access links slide updated.  Code slide will probably be updated again later when versioning change is accounted for.
</commit_message>
<xml_diff>
--- a/branches/CEN3031-per7/app-engine-site-creator/presIIIdev.pptx
+++ b/branches/CEN3031-per7/app-engine-site-creator/presIIIdev.pptx
@@ -1,6 +1,6 @@
 
 <file path=ppt/presentation.xml><?xml version="1.0" encoding="utf-8"?>
-<p:presentation xmlns:a="http://schemas.openxmlformats.org/drawingml/2006/main" xmlns:r="http://schemas.openxmlformats.org/officeDocument/2006/relationships" xmlns:mc="http://schemas.openxmlformats.org/markup-compatibility/2006" xmlns:mv="urn:schemas-microsoft-com:mac:vml" xmlns:p="http://schemas.openxmlformats.org/presentationml/2006/main" mc:Ignorable="mv" mc:PreserveAttributes="mv:*" saveSubsetFonts="1" autoCompressPictures="0">
+<p:presentation xmlns:a="http://schemas.openxmlformats.org/drawingml/2006/main" xmlns:r="http://schemas.openxmlformats.org/officeDocument/2006/relationships" xmlns:p="http://schemas.openxmlformats.org/presentationml/2006/main" saveSubsetFonts="1" autoCompressPictures="0">
   <p:sldMasterIdLst>
     <p:sldMasterId id="2147483648" r:id="rId1"/>
   </p:sldMasterIdLst>
@@ -10,6 +10,9 @@
     <p:sldId id="258" r:id="rId4"/>
     <p:sldId id="259" r:id="rId5"/>
     <p:sldId id="260" r:id="rId6"/>
+    <p:sldId id="261" r:id="rId7"/>
+    <p:sldId id="262" r:id="rId8"/>
+    <p:sldId id="263" r:id="rId9"/>
   </p:sldIdLst>
   <p:sldSz cx="9144000" cy="6858000" type="screen4x3"/>
   <p:notesSz cx="6858000" cy="9144000"/>
@@ -112,7 +115,7 @@
 </file>
 
 <file path=ppt/slideLayouts/slideLayout1.xml><?xml version="1.0" encoding="utf-8"?>
-<p:sldLayout xmlns:a="http://schemas.openxmlformats.org/drawingml/2006/main" xmlns:r="http://schemas.openxmlformats.org/officeDocument/2006/relationships" xmlns:mc="http://schemas.openxmlformats.org/markup-compatibility/2006" xmlns:mv="urn:schemas-microsoft-com:mac:vml" xmlns:p="http://schemas.openxmlformats.org/presentationml/2006/main" mc:Ignorable="mv" mc:PreserveAttributes="mv:*" type="title" preserve="1">
+<p:sldLayout xmlns:a="http://schemas.openxmlformats.org/drawingml/2006/main" xmlns:r="http://schemas.openxmlformats.org/officeDocument/2006/relationships" xmlns:p="http://schemas.openxmlformats.org/presentationml/2006/main" type="title" preserve="1">
   <p:cSld name="Title Slide">
     <p:spTree>
       <p:nvGrpSpPr>
@@ -292,7 +295,8 @@
           <a:p>
             <a:fld id="{4804E31C-644C-C14D-AB1A-4B4F1EA69BCD}" type="datetimeFigureOut">
               <a:rPr lang="en-US" smtClean="0"/>
-              <a:t>11/22/09</a:t>
+              <a:pPr/>
+              <a:t>11/25/2009</a:t>
             </a:fld>
             <a:endParaRPr lang="en-US"/>
           </a:p>
@@ -334,6 +338,7 @@
           <a:p>
             <a:fld id="{C41FC688-A7A0-EC4D-912E-391576B3DEE3}" type="slidenum">
               <a:rPr lang="en-US" smtClean="0"/>
+              <a:pPr/>
               <a:t>‹#›</a:t>
             </a:fld>
             <a:endParaRPr lang="en-US"/>
@@ -349,7 +354,7 @@
 </file>
 
 <file path=ppt/slideLayouts/slideLayout10.xml><?xml version="1.0" encoding="utf-8"?>
-<p:sldLayout xmlns:a="http://schemas.openxmlformats.org/drawingml/2006/main" xmlns:r="http://schemas.openxmlformats.org/officeDocument/2006/relationships" xmlns:mc="http://schemas.openxmlformats.org/markup-compatibility/2006" xmlns:mv="urn:schemas-microsoft-com:mac:vml" xmlns:p="http://schemas.openxmlformats.org/presentationml/2006/main" mc:Ignorable="mv" mc:PreserveAttributes="mv:*" type="vertTx" preserve="1">
+<p:sldLayout xmlns:a="http://schemas.openxmlformats.org/drawingml/2006/main" xmlns:r="http://schemas.openxmlformats.org/officeDocument/2006/relationships" xmlns:p="http://schemas.openxmlformats.org/presentationml/2006/main" type="vertTx" preserve="1">
   <p:cSld name="Title and Vertical Text">
     <p:spTree>
       <p:nvGrpSpPr>
@@ -457,7 +462,8 @@
           <a:p>
             <a:fld id="{4804E31C-644C-C14D-AB1A-4B4F1EA69BCD}" type="datetimeFigureOut">
               <a:rPr lang="en-US" smtClean="0"/>
-              <a:t>11/22/09</a:t>
+              <a:pPr/>
+              <a:t>11/25/2009</a:t>
             </a:fld>
             <a:endParaRPr lang="en-US"/>
           </a:p>
@@ -499,6 +505,7 @@
           <a:p>
             <a:fld id="{C41FC688-A7A0-EC4D-912E-391576B3DEE3}" type="slidenum">
               <a:rPr lang="en-US" smtClean="0"/>
+              <a:pPr/>
               <a:t>‹#›</a:t>
             </a:fld>
             <a:endParaRPr lang="en-US"/>
@@ -514,7 +521,7 @@
 </file>
 
 <file path=ppt/slideLayouts/slideLayout11.xml><?xml version="1.0" encoding="utf-8"?>
-<p:sldLayout xmlns:a="http://schemas.openxmlformats.org/drawingml/2006/main" xmlns:r="http://schemas.openxmlformats.org/officeDocument/2006/relationships" xmlns:mc="http://schemas.openxmlformats.org/markup-compatibility/2006" xmlns:mv="urn:schemas-microsoft-com:mac:vml" xmlns:p="http://schemas.openxmlformats.org/presentationml/2006/main" mc:Ignorable="mv" mc:PreserveAttributes="mv:*" type="vertTitleAndTx" preserve="1">
+<p:sldLayout xmlns:a="http://schemas.openxmlformats.org/drawingml/2006/main" xmlns:r="http://schemas.openxmlformats.org/officeDocument/2006/relationships" xmlns:p="http://schemas.openxmlformats.org/presentationml/2006/main" type="vertTitleAndTx" preserve="1">
   <p:cSld name="Vertical Title and Text">
     <p:spTree>
       <p:nvGrpSpPr>
@@ -632,7 +639,8 @@
           <a:p>
             <a:fld id="{4804E31C-644C-C14D-AB1A-4B4F1EA69BCD}" type="datetimeFigureOut">
               <a:rPr lang="en-US" smtClean="0"/>
-              <a:t>11/22/09</a:t>
+              <a:pPr/>
+              <a:t>11/25/2009</a:t>
             </a:fld>
             <a:endParaRPr lang="en-US"/>
           </a:p>
@@ -674,6 +682,7 @@
           <a:p>
             <a:fld id="{C41FC688-A7A0-EC4D-912E-391576B3DEE3}" type="slidenum">
               <a:rPr lang="en-US" smtClean="0"/>
+              <a:pPr/>
               <a:t>‹#›</a:t>
             </a:fld>
             <a:endParaRPr lang="en-US"/>
@@ -689,7 +698,7 @@
 </file>
 
 <file path=ppt/slideLayouts/slideLayout2.xml><?xml version="1.0" encoding="utf-8"?>
-<p:sldLayout xmlns:a="http://schemas.openxmlformats.org/drawingml/2006/main" xmlns:r="http://schemas.openxmlformats.org/officeDocument/2006/relationships" xmlns:mc="http://schemas.openxmlformats.org/markup-compatibility/2006" xmlns:mv="urn:schemas-microsoft-com:mac:vml" xmlns:p="http://schemas.openxmlformats.org/presentationml/2006/main" mc:Ignorable="mv" mc:PreserveAttributes="mv:*" type="obj" preserve="1">
+<p:sldLayout xmlns:a="http://schemas.openxmlformats.org/drawingml/2006/main" xmlns:r="http://schemas.openxmlformats.org/officeDocument/2006/relationships" xmlns:p="http://schemas.openxmlformats.org/presentationml/2006/main" type="obj" preserve="1">
   <p:cSld name="Title and Content">
     <p:spTree>
       <p:nvGrpSpPr>
@@ -797,7 +806,8 @@
           <a:p>
             <a:fld id="{4804E31C-644C-C14D-AB1A-4B4F1EA69BCD}" type="datetimeFigureOut">
               <a:rPr lang="en-US" smtClean="0"/>
-              <a:t>11/22/09</a:t>
+              <a:pPr/>
+              <a:t>11/25/2009</a:t>
             </a:fld>
             <a:endParaRPr lang="en-US"/>
           </a:p>
@@ -839,6 +849,7 @@
           <a:p>
             <a:fld id="{C41FC688-A7A0-EC4D-912E-391576B3DEE3}" type="slidenum">
               <a:rPr lang="en-US" smtClean="0"/>
+              <a:pPr/>
               <a:t>‹#›</a:t>
             </a:fld>
             <a:endParaRPr lang="en-US"/>
@@ -854,7 +865,7 @@
 </file>
 
 <file path=ppt/slideLayouts/slideLayout3.xml><?xml version="1.0" encoding="utf-8"?>
-<p:sldLayout xmlns:a="http://schemas.openxmlformats.org/drawingml/2006/main" xmlns:r="http://schemas.openxmlformats.org/officeDocument/2006/relationships" xmlns:mc="http://schemas.openxmlformats.org/markup-compatibility/2006" xmlns:mv="urn:schemas-microsoft-com:mac:vml" xmlns:p="http://schemas.openxmlformats.org/presentationml/2006/main" mc:Ignorable="mv" mc:PreserveAttributes="mv:*" type="secHead" preserve="1">
+<p:sldLayout xmlns:a="http://schemas.openxmlformats.org/drawingml/2006/main" xmlns:r="http://schemas.openxmlformats.org/officeDocument/2006/relationships" xmlns:p="http://schemas.openxmlformats.org/presentationml/2006/main" type="secHead" preserve="1">
   <p:cSld name="Section Header">
     <p:spTree>
       <p:nvGrpSpPr>
@@ -1038,7 +1049,8 @@
           <a:p>
             <a:fld id="{4804E31C-644C-C14D-AB1A-4B4F1EA69BCD}" type="datetimeFigureOut">
               <a:rPr lang="en-US" smtClean="0"/>
-              <a:t>11/22/09</a:t>
+              <a:pPr/>
+              <a:t>11/25/2009</a:t>
             </a:fld>
             <a:endParaRPr lang="en-US"/>
           </a:p>
@@ -1080,6 +1092,7 @@
           <a:p>
             <a:fld id="{C41FC688-A7A0-EC4D-912E-391576B3DEE3}" type="slidenum">
               <a:rPr lang="en-US" smtClean="0"/>
+              <a:pPr/>
               <a:t>‹#›</a:t>
             </a:fld>
             <a:endParaRPr lang="en-US"/>
@@ -1095,7 +1108,7 @@
 </file>
 
 <file path=ppt/slideLayouts/slideLayout4.xml><?xml version="1.0" encoding="utf-8"?>
-<p:sldLayout xmlns:a="http://schemas.openxmlformats.org/drawingml/2006/main" xmlns:r="http://schemas.openxmlformats.org/officeDocument/2006/relationships" xmlns:mc="http://schemas.openxmlformats.org/markup-compatibility/2006" xmlns:mv="urn:schemas-microsoft-com:mac:vml" xmlns:p="http://schemas.openxmlformats.org/presentationml/2006/main" mc:Ignorable="mv" mc:PreserveAttributes="mv:*" type="twoObj" preserve="1">
+<p:sldLayout xmlns:a="http://schemas.openxmlformats.org/drawingml/2006/main" xmlns:r="http://schemas.openxmlformats.org/officeDocument/2006/relationships" xmlns:p="http://schemas.openxmlformats.org/presentationml/2006/main" type="twoObj" preserve="1">
   <p:cSld name="Two Content">
     <p:spTree>
       <p:nvGrpSpPr>
@@ -1321,7 +1334,8 @@
           <a:p>
             <a:fld id="{4804E31C-644C-C14D-AB1A-4B4F1EA69BCD}" type="datetimeFigureOut">
               <a:rPr lang="en-US" smtClean="0"/>
-              <a:t>11/22/09</a:t>
+              <a:pPr/>
+              <a:t>11/25/2009</a:t>
             </a:fld>
             <a:endParaRPr lang="en-US"/>
           </a:p>
@@ -1363,6 +1377,7 @@
           <a:p>
             <a:fld id="{C41FC688-A7A0-EC4D-912E-391576B3DEE3}" type="slidenum">
               <a:rPr lang="en-US" smtClean="0"/>
+              <a:pPr/>
               <a:t>‹#›</a:t>
             </a:fld>
             <a:endParaRPr lang="en-US"/>
@@ -1378,7 +1393,7 @@
 </file>
 
 <file path=ppt/slideLayouts/slideLayout5.xml><?xml version="1.0" encoding="utf-8"?>
-<p:sldLayout xmlns:a="http://schemas.openxmlformats.org/drawingml/2006/main" xmlns:r="http://schemas.openxmlformats.org/officeDocument/2006/relationships" xmlns:mc="http://schemas.openxmlformats.org/markup-compatibility/2006" xmlns:mv="urn:schemas-microsoft-com:mac:vml" xmlns:p="http://schemas.openxmlformats.org/presentationml/2006/main" mc:Ignorable="mv" mc:PreserveAttributes="mv:*" type="twoTxTwoObj" preserve="1">
+<p:sldLayout xmlns:a="http://schemas.openxmlformats.org/drawingml/2006/main" xmlns:r="http://schemas.openxmlformats.org/officeDocument/2006/relationships" xmlns:p="http://schemas.openxmlformats.org/presentationml/2006/main" type="twoTxTwoObj" preserve="1">
   <p:cSld name="Comparison">
     <p:spTree>
       <p:nvGrpSpPr>
@@ -1738,7 +1753,8 @@
           <a:p>
             <a:fld id="{4804E31C-644C-C14D-AB1A-4B4F1EA69BCD}" type="datetimeFigureOut">
               <a:rPr lang="en-US" smtClean="0"/>
-              <a:t>11/22/09</a:t>
+              <a:pPr/>
+              <a:t>11/25/2009</a:t>
             </a:fld>
             <a:endParaRPr lang="en-US"/>
           </a:p>
@@ -1780,6 +1796,7 @@
           <a:p>
             <a:fld id="{C41FC688-A7A0-EC4D-912E-391576B3DEE3}" type="slidenum">
               <a:rPr lang="en-US" smtClean="0"/>
+              <a:pPr/>
               <a:t>‹#›</a:t>
             </a:fld>
             <a:endParaRPr lang="en-US"/>
@@ -1795,7 +1812,7 @@
 </file>
 
 <file path=ppt/slideLayouts/slideLayout6.xml><?xml version="1.0" encoding="utf-8"?>
-<p:sldLayout xmlns:a="http://schemas.openxmlformats.org/drawingml/2006/main" xmlns:r="http://schemas.openxmlformats.org/officeDocument/2006/relationships" xmlns:mc="http://schemas.openxmlformats.org/markup-compatibility/2006" xmlns:mv="urn:schemas-microsoft-com:mac:vml" xmlns:p="http://schemas.openxmlformats.org/presentationml/2006/main" mc:Ignorable="mv" mc:PreserveAttributes="mv:*" type="titleOnly" preserve="1">
+<p:sldLayout xmlns:a="http://schemas.openxmlformats.org/drawingml/2006/main" xmlns:r="http://schemas.openxmlformats.org/officeDocument/2006/relationships" xmlns:p="http://schemas.openxmlformats.org/presentationml/2006/main" type="titleOnly" preserve="1">
   <p:cSld name="Title Only">
     <p:spTree>
       <p:nvGrpSpPr>
@@ -1851,7 +1868,8 @@
           <a:p>
             <a:fld id="{4804E31C-644C-C14D-AB1A-4B4F1EA69BCD}" type="datetimeFigureOut">
               <a:rPr lang="en-US" smtClean="0"/>
-              <a:t>11/22/09</a:t>
+              <a:pPr/>
+              <a:t>11/25/2009</a:t>
             </a:fld>
             <a:endParaRPr lang="en-US"/>
           </a:p>
@@ -1893,6 +1911,7 @@
           <a:p>
             <a:fld id="{C41FC688-A7A0-EC4D-912E-391576B3DEE3}" type="slidenum">
               <a:rPr lang="en-US" smtClean="0"/>
+              <a:pPr/>
               <a:t>‹#›</a:t>
             </a:fld>
             <a:endParaRPr lang="en-US"/>
@@ -1908,7 +1927,7 @@
 </file>
 
 <file path=ppt/slideLayouts/slideLayout7.xml><?xml version="1.0" encoding="utf-8"?>
-<p:sldLayout xmlns:a="http://schemas.openxmlformats.org/drawingml/2006/main" xmlns:r="http://schemas.openxmlformats.org/officeDocument/2006/relationships" xmlns:mc="http://schemas.openxmlformats.org/markup-compatibility/2006" xmlns:mv="urn:schemas-microsoft-com:mac:vml" xmlns:p="http://schemas.openxmlformats.org/presentationml/2006/main" mc:Ignorable="mv" mc:PreserveAttributes="mv:*" type="blank" preserve="1">
+<p:sldLayout xmlns:a="http://schemas.openxmlformats.org/drawingml/2006/main" xmlns:r="http://schemas.openxmlformats.org/officeDocument/2006/relationships" xmlns:p="http://schemas.openxmlformats.org/presentationml/2006/main" type="blank" preserve="1">
   <p:cSld name="Blank">
     <p:spTree>
       <p:nvGrpSpPr>
@@ -1941,7 +1960,8 @@
           <a:p>
             <a:fld id="{4804E31C-644C-C14D-AB1A-4B4F1EA69BCD}" type="datetimeFigureOut">
               <a:rPr lang="en-US" smtClean="0"/>
-              <a:t>11/22/09</a:t>
+              <a:pPr/>
+              <a:t>11/25/2009</a:t>
             </a:fld>
             <a:endParaRPr lang="en-US"/>
           </a:p>
@@ -1983,6 +2003,7 @@
           <a:p>
             <a:fld id="{C41FC688-A7A0-EC4D-912E-391576B3DEE3}" type="slidenum">
               <a:rPr lang="en-US" smtClean="0"/>
+              <a:pPr/>
               <a:t>‹#›</a:t>
             </a:fld>
             <a:endParaRPr lang="en-US"/>
@@ -1998,7 +2019,7 @@
 </file>
 
 <file path=ppt/slideLayouts/slideLayout8.xml><?xml version="1.0" encoding="utf-8"?>
-<p:sldLayout xmlns:a="http://schemas.openxmlformats.org/drawingml/2006/main" xmlns:r="http://schemas.openxmlformats.org/officeDocument/2006/relationships" xmlns:mc="http://schemas.openxmlformats.org/markup-compatibility/2006" xmlns:mv="urn:schemas-microsoft-com:mac:vml" xmlns:p="http://schemas.openxmlformats.org/presentationml/2006/main" mc:Ignorable="mv" mc:PreserveAttributes="mv:*" type="objTx" preserve="1">
+<p:sldLayout xmlns:a="http://schemas.openxmlformats.org/drawingml/2006/main" xmlns:r="http://schemas.openxmlformats.org/officeDocument/2006/relationships" xmlns:p="http://schemas.openxmlformats.org/presentationml/2006/main" type="objTx" preserve="1">
   <p:cSld name="Content with Caption">
     <p:spTree>
       <p:nvGrpSpPr>
@@ -2213,7 +2234,8 @@
           <a:p>
             <a:fld id="{4804E31C-644C-C14D-AB1A-4B4F1EA69BCD}" type="datetimeFigureOut">
               <a:rPr lang="en-US" smtClean="0"/>
-              <a:t>11/22/09</a:t>
+              <a:pPr/>
+              <a:t>11/25/2009</a:t>
             </a:fld>
             <a:endParaRPr lang="en-US"/>
           </a:p>
@@ -2255,6 +2277,7 @@
           <a:p>
             <a:fld id="{C41FC688-A7A0-EC4D-912E-391576B3DEE3}" type="slidenum">
               <a:rPr lang="en-US" smtClean="0"/>
+              <a:pPr/>
               <a:t>‹#›</a:t>
             </a:fld>
             <a:endParaRPr lang="en-US"/>
@@ -2270,7 +2293,7 @@
 </file>
 
 <file path=ppt/slideLayouts/slideLayout9.xml><?xml version="1.0" encoding="utf-8"?>
-<p:sldLayout xmlns:a="http://schemas.openxmlformats.org/drawingml/2006/main" xmlns:r="http://schemas.openxmlformats.org/officeDocument/2006/relationships" xmlns:mc="http://schemas.openxmlformats.org/markup-compatibility/2006" xmlns:mv="urn:schemas-microsoft-com:mac:vml" xmlns:p="http://schemas.openxmlformats.org/presentationml/2006/main" mc:Ignorable="mv" mc:PreserveAttributes="mv:*" type="picTx" preserve="1">
+<p:sldLayout xmlns:a="http://schemas.openxmlformats.org/drawingml/2006/main" xmlns:r="http://schemas.openxmlformats.org/officeDocument/2006/relationships" xmlns:p="http://schemas.openxmlformats.org/presentationml/2006/main" type="picTx" preserve="1">
   <p:cSld name="Picture with Caption">
     <p:spTree>
       <p:nvGrpSpPr>
@@ -2461,7 +2484,8 @@
           <a:p>
             <a:fld id="{4804E31C-644C-C14D-AB1A-4B4F1EA69BCD}" type="datetimeFigureOut">
               <a:rPr lang="en-US" smtClean="0"/>
-              <a:t>11/22/09</a:t>
+              <a:pPr/>
+              <a:t>11/25/2009</a:t>
             </a:fld>
             <a:endParaRPr lang="en-US"/>
           </a:p>
@@ -2503,6 +2527,7 @@
           <a:p>
             <a:fld id="{C41FC688-A7A0-EC4D-912E-391576B3DEE3}" type="slidenum">
               <a:rPr lang="en-US" smtClean="0"/>
+              <a:pPr/>
               <a:t>‹#›</a:t>
             </a:fld>
             <a:endParaRPr lang="en-US"/>
@@ -2518,7 +2543,7 @@
 </file>
 
 <file path=ppt/slideMasters/slideMaster1.xml><?xml version="1.0" encoding="utf-8"?>
-<p:sldMaster xmlns:a="http://schemas.openxmlformats.org/drawingml/2006/main" xmlns:r="http://schemas.openxmlformats.org/officeDocument/2006/relationships" xmlns:mc="http://schemas.openxmlformats.org/markup-compatibility/2006" xmlns:mv="urn:schemas-microsoft-com:mac:vml" xmlns:p="http://schemas.openxmlformats.org/presentationml/2006/main" mc:Ignorable="mv" mc:PreserveAttributes="mv:*">
+<p:sldMaster xmlns:a="http://schemas.openxmlformats.org/drawingml/2006/main" xmlns:r="http://schemas.openxmlformats.org/officeDocument/2006/relationships" xmlns:p="http://schemas.openxmlformats.org/presentationml/2006/main">
   <p:cSld>
     <p:bg>
       <p:bgRef idx="1001">
@@ -2669,7 +2694,8 @@
           <a:p>
             <a:fld id="{4804E31C-644C-C14D-AB1A-4B4F1EA69BCD}" type="datetimeFigureOut">
               <a:rPr lang="en-US" smtClean="0"/>
-              <a:t>11/22/09</a:t>
+              <a:pPr/>
+              <a:t>11/25/2009</a:t>
             </a:fld>
             <a:endParaRPr lang="en-US"/>
           </a:p>
@@ -2747,6 +2773,7 @@
           <a:p>
             <a:fld id="{C41FC688-A7A0-EC4D-912E-391576B3DEE3}" type="slidenum">
               <a:rPr lang="en-US" smtClean="0"/>
+              <a:pPr/>
               <a:t>‹#›</a:t>
             </a:fld>
             <a:endParaRPr lang="en-US"/>
@@ -3023,7 +3050,7 @@
 </file>
 
 <file path=ppt/slides/slide1.xml><?xml version="1.0" encoding="utf-8"?>
-<p:sld xmlns:a="http://schemas.openxmlformats.org/drawingml/2006/main" xmlns:r="http://schemas.openxmlformats.org/officeDocument/2006/relationships" xmlns:mc="http://schemas.openxmlformats.org/markup-compatibility/2006" xmlns:mv="urn:schemas-microsoft-com:mac:vml" xmlns:p="http://schemas.openxmlformats.org/presentationml/2006/main" mc:Ignorable="mv" mc:PreserveAttributes="mv:*">
+<p:sld xmlns:a="http://schemas.openxmlformats.org/drawingml/2006/main" xmlns:r="http://schemas.openxmlformats.org/officeDocument/2006/relationships" xmlns:p="http://schemas.openxmlformats.org/presentationml/2006/main">
   <p:cSld>
     <p:spTree>
       <p:nvGrpSpPr>
@@ -3099,7 +3126,7 @@
 </file>
 
 <file path=ppt/slides/slide2.xml><?xml version="1.0" encoding="utf-8"?>
-<p:sld xmlns:a="http://schemas.openxmlformats.org/drawingml/2006/main" xmlns:r="http://schemas.openxmlformats.org/officeDocument/2006/relationships" xmlns:mc="http://schemas.openxmlformats.org/markup-compatibility/2006" xmlns:mv="urn:schemas-microsoft-com:mac:vml" xmlns:p="http://schemas.openxmlformats.org/presentationml/2006/main" mc:Ignorable="mv" mc:PreserveAttributes="mv:*">
+<p:sld xmlns:a="http://schemas.openxmlformats.org/drawingml/2006/main" xmlns:r="http://schemas.openxmlformats.org/officeDocument/2006/relationships" xmlns:p="http://schemas.openxmlformats.org/presentationml/2006/main">
   <p:cSld>
     <p:spTree>
       <p:nvGrpSpPr>
@@ -3172,11 +3199,18 @@
   <p:clrMapOvr>
     <a:masterClrMapping/>
   </p:clrMapOvr>
+  <p:timing>
+    <p:tnLst>
+      <p:par>
+        <p:cTn id="1" dur="indefinite" restart="never" nodeType="tmRoot"/>
+      </p:par>
+    </p:tnLst>
+  </p:timing>
 </p:sld>
 </file>
 
 <file path=ppt/slides/slide3.xml><?xml version="1.0" encoding="utf-8"?>
-<p:sld xmlns:a="http://schemas.openxmlformats.org/drawingml/2006/main" xmlns:r="http://schemas.openxmlformats.org/officeDocument/2006/relationships" xmlns:mc="http://schemas.openxmlformats.org/markup-compatibility/2006" xmlns:mv="urn:schemas-microsoft-com:mac:vml" xmlns:p="http://schemas.openxmlformats.org/presentationml/2006/main" mc:Ignorable="mv" mc:PreserveAttributes="mv:*">
+<p:sld xmlns:a="http://schemas.openxmlformats.org/drawingml/2006/main" xmlns:r="http://schemas.openxmlformats.org/officeDocument/2006/relationships" xmlns:p="http://schemas.openxmlformats.org/presentationml/2006/main">
   <p:cSld>
     <p:spTree>
       <p:nvGrpSpPr>
@@ -3242,11 +3276,18 @@
   <p:clrMapOvr>
     <a:masterClrMapping/>
   </p:clrMapOvr>
+  <p:timing>
+    <p:tnLst>
+      <p:par>
+        <p:cTn id="1" dur="indefinite" restart="never" nodeType="tmRoot"/>
+      </p:par>
+    </p:tnLst>
+  </p:timing>
 </p:sld>
 </file>
 
 <file path=ppt/slides/slide4.xml><?xml version="1.0" encoding="utf-8"?>
-<p:sld xmlns:a="http://schemas.openxmlformats.org/drawingml/2006/main" xmlns:r="http://schemas.openxmlformats.org/officeDocument/2006/relationships" xmlns:mc="http://schemas.openxmlformats.org/markup-compatibility/2006" xmlns:mv="urn:schemas-microsoft-com:mac:vml" xmlns:p="http://schemas.openxmlformats.org/presentationml/2006/main" mc:Ignorable="mv" mc:PreserveAttributes="mv:*">
+<p:sld xmlns:a="http://schemas.openxmlformats.org/drawingml/2006/main" xmlns:r="http://schemas.openxmlformats.org/officeDocument/2006/relationships" xmlns:p="http://schemas.openxmlformats.org/presentationml/2006/main">
   <p:cSld>
     <p:spTree>
       <p:nvGrpSpPr>
@@ -3323,7 +3364,7 @@
 </file>
 
 <file path=ppt/slides/slide5.xml><?xml version="1.0" encoding="utf-8"?>
-<p:sld xmlns:a="http://schemas.openxmlformats.org/drawingml/2006/main" xmlns:r="http://schemas.openxmlformats.org/officeDocument/2006/relationships" xmlns:mc="http://schemas.openxmlformats.org/markup-compatibility/2006" xmlns:mv="urn:schemas-microsoft-com:mac:vml" xmlns:p="http://schemas.openxmlformats.org/presentationml/2006/main" mc:Ignorable="mv" mc:PreserveAttributes="mv:*">
+<p:sld xmlns:a="http://schemas.openxmlformats.org/drawingml/2006/main" xmlns:r="http://schemas.openxmlformats.org/officeDocument/2006/relationships" xmlns:p="http://schemas.openxmlformats.org/presentationml/2006/main">
   <p:cSld>
     <p:spTree>
       <p:nvGrpSpPr>
@@ -3396,6 +3437,1138 @@
   <p:clrMapOvr>
     <a:masterClrMapping/>
   </p:clrMapOvr>
+</p:sld>
+</file>
+
+<file path=ppt/slides/slide6.xml><?xml version="1.0" encoding="utf-8"?>
+<p:sld xmlns:a="http://schemas.openxmlformats.org/drawingml/2006/main" xmlns:r="http://schemas.openxmlformats.org/officeDocument/2006/relationships" xmlns:p="http://schemas.openxmlformats.org/presentationml/2006/main">
+  <p:cSld>
+    <p:spTree>
+      <p:nvGrpSpPr>
+        <p:cNvPr id="1" name=""/>
+        <p:cNvGrpSpPr/>
+        <p:nvPr/>
+      </p:nvGrpSpPr>
+      <p:grpSpPr>
+        <a:xfrm>
+          <a:off x="0" y="0"/>
+          <a:ext cx="0" cy="0"/>
+          <a:chOff x="0" y="0"/>
+          <a:chExt cx="0" cy="0"/>
+        </a:xfrm>
+      </p:grpSpPr>
+      <p:sp>
+        <p:nvSpPr>
+          <p:cNvPr id="4" name="Title 1"/>
+          <p:cNvSpPr txBox="1">
+            <a:spLocks/>
+          </p:cNvSpPr>
+          <p:nvPr/>
+        </p:nvSpPr>
+        <p:spPr>
+          <a:xfrm>
+            <a:off x="609600" y="427038"/>
+            <a:ext cx="8229600" cy="1143000"/>
+          </a:xfrm>
+          <a:prstGeom prst="rect">
+            <a:avLst/>
+          </a:prstGeom>
+        </p:spPr>
+        <p:txBody>
+          <a:bodyPr vert="horz" lIns="91440" tIns="45720" rIns="91440" bIns="45720" rtlCol="0" anchor="ctr">
+            <a:normAutofit/>
+          </a:bodyPr>
+          <a:lstStyle/>
+          <a:p>
+            <a:pPr marL="0" marR="0" lvl="0" indent="0" algn="ctr" defTabSz="457200" rtl="0" eaLnBrk="1" fontAlgn="auto" latinLnBrk="0" hangingPunct="1">
+              <a:lnSpc>
+                <a:spcPct val="100000"/>
+              </a:lnSpc>
+              <a:spcBef>
+                <a:spcPct val="0"/>
+              </a:spcBef>
+              <a:spcAft>
+                <a:spcPts val="0"/>
+              </a:spcAft>
+              <a:buClrTx/>
+              <a:buSzTx/>
+              <a:buFontTx/>
+              <a:buNone/>
+              <a:tabLst/>
+              <a:defRPr/>
+            </a:pPr>
+            <a:r>
+              <a:rPr kumimoji="0" lang="en-US" sz="4400" b="0" i="0" u="none" strike="noStrike" kern="1200" cap="none" spc="0" normalizeH="0" baseline="0" noProof="0" smtClean="0">
+                <a:ln>
+                  <a:noFill/>
+                </a:ln>
+                <a:solidFill>
+                  <a:schemeClr val="tx1"/>
+                </a:solidFill>
+                <a:effectLst/>
+                <a:uLnTx/>
+                <a:uFillTx/>
+                <a:latin typeface="+mj-lt"/>
+                <a:ea typeface="+mj-ea"/>
+                <a:cs typeface="+mj-cs"/>
+              </a:rPr>
+              <a:t>Child access links</a:t>
+            </a:r>
+            <a:endParaRPr kumimoji="0" lang="en-US" sz="4400" b="0" i="0" u="none" strike="noStrike" kern="1200" cap="none" spc="0" normalizeH="0" baseline="0" noProof="0" dirty="0">
+              <a:ln>
+                <a:noFill/>
+              </a:ln>
+              <a:solidFill>
+                <a:schemeClr val="tx1"/>
+              </a:solidFill>
+              <a:effectLst/>
+              <a:uLnTx/>
+              <a:uFillTx/>
+              <a:latin typeface="+mj-lt"/>
+              <a:ea typeface="+mj-ea"/>
+              <a:cs typeface="+mj-cs"/>
+            </a:endParaRPr>
+          </a:p>
+        </p:txBody>
+      </p:sp>
+      <p:sp>
+        <p:nvSpPr>
+          <p:cNvPr id="5" name="Content Placeholder 2"/>
+          <p:cNvSpPr txBox="1">
+            <a:spLocks/>
+          </p:cNvSpPr>
+          <p:nvPr/>
+        </p:nvSpPr>
+        <p:spPr>
+          <a:xfrm>
+            <a:off x="609600" y="1752600"/>
+            <a:ext cx="8229600" cy="4525963"/>
+          </a:xfrm>
+          <a:prstGeom prst="rect">
+            <a:avLst/>
+          </a:prstGeom>
+        </p:spPr>
+        <p:txBody>
+          <a:bodyPr vert="horz" lIns="91440" tIns="45720" rIns="91440" bIns="45720" rtlCol="0">
+            <a:normAutofit/>
+          </a:bodyPr>
+          <a:lstStyle/>
+          <a:p>
+            <a:pPr marL="342900" marR="0" lvl="0" indent="-342900" algn="l" defTabSz="457200" rtl="0" eaLnBrk="1" fontAlgn="auto" latinLnBrk="0" hangingPunct="1">
+              <a:lnSpc>
+                <a:spcPct val="100000"/>
+              </a:lnSpc>
+              <a:spcBef>
+                <a:spcPct val="20000"/>
+              </a:spcBef>
+              <a:spcAft>
+                <a:spcPts val="0"/>
+              </a:spcAft>
+              <a:buClrTx/>
+              <a:buSzTx/>
+              <a:buFont typeface="Arial"/>
+              <a:buChar char="•"/>
+              <a:tabLst/>
+              <a:defRPr/>
+            </a:pPr>
+            <a:r>
+              <a:rPr kumimoji="0" lang="en-US" sz="3200" b="0" i="0" u="none" strike="noStrike" kern="1200" cap="none" spc="0" normalizeH="0" baseline="0" noProof="0" smtClean="0">
+                <a:ln>
+                  <a:noFill/>
+                </a:ln>
+                <a:solidFill>
+                  <a:schemeClr val="tx1"/>
+                </a:solidFill>
+                <a:effectLst/>
+                <a:uLnTx/>
+                <a:uFillTx/>
+                <a:latin typeface="+mn-lt"/>
+                <a:ea typeface="+mn-ea"/>
+                <a:cs typeface="+mn-cs"/>
+              </a:rPr>
+              <a:t>In the previous AESC system no access to child pages was automatically given</a:t>
+            </a:r>
+          </a:p>
+          <a:p>
+            <a:pPr marL="342900" marR="0" lvl="0" indent="-342900" algn="l" defTabSz="457200" rtl="0" eaLnBrk="1" fontAlgn="auto" latinLnBrk="0" hangingPunct="1">
+              <a:lnSpc>
+                <a:spcPct val="100000"/>
+              </a:lnSpc>
+              <a:spcBef>
+                <a:spcPct val="20000"/>
+              </a:spcBef>
+              <a:spcAft>
+                <a:spcPts val="0"/>
+              </a:spcAft>
+              <a:buClrTx/>
+              <a:buSzTx/>
+              <a:buFont typeface="Arial"/>
+              <a:buChar char="•"/>
+              <a:tabLst/>
+              <a:defRPr/>
+            </a:pPr>
+            <a:r>
+              <a:rPr kumimoji="0" lang="en-US" sz="3200" b="0" i="0" u="none" strike="noStrike" kern="1200" cap="none" spc="0" normalizeH="0" baseline="0" noProof="0" smtClean="0">
+                <a:ln>
+                  <a:noFill/>
+                </a:ln>
+                <a:solidFill>
+                  <a:schemeClr val="tx1"/>
+                </a:solidFill>
+                <a:effectLst/>
+                <a:uLnTx/>
+                <a:uFillTx/>
+                <a:latin typeface="+mn-lt"/>
+                <a:ea typeface="+mn-ea"/>
+                <a:cs typeface="+mn-cs"/>
+              </a:rPr>
+              <a:t>The class Page has a property called page_children</a:t>
+            </a:r>
+          </a:p>
+          <a:p>
+            <a:pPr marL="342900" marR="0" lvl="0" indent="-342900" algn="l" defTabSz="457200" rtl="0" eaLnBrk="1" fontAlgn="auto" latinLnBrk="0" hangingPunct="1">
+              <a:lnSpc>
+                <a:spcPct val="100000"/>
+              </a:lnSpc>
+              <a:spcBef>
+                <a:spcPct val="20000"/>
+              </a:spcBef>
+              <a:spcAft>
+                <a:spcPts val="0"/>
+              </a:spcAft>
+              <a:buClrTx/>
+              <a:buSzTx/>
+              <a:buFont typeface="Arial"/>
+              <a:buChar char="•"/>
+              <a:tabLst/>
+              <a:defRPr/>
+            </a:pPr>
+            <a:r>
+              <a:rPr kumimoji="0" lang="en-US" sz="3200" b="0" i="0" u="none" strike="noStrike" kern="1200" cap="none" spc="0" normalizeH="0" baseline="0" noProof="0" smtClean="0">
+                <a:ln>
+                  <a:noFill/>
+                </a:ln>
+                <a:solidFill>
+                  <a:schemeClr val="tx1"/>
+                </a:solidFill>
+                <a:effectLst/>
+                <a:uLnTx/>
+                <a:uFillTx/>
+                <a:latin typeface="+mn-lt"/>
+                <a:ea typeface="+mn-ea"/>
+                <a:cs typeface="+mn-cs"/>
+              </a:rPr>
+              <a:t>Cycled through the pages in the list and displayed there paths to the user</a:t>
+            </a:r>
+          </a:p>
+          <a:p>
+            <a:pPr marL="342900" marR="0" lvl="0" indent="-342900" algn="l" defTabSz="457200" rtl="0" eaLnBrk="1" fontAlgn="auto" latinLnBrk="0" hangingPunct="1">
+              <a:lnSpc>
+                <a:spcPct val="100000"/>
+              </a:lnSpc>
+              <a:spcBef>
+                <a:spcPct val="20000"/>
+              </a:spcBef>
+              <a:spcAft>
+                <a:spcPts val="0"/>
+              </a:spcAft>
+              <a:buClrTx/>
+              <a:buSzTx/>
+              <a:buFont typeface="Arial"/>
+              <a:buChar char="•"/>
+              <a:tabLst/>
+              <a:defRPr/>
+            </a:pPr>
+            <a:endParaRPr kumimoji="0" lang="en-US" sz="3200" b="0" i="0" u="none" strike="noStrike" kern="1200" cap="none" spc="0" normalizeH="0" baseline="0" noProof="0" dirty="0">
+              <a:ln>
+                <a:noFill/>
+              </a:ln>
+              <a:solidFill>
+                <a:schemeClr val="tx1"/>
+              </a:solidFill>
+              <a:effectLst/>
+              <a:uLnTx/>
+              <a:uFillTx/>
+              <a:latin typeface="+mn-lt"/>
+              <a:ea typeface="+mn-ea"/>
+              <a:cs typeface="+mn-cs"/>
+            </a:endParaRPr>
+          </a:p>
+        </p:txBody>
+      </p:sp>
+    </p:spTree>
+  </p:cSld>
+  <p:clrMapOvr>
+    <a:masterClrMapping/>
+  </p:clrMapOvr>
+</p:sld>
+</file>
+
+<file path=ppt/slides/slide7.xml><?xml version="1.0" encoding="utf-8"?>
+<p:sld xmlns:a="http://schemas.openxmlformats.org/drawingml/2006/main" xmlns:r="http://schemas.openxmlformats.org/officeDocument/2006/relationships" xmlns:p="http://schemas.openxmlformats.org/presentationml/2006/main">
+  <p:cSld>
+    <p:spTree>
+      <p:nvGrpSpPr>
+        <p:cNvPr id="1" name=""/>
+        <p:cNvGrpSpPr/>
+        <p:nvPr/>
+      </p:nvGrpSpPr>
+      <p:grpSpPr>
+        <a:xfrm>
+          <a:off x="0" y="0"/>
+          <a:ext cx="0" cy="0"/>
+          <a:chOff x="0" y="0"/>
+          <a:chExt cx="0" cy="0"/>
+        </a:xfrm>
+      </p:grpSpPr>
+      <p:sp>
+        <p:nvSpPr>
+          <p:cNvPr id="4" name="Title 1"/>
+          <p:cNvSpPr>
+            <a:spLocks noGrp="1"/>
+          </p:cNvSpPr>
+          <p:nvPr>
+            <p:ph type="title"/>
+          </p:nvPr>
+        </p:nvSpPr>
+        <p:spPr>
+          <a:xfrm>
+            <a:off x="457200" y="274638"/>
+            <a:ext cx="8229600" cy="1143000"/>
+          </a:xfrm>
+        </p:spPr>
+        <p:txBody>
+          <a:bodyPr/>
+          <a:lstStyle/>
+          <a:p>
+            <a:r>
+              <a:rPr lang="en-US" dirty="0" smtClean="0"/>
+              <a:t>Child access links code</a:t>
+            </a:r>
+            <a:endParaRPr lang="en-US" dirty="0"/>
+          </a:p>
+        </p:txBody>
+      </p:sp>
+      <p:pic>
+        <p:nvPicPr>
+          <p:cNvPr id="5" name="Content Placeholder 3" descr="code.jpg"/>
+          <p:cNvPicPr>
+            <a:picLocks noGrp="1" noChangeAspect="1"/>
+          </p:cNvPicPr>
+          <p:nvPr>
+            <p:ph idx="1"/>
+          </p:nvPr>
+        </p:nvPicPr>
+        <p:blipFill>
+          <a:blip r:embed="rId2" cstate="print"/>
+          <a:srcRect t="13469" b="2350"/>
+          <a:stretch>
+            <a:fillRect/>
+          </a:stretch>
+        </p:blipFill>
+        <p:spPr>
+          <a:xfrm>
+            <a:off x="576274" y="2133600"/>
+            <a:ext cx="8110526" cy="4267200"/>
+          </a:xfrm>
+        </p:spPr>
+      </p:pic>
+      <p:sp>
+        <p:nvSpPr>
+          <p:cNvPr id="6" name="Rectangle 5"/>
+          <p:cNvSpPr/>
+          <p:nvPr/>
+        </p:nvSpPr>
+        <p:spPr>
+          <a:xfrm>
+            <a:off x="4648200" y="3581400"/>
+            <a:ext cx="3886200" cy="1295400"/>
+          </a:xfrm>
+          <a:prstGeom prst="rect">
+            <a:avLst/>
+          </a:prstGeom>
+          <a:noFill/>
+          <a:ln>
+            <a:solidFill>
+              <a:srgbClr val="FF0000"/>
+            </a:solidFill>
+          </a:ln>
+        </p:spPr>
+        <p:style>
+          <a:lnRef idx="1">
+            <a:schemeClr val="accent1"/>
+          </a:lnRef>
+          <a:fillRef idx="3">
+            <a:schemeClr val="accent1"/>
+          </a:fillRef>
+          <a:effectRef idx="2">
+            <a:schemeClr val="accent1"/>
+          </a:effectRef>
+          <a:fontRef idx="minor">
+            <a:schemeClr val="lt1"/>
+          </a:fontRef>
+        </p:style>
+        <p:txBody>
+          <a:bodyPr rtlCol="0" anchor="ctr"/>
+          <a:lstStyle/>
+          <a:p>
+            <a:pPr algn="ctr"/>
+            <a:endParaRPr lang="en-US"/>
+          </a:p>
+        </p:txBody>
+      </p:sp>
+      <p:cxnSp>
+        <p:nvCxnSpPr>
+          <p:cNvPr id="8" name="Straight Arrow Connector 7"/>
+          <p:cNvCxnSpPr/>
+          <p:nvPr/>
+        </p:nvCxnSpPr>
+        <p:spPr>
+          <a:xfrm rot="16200000" flipH="1">
+            <a:off x="4000500" y="2933700"/>
+            <a:ext cx="685800" cy="609600"/>
+          </a:xfrm>
+          <a:prstGeom prst="straightConnector1">
+            <a:avLst/>
+          </a:prstGeom>
+          <a:ln>
+            <a:solidFill>
+              <a:srgbClr val="FF0000"/>
+            </a:solidFill>
+            <a:tailEnd type="arrow"/>
+          </a:ln>
+        </p:spPr>
+        <p:style>
+          <a:lnRef idx="2">
+            <a:schemeClr val="accent1"/>
+          </a:lnRef>
+          <a:fillRef idx="0">
+            <a:schemeClr val="accent1"/>
+          </a:fillRef>
+          <a:effectRef idx="1">
+            <a:schemeClr val="accent1"/>
+          </a:effectRef>
+          <a:fontRef idx="minor">
+            <a:schemeClr val="tx1"/>
+          </a:fontRef>
+        </p:style>
+      </p:cxnSp>
+      <p:sp>
+        <p:nvSpPr>
+          <p:cNvPr id="9" name="TextBox 8"/>
+          <p:cNvSpPr txBox="1"/>
+          <p:nvPr/>
+        </p:nvSpPr>
+        <p:spPr>
+          <a:xfrm>
+            <a:off x="3508647" y="2587823"/>
+            <a:ext cx="1059906" cy="307777"/>
+          </a:xfrm>
+          <a:prstGeom prst="rect">
+            <a:avLst/>
+          </a:prstGeom>
+          <a:noFill/>
+        </p:spPr>
+        <p:txBody>
+          <a:bodyPr wrap="none" rtlCol="0">
+            <a:spAutoFit/>
+          </a:bodyPr>
+          <a:lstStyle/>
+          <a:p>
+            <a:r>
+              <a:rPr lang="en-US" sz="1400" dirty="0" smtClean="0">
+                <a:solidFill>
+                  <a:srgbClr val="FF0000"/>
+                </a:solidFill>
+              </a:rPr>
+              <a:t>Code added</a:t>
+            </a:r>
+            <a:endParaRPr lang="en-US" sz="1400" dirty="0">
+              <a:solidFill>
+                <a:srgbClr val="FF0000"/>
+              </a:solidFill>
+            </a:endParaRPr>
+          </a:p>
+        </p:txBody>
+      </p:sp>
+      <p:sp>
+        <p:nvSpPr>
+          <p:cNvPr id="10" name="TextBox 9"/>
+          <p:cNvSpPr txBox="1"/>
+          <p:nvPr/>
+        </p:nvSpPr>
+        <p:spPr>
+          <a:xfrm>
+            <a:off x="576274" y="1210270"/>
+            <a:ext cx="7509685" cy="923330"/>
+          </a:xfrm>
+          <a:prstGeom prst="rect">
+            <a:avLst/>
+          </a:prstGeom>
+          <a:noFill/>
+        </p:spPr>
+        <p:txBody>
+          <a:bodyPr wrap="none" rtlCol="0">
+            <a:spAutoFit/>
+          </a:bodyPr>
+          <a:lstStyle/>
+          <a:p>
+            <a:pPr>
+              <a:buFont typeface="Arial" pitchFamily="34" charset="0"/>
+              <a:buChar char="•"/>
+            </a:pPr>
+            <a:r>
+              <a:rPr lang="en-US" dirty="0" smtClean="0"/>
+              <a:t> First: looks through all children of the current page</a:t>
+            </a:r>
+          </a:p>
+          <a:p>
+            <a:pPr>
+              <a:buFont typeface="Arial" pitchFamily="34" charset="0"/>
+              <a:buChar char="•"/>
+            </a:pPr>
+            <a:r>
+              <a:rPr lang="en-US" dirty="0" smtClean="0"/>
+              <a:t>Second: Checks to see if page is an empty page (‘New Page’)</a:t>
+            </a:r>
+          </a:p>
+          <a:p>
+            <a:pPr>
+              <a:buFont typeface="Arial" pitchFamily="34" charset="0"/>
+              <a:buChar char="•"/>
+            </a:pPr>
+            <a:r>
+              <a:rPr lang="en-US" dirty="0" smtClean="0"/>
+              <a:t>Third: Creates link for all non-empty pages at the bottom of the current page</a:t>
+            </a:r>
+            <a:endParaRPr lang="en-US" dirty="0"/>
+          </a:p>
+        </p:txBody>
+      </p:sp>
+    </p:spTree>
+  </p:cSld>
+  <p:clrMapOvr>
+    <a:masterClrMapping/>
+  </p:clrMapOvr>
+  <p:timing>
+    <p:tnLst>
+      <p:par>
+        <p:cTn id="1" dur="indefinite" restart="never" nodeType="tmRoot"/>
+      </p:par>
+    </p:tnLst>
+  </p:timing>
+</p:sld>
+</file>
+
+<file path=ppt/slides/slide8.xml><?xml version="1.0" encoding="utf-8"?>
+<p:sld xmlns:a="http://schemas.openxmlformats.org/drawingml/2006/main" xmlns:r="http://schemas.openxmlformats.org/officeDocument/2006/relationships" xmlns:p="http://schemas.openxmlformats.org/presentationml/2006/main">
+  <p:cSld>
+    <p:spTree>
+      <p:nvGrpSpPr>
+        <p:cNvPr id="1" name=""/>
+        <p:cNvGrpSpPr/>
+        <p:nvPr/>
+      </p:nvGrpSpPr>
+      <p:grpSpPr>
+        <a:xfrm>
+          <a:off x="0" y="0"/>
+          <a:ext cx="0" cy="0"/>
+          <a:chOff x="0" y="0"/>
+          <a:chExt cx="0" cy="0"/>
+        </a:xfrm>
+      </p:grpSpPr>
+      <p:sp>
+        <p:nvSpPr>
+          <p:cNvPr id="4" name="Title 1"/>
+          <p:cNvSpPr txBox="1">
+            <a:spLocks/>
+          </p:cNvSpPr>
+          <p:nvPr/>
+        </p:nvSpPr>
+        <p:spPr>
+          <a:xfrm>
+            <a:off x="609600" y="1"/>
+            <a:ext cx="7772400" cy="1219200"/>
+          </a:xfrm>
+          <a:prstGeom prst="rect">
+            <a:avLst/>
+          </a:prstGeom>
+        </p:spPr>
+        <p:txBody>
+          <a:bodyPr vert="horz" lIns="91440" tIns="45720" rIns="91440" bIns="45720" rtlCol="0" anchor="ctr">
+            <a:normAutofit/>
+          </a:bodyPr>
+          <a:lstStyle/>
+          <a:p>
+            <a:pPr marL="0" marR="0" lvl="0" indent="0" algn="ctr" defTabSz="457200" rtl="0" eaLnBrk="1" fontAlgn="auto" latinLnBrk="0" hangingPunct="1">
+              <a:lnSpc>
+                <a:spcPct val="100000"/>
+              </a:lnSpc>
+              <a:spcBef>
+                <a:spcPct val="0"/>
+              </a:spcBef>
+              <a:spcAft>
+                <a:spcPts val="0"/>
+              </a:spcAft>
+              <a:buClrTx/>
+              <a:buSzTx/>
+              <a:buFontTx/>
+              <a:buNone/>
+              <a:tabLst/>
+              <a:defRPr/>
+            </a:pPr>
+            <a:r>
+              <a:rPr kumimoji="0" lang="en-US" sz="4400" b="0" i="0" u="none" strike="noStrike" kern="1200" cap="none" spc="0" normalizeH="0" baseline="0" noProof="0" smtClean="0">
+                <a:ln>
+                  <a:noFill/>
+                </a:ln>
+                <a:solidFill>
+                  <a:schemeClr val="tx1"/>
+                </a:solidFill>
+                <a:effectLst/>
+                <a:uLnTx/>
+                <a:uFillTx/>
+                <a:latin typeface="+mj-lt"/>
+                <a:ea typeface="+mj-ea"/>
+                <a:cs typeface="+mj-cs"/>
+              </a:rPr>
+              <a:t>Child access links screenshots</a:t>
+            </a:r>
+            <a:endParaRPr kumimoji="0" lang="en-US" sz="4400" b="0" i="0" u="none" strike="noStrike" kern="1200" cap="none" spc="0" normalizeH="0" baseline="0" noProof="0" dirty="0">
+              <a:ln>
+                <a:noFill/>
+              </a:ln>
+              <a:solidFill>
+                <a:schemeClr val="tx1"/>
+              </a:solidFill>
+              <a:effectLst/>
+              <a:uLnTx/>
+              <a:uFillTx/>
+              <a:latin typeface="+mj-lt"/>
+              <a:ea typeface="+mj-ea"/>
+              <a:cs typeface="+mj-cs"/>
+            </a:endParaRPr>
+          </a:p>
+        </p:txBody>
+      </p:sp>
+      <p:pic>
+        <p:nvPicPr>
+          <p:cNvPr id="5" name="Picture 4" descr="demo.jpg"/>
+          <p:cNvPicPr>
+            <a:picLocks noChangeAspect="1"/>
+          </p:cNvPicPr>
+          <p:nvPr/>
+        </p:nvPicPr>
+        <p:blipFill>
+          <a:blip r:embed="rId2" cstate="print"/>
+          <a:srcRect l="20833" t="13538" r="21667" b="6274"/>
+          <a:stretch>
+            <a:fillRect/>
+          </a:stretch>
+        </p:blipFill>
+        <p:spPr>
+          <a:xfrm>
+            <a:off x="4451083" y="2819400"/>
+            <a:ext cx="4399524" cy="3834653"/>
+          </a:xfrm>
+          <a:prstGeom prst="rect">
+            <a:avLst/>
+          </a:prstGeom>
+        </p:spPr>
+      </p:pic>
+      <p:pic>
+        <p:nvPicPr>
+          <p:cNvPr id="6" name="Picture 5" descr="demo2.jpg"/>
+          <p:cNvPicPr>
+            <a:picLocks noChangeAspect="1"/>
+          </p:cNvPicPr>
+          <p:nvPr/>
+        </p:nvPicPr>
+        <p:blipFill>
+          <a:blip r:embed="rId3" cstate="print"/>
+          <a:srcRect l="21667" t="11333" r="21667" b="4667"/>
+          <a:stretch>
+            <a:fillRect/>
+          </a:stretch>
+        </p:blipFill>
+        <p:spPr>
+          <a:xfrm>
+            <a:off x="228599" y="2819400"/>
+            <a:ext cx="4138991" cy="3834653"/>
+          </a:xfrm>
+          <a:prstGeom prst="rect">
+            <a:avLst/>
+          </a:prstGeom>
+        </p:spPr>
+      </p:pic>
+      <p:sp>
+        <p:nvSpPr>
+          <p:cNvPr id="7" name="TextBox 6"/>
+          <p:cNvSpPr txBox="1"/>
+          <p:nvPr/>
+        </p:nvSpPr>
+        <p:spPr>
+          <a:xfrm>
+            <a:off x="1676400" y="2209800"/>
+            <a:ext cx="803105" cy="369332"/>
+          </a:xfrm>
+          <a:prstGeom prst="rect">
+            <a:avLst/>
+          </a:prstGeom>
+          <a:noFill/>
+        </p:spPr>
+        <p:txBody>
+          <a:bodyPr wrap="none" rtlCol="0">
+            <a:spAutoFit/>
+          </a:bodyPr>
+          <a:lstStyle/>
+          <a:p>
+            <a:r>
+              <a:rPr lang="en-US" dirty="0" smtClean="0"/>
+              <a:t>Before</a:t>
+            </a:r>
+            <a:endParaRPr lang="en-US" dirty="0"/>
+          </a:p>
+        </p:txBody>
+      </p:sp>
+      <p:sp>
+        <p:nvSpPr>
+          <p:cNvPr id="8" name="TextBox 7"/>
+          <p:cNvSpPr txBox="1"/>
+          <p:nvPr/>
+        </p:nvSpPr>
+        <p:spPr>
+          <a:xfrm>
+            <a:off x="6400800" y="2133600"/>
+            <a:ext cx="658257" cy="369332"/>
+          </a:xfrm>
+          <a:prstGeom prst="rect">
+            <a:avLst/>
+          </a:prstGeom>
+          <a:noFill/>
+        </p:spPr>
+        <p:txBody>
+          <a:bodyPr wrap="none" rtlCol="0">
+            <a:spAutoFit/>
+          </a:bodyPr>
+          <a:lstStyle/>
+          <a:p>
+            <a:r>
+              <a:rPr lang="en-US" dirty="0" smtClean="0"/>
+              <a:t>After</a:t>
+            </a:r>
+            <a:endParaRPr lang="en-US" dirty="0"/>
+          </a:p>
+        </p:txBody>
+      </p:sp>
+      <p:sp>
+        <p:nvSpPr>
+          <p:cNvPr id="9" name="Rectangle 8"/>
+          <p:cNvSpPr/>
+          <p:nvPr/>
+        </p:nvSpPr>
+        <p:spPr>
+          <a:xfrm>
+            <a:off x="228599" y="4208622"/>
+            <a:ext cx="762000" cy="152400"/>
+          </a:xfrm>
+          <a:prstGeom prst="rect">
+            <a:avLst/>
+          </a:prstGeom>
+          <a:noFill/>
+          <a:ln>
+            <a:solidFill>
+              <a:srgbClr val="FF0000"/>
+            </a:solidFill>
+          </a:ln>
+        </p:spPr>
+        <p:style>
+          <a:lnRef idx="2">
+            <a:schemeClr val="accent1">
+              <a:shade val="50000"/>
+            </a:schemeClr>
+          </a:lnRef>
+          <a:fillRef idx="1">
+            <a:schemeClr val="accent1"/>
+          </a:fillRef>
+          <a:effectRef idx="0">
+            <a:schemeClr val="accent1"/>
+          </a:effectRef>
+          <a:fontRef idx="minor">
+            <a:schemeClr val="lt1"/>
+          </a:fontRef>
+        </p:style>
+        <p:txBody>
+          <a:bodyPr rtlCol="0" anchor="ctr"/>
+          <a:lstStyle/>
+          <a:p>
+            <a:pPr algn="ctr"/>
+            <a:endParaRPr lang="en-US"/>
+          </a:p>
+        </p:txBody>
+      </p:sp>
+      <p:cxnSp>
+        <p:nvCxnSpPr>
+          <p:cNvPr id="10" name="Straight Arrow Connector 9"/>
+          <p:cNvCxnSpPr/>
+          <p:nvPr/>
+        </p:nvCxnSpPr>
+        <p:spPr>
+          <a:xfrm rot="10800000" flipV="1">
+            <a:off x="990599" y="3980022"/>
+            <a:ext cx="304800" cy="228600"/>
+          </a:xfrm>
+          <a:prstGeom prst="straightConnector1">
+            <a:avLst/>
+          </a:prstGeom>
+          <a:ln>
+            <a:solidFill>
+              <a:srgbClr val="FF0000"/>
+            </a:solidFill>
+            <a:tailEnd type="arrow"/>
+          </a:ln>
+        </p:spPr>
+        <p:style>
+          <a:lnRef idx="1">
+            <a:schemeClr val="accent1"/>
+          </a:lnRef>
+          <a:fillRef idx="0">
+            <a:schemeClr val="accent1"/>
+          </a:fillRef>
+          <a:effectRef idx="0">
+            <a:schemeClr val="accent1"/>
+          </a:effectRef>
+          <a:fontRef idx="minor">
+            <a:schemeClr val="tx1"/>
+          </a:fontRef>
+        </p:style>
+      </p:cxnSp>
+      <p:sp>
+        <p:nvSpPr>
+          <p:cNvPr id="11" name="TextBox 10"/>
+          <p:cNvSpPr txBox="1"/>
+          <p:nvPr/>
+        </p:nvSpPr>
+        <p:spPr>
+          <a:xfrm>
+            <a:off x="1219199" y="3827622"/>
+            <a:ext cx="792205" cy="246221"/>
+          </a:xfrm>
+          <a:prstGeom prst="rect">
+            <a:avLst/>
+          </a:prstGeom>
+          <a:noFill/>
+        </p:spPr>
+        <p:txBody>
+          <a:bodyPr wrap="none" rtlCol="0">
+            <a:spAutoFit/>
+          </a:bodyPr>
+          <a:lstStyle/>
+          <a:p>
+            <a:r>
+              <a:rPr lang="en-US" sz="1000" dirty="0" smtClean="0">
+                <a:solidFill>
+                  <a:srgbClr val="FF0000"/>
+                </a:solidFill>
+              </a:rPr>
+              <a:t>Parent links</a:t>
+            </a:r>
+            <a:endParaRPr lang="en-US" sz="1000" dirty="0">
+              <a:solidFill>
+                <a:srgbClr val="FF0000"/>
+              </a:solidFill>
+            </a:endParaRPr>
+          </a:p>
+        </p:txBody>
+      </p:sp>
+      <p:sp>
+        <p:nvSpPr>
+          <p:cNvPr id="12" name="Rectangle 11"/>
+          <p:cNvSpPr/>
+          <p:nvPr/>
+        </p:nvSpPr>
+        <p:spPr>
+          <a:xfrm>
+            <a:off x="4617995" y="4208622"/>
+            <a:ext cx="762000" cy="152400"/>
+          </a:xfrm>
+          <a:prstGeom prst="rect">
+            <a:avLst/>
+          </a:prstGeom>
+          <a:noFill/>
+          <a:ln>
+            <a:solidFill>
+              <a:srgbClr val="FF0000"/>
+            </a:solidFill>
+          </a:ln>
+        </p:spPr>
+        <p:style>
+          <a:lnRef idx="2">
+            <a:schemeClr val="accent1">
+              <a:shade val="50000"/>
+            </a:schemeClr>
+          </a:lnRef>
+          <a:fillRef idx="1">
+            <a:schemeClr val="accent1"/>
+          </a:fillRef>
+          <a:effectRef idx="0">
+            <a:schemeClr val="accent1"/>
+          </a:effectRef>
+          <a:fontRef idx="minor">
+            <a:schemeClr val="lt1"/>
+          </a:fontRef>
+        </p:style>
+        <p:txBody>
+          <a:bodyPr rtlCol="0" anchor="ctr"/>
+          <a:lstStyle/>
+          <a:p>
+            <a:pPr algn="ctr"/>
+            <a:endParaRPr lang="en-US"/>
+          </a:p>
+        </p:txBody>
+      </p:sp>
+      <p:cxnSp>
+        <p:nvCxnSpPr>
+          <p:cNvPr id="13" name="Straight Arrow Connector 12"/>
+          <p:cNvCxnSpPr/>
+          <p:nvPr/>
+        </p:nvCxnSpPr>
+        <p:spPr>
+          <a:xfrm rot="10800000" flipV="1">
+            <a:off x="5379995" y="3980022"/>
+            <a:ext cx="304800" cy="228600"/>
+          </a:xfrm>
+          <a:prstGeom prst="straightConnector1">
+            <a:avLst/>
+          </a:prstGeom>
+          <a:ln>
+            <a:solidFill>
+              <a:srgbClr val="FF0000"/>
+            </a:solidFill>
+            <a:tailEnd type="arrow"/>
+          </a:ln>
+        </p:spPr>
+        <p:style>
+          <a:lnRef idx="1">
+            <a:schemeClr val="accent1"/>
+          </a:lnRef>
+          <a:fillRef idx="0">
+            <a:schemeClr val="accent1"/>
+          </a:fillRef>
+          <a:effectRef idx="0">
+            <a:schemeClr val="accent1"/>
+          </a:effectRef>
+          <a:fontRef idx="minor">
+            <a:schemeClr val="tx1"/>
+          </a:fontRef>
+        </p:style>
+      </p:cxnSp>
+      <p:sp>
+        <p:nvSpPr>
+          <p:cNvPr id="14" name="TextBox 13"/>
+          <p:cNvSpPr txBox="1"/>
+          <p:nvPr/>
+        </p:nvSpPr>
+        <p:spPr>
+          <a:xfrm>
+            <a:off x="5608595" y="3827622"/>
+            <a:ext cx="792205" cy="246221"/>
+          </a:xfrm>
+          <a:prstGeom prst="rect">
+            <a:avLst/>
+          </a:prstGeom>
+          <a:noFill/>
+        </p:spPr>
+        <p:txBody>
+          <a:bodyPr wrap="none" rtlCol="0">
+            <a:spAutoFit/>
+          </a:bodyPr>
+          <a:lstStyle/>
+          <a:p>
+            <a:r>
+              <a:rPr lang="en-US" sz="1000" dirty="0" smtClean="0">
+                <a:solidFill>
+                  <a:srgbClr val="FF0000"/>
+                </a:solidFill>
+              </a:rPr>
+              <a:t>Parent links</a:t>
+            </a:r>
+            <a:endParaRPr lang="en-US" sz="1000" dirty="0">
+              <a:solidFill>
+                <a:srgbClr val="FF0000"/>
+              </a:solidFill>
+            </a:endParaRPr>
+          </a:p>
+        </p:txBody>
+      </p:sp>
+      <p:sp>
+        <p:nvSpPr>
+          <p:cNvPr id="15" name="Rectangle 14"/>
+          <p:cNvSpPr/>
+          <p:nvPr/>
+        </p:nvSpPr>
+        <p:spPr>
+          <a:xfrm>
+            <a:off x="4702955" y="6172201"/>
+            <a:ext cx="762000" cy="152400"/>
+          </a:xfrm>
+          <a:prstGeom prst="rect">
+            <a:avLst/>
+          </a:prstGeom>
+          <a:noFill/>
+          <a:ln>
+            <a:solidFill>
+              <a:srgbClr val="FF0000"/>
+            </a:solidFill>
+          </a:ln>
+        </p:spPr>
+        <p:style>
+          <a:lnRef idx="2">
+            <a:schemeClr val="accent1">
+              <a:shade val="50000"/>
+            </a:schemeClr>
+          </a:lnRef>
+          <a:fillRef idx="1">
+            <a:schemeClr val="accent1"/>
+          </a:fillRef>
+          <a:effectRef idx="0">
+            <a:schemeClr val="accent1"/>
+          </a:effectRef>
+          <a:fontRef idx="minor">
+            <a:schemeClr val="lt1"/>
+          </a:fontRef>
+        </p:style>
+        <p:txBody>
+          <a:bodyPr rtlCol="0" anchor="ctr"/>
+          <a:lstStyle/>
+          <a:p>
+            <a:pPr algn="ctr"/>
+            <a:endParaRPr lang="en-US"/>
+          </a:p>
+        </p:txBody>
+      </p:sp>
+      <p:cxnSp>
+        <p:nvCxnSpPr>
+          <p:cNvPr id="16" name="Straight Arrow Connector 15"/>
+          <p:cNvCxnSpPr/>
+          <p:nvPr/>
+        </p:nvCxnSpPr>
+        <p:spPr>
+          <a:xfrm rot="10800000" flipV="1">
+            <a:off x="5464955" y="5943601"/>
+            <a:ext cx="304800" cy="228600"/>
+          </a:xfrm>
+          <a:prstGeom prst="straightConnector1">
+            <a:avLst/>
+          </a:prstGeom>
+          <a:ln>
+            <a:solidFill>
+              <a:srgbClr val="FF0000"/>
+            </a:solidFill>
+            <a:tailEnd type="arrow"/>
+          </a:ln>
+        </p:spPr>
+        <p:style>
+          <a:lnRef idx="1">
+            <a:schemeClr val="accent1"/>
+          </a:lnRef>
+          <a:fillRef idx="0">
+            <a:schemeClr val="accent1"/>
+          </a:fillRef>
+          <a:effectRef idx="0">
+            <a:schemeClr val="accent1"/>
+          </a:effectRef>
+          <a:fontRef idx="minor">
+            <a:schemeClr val="tx1"/>
+          </a:fontRef>
+        </p:style>
+      </p:cxnSp>
+      <p:sp>
+        <p:nvSpPr>
+          <p:cNvPr id="17" name="TextBox 16"/>
+          <p:cNvSpPr txBox="1"/>
+          <p:nvPr/>
+        </p:nvSpPr>
+        <p:spPr>
+          <a:xfrm>
+            <a:off x="5693555" y="5791201"/>
+            <a:ext cx="707245" cy="246221"/>
+          </a:xfrm>
+          <a:prstGeom prst="rect">
+            <a:avLst/>
+          </a:prstGeom>
+          <a:noFill/>
+        </p:spPr>
+        <p:txBody>
+          <a:bodyPr wrap="none" rtlCol="0">
+            <a:spAutoFit/>
+          </a:bodyPr>
+          <a:lstStyle/>
+          <a:p>
+            <a:r>
+              <a:rPr lang="en-US" sz="1000" dirty="0" smtClean="0">
+                <a:solidFill>
+                  <a:srgbClr val="FF0000"/>
+                </a:solidFill>
+              </a:rPr>
+              <a:t>Child links</a:t>
+            </a:r>
+            <a:endParaRPr lang="en-US" sz="1000" dirty="0">
+              <a:solidFill>
+                <a:srgbClr val="FF0000"/>
+              </a:solidFill>
+            </a:endParaRPr>
+          </a:p>
+        </p:txBody>
+      </p:sp>
+      <p:sp>
+        <p:nvSpPr>
+          <p:cNvPr id="18" name="TextBox 17"/>
+          <p:cNvSpPr txBox="1"/>
+          <p:nvPr/>
+        </p:nvSpPr>
+        <p:spPr>
+          <a:xfrm>
+            <a:off x="1219200" y="1295400"/>
+            <a:ext cx="6629400" cy="646331"/>
+          </a:xfrm>
+          <a:prstGeom prst="rect">
+            <a:avLst/>
+          </a:prstGeom>
+          <a:noFill/>
+        </p:spPr>
+        <p:txBody>
+          <a:bodyPr wrap="square" rtlCol="0">
+            <a:spAutoFit/>
+          </a:bodyPr>
+          <a:lstStyle/>
+          <a:p>
+            <a:r>
+              <a:rPr lang="en-US" dirty="0" smtClean="0"/>
+              <a:t>Before: A page could only access its parents</a:t>
+            </a:r>
+          </a:p>
+          <a:p>
+            <a:r>
+              <a:rPr lang="en-US" dirty="0" smtClean="0"/>
+              <a:t>After: A page can access can access its parent and its children pages</a:t>
+            </a:r>
+            <a:endParaRPr lang="en-US" dirty="0"/>
+          </a:p>
+        </p:txBody>
+      </p:sp>
+    </p:spTree>
+  </p:cSld>
+  <p:clrMapOvr>
+    <a:masterClrMapping/>
+  </p:clrMapOvr>
+  <p:timing>
+    <p:tnLst>
+      <p:par>
+        <p:cTn id="1" dur="indefinite" restart="never" nodeType="tmRoot"/>
+      </p:par>
+    </p:tnLst>
+  </p:timing>
 </p:sld>
 </file>
 

</xml_diff>

<commit_message>
added slides for "editing group" and "theme preview image".
</commit_message>
<xml_diff>
--- a/branches/CEN3031-per7/app-engine-site-creator/presIIIdev.pptx
+++ b/branches/CEN3031-per7/app-engine-site-creator/presIIIdev.pptx
@@ -6,13 +6,15 @@
   </p:sldMasterIdLst>
   <p:sldIdLst>
     <p:sldId id="256" r:id="rId2"/>
-    <p:sldId id="257" r:id="rId3"/>
-    <p:sldId id="258" r:id="rId4"/>
-    <p:sldId id="259" r:id="rId5"/>
-    <p:sldId id="260" r:id="rId6"/>
-    <p:sldId id="261" r:id="rId7"/>
-    <p:sldId id="262" r:id="rId8"/>
-    <p:sldId id="263" r:id="rId9"/>
+    <p:sldId id="264" r:id="rId3"/>
+    <p:sldId id="257" r:id="rId4"/>
+    <p:sldId id="258" r:id="rId5"/>
+    <p:sldId id="259" r:id="rId6"/>
+    <p:sldId id="260" r:id="rId7"/>
+    <p:sldId id="265" r:id="rId8"/>
+    <p:sldId id="261" r:id="rId9"/>
+    <p:sldId id="262" r:id="rId10"/>
+    <p:sldId id="263" r:id="rId11"/>
   </p:sldIdLst>
   <p:sldSz cx="9144000" cy="6858000" type="screen4x3"/>
   <p:notesSz cx="6858000" cy="9144000"/>
@@ -20,94 +22,124 @@
     <a:defPPr>
       <a:defRPr lang="en-US"/>
     </a:defPPr>
-    <a:lvl1pPr marL="0" algn="l" defTabSz="457200" rtl="0" eaLnBrk="1" latinLnBrk="0" hangingPunct="1">
-      <a:defRPr sz="1800" kern="1200">
+    <a:lvl1pPr algn="l" defTabSz="457200" rtl="0" fontAlgn="base">
+      <a:spcBef>
+        <a:spcPct val="0"/>
+      </a:spcBef>
+      <a:spcAft>
+        <a:spcPct val="0"/>
+      </a:spcAft>
+      <a:defRPr kern="1200">
         <a:solidFill>
           <a:schemeClr val="tx1"/>
         </a:solidFill>
-        <a:latin typeface="+mn-lt"/>
+        <a:latin typeface="Arial" charset="0"/>
         <a:ea typeface="+mn-ea"/>
-        <a:cs typeface="+mn-cs"/>
+        <a:cs typeface="Arial" charset="0"/>
       </a:defRPr>
     </a:lvl1pPr>
-    <a:lvl2pPr marL="457200" algn="l" defTabSz="457200" rtl="0" eaLnBrk="1" latinLnBrk="0" hangingPunct="1">
-      <a:defRPr sz="1800" kern="1200">
+    <a:lvl2pPr marL="457200" algn="l" defTabSz="457200" rtl="0" fontAlgn="base">
+      <a:spcBef>
+        <a:spcPct val="0"/>
+      </a:spcBef>
+      <a:spcAft>
+        <a:spcPct val="0"/>
+      </a:spcAft>
+      <a:defRPr kern="1200">
         <a:solidFill>
           <a:schemeClr val="tx1"/>
         </a:solidFill>
-        <a:latin typeface="+mn-lt"/>
+        <a:latin typeface="Arial" charset="0"/>
         <a:ea typeface="+mn-ea"/>
-        <a:cs typeface="+mn-cs"/>
+        <a:cs typeface="Arial" charset="0"/>
       </a:defRPr>
     </a:lvl2pPr>
-    <a:lvl3pPr marL="914400" algn="l" defTabSz="457200" rtl="0" eaLnBrk="1" latinLnBrk="0" hangingPunct="1">
-      <a:defRPr sz="1800" kern="1200">
+    <a:lvl3pPr marL="914400" algn="l" defTabSz="457200" rtl="0" fontAlgn="base">
+      <a:spcBef>
+        <a:spcPct val="0"/>
+      </a:spcBef>
+      <a:spcAft>
+        <a:spcPct val="0"/>
+      </a:spcAft>
+      <a:defRPr kern="1200">
         <a:solidFill>
           <a:schemeClr val="tx1"/>
         </a:solidFill>
-        <a:latin typeface="+mn-lt"/>
+        <a:latin typeface="Arial" charset="0"/>
         <a:ea typeface="+mn-ea"/>
-        <a:cs typeface="+mn-cs"/>
+        <a:cs typeface="Arial" charset="0"/>
       </a:defRPr>
     </a:lvl3pPr>
-    <a:lvl4pPr marL="1371600" algn="l" defTabSz="457200" rtl="0" eaLnBrk="1" latinLnBrk="0" hangingPunct="1">
-      <a:defRPr sz="1800" kern="1200">
+    <a:lvl4pPr marL="1371600" algn="l" defTabSz="457200" rtl="0" fontAlgn="base">
+      <a:spcBef>
+        <a:spcPct val="0"/>
+      </a:spcBef>
+      <a:spcAft>
+        <a:spcPct val="0"/>
+      </a:spcAft>
+      <a:defRPr kern="1200">
         <a:solidFill>
           <a:schemeClr val="tx1"/>
         </a:solidFill>
-        <a:latin typeface="+mn-lt"/>
+        <a:latin typeface="Arial" charset="0"/>
         <a:ea typeface="+mn-ea"/>
-        <a:cs typeface="+mn-cs"/>
+        <a:cs typeface="Arial" charset="0"/>
       </a:defRPr>
     </a:lvl4pPr>
-    <a:lvl5pPr marL="1828800" algn="l" defTabSz="457200" rtl="0" eaLnBrk="1" latinLnBrk="0" hangingPunct="1">
-      <a:defRPr sz="1800" kern="1200">
+    <a:lvl5pPr marL="1828800" algn="l" defTabSz="457200" rtl="0" fontAlgn="base">
+      <a:spcBef>
+        <a:spcPct val="0"/>
+      </a:spcBef>
+      <a:spcAft>
+        <a:spcPct val="0"/>
+      </a:spcAft>
+      <a:defRPr kern="1200">
         <a:solidFill>
           <a:schemeClr val="tx1"/>
         </a:solidFill>
-        <a:latin typeface="+mn-lt"/>
+        <a:latin typeface="Arial" charset="0"/>
         <a:ea typeface="+mn-ea"/>
-        <a:cs typeface="+mn-cs"/>
+        <a:cs typeface="Arial" charset="0"/>
       </a:defRPr>
     </a:lvl5pPr>
-    <a:lvl6pPr marL="2286000" algn="l" defTabSz="457200" rtl="0" eaLnBrk="1" latinLnBrk="0" hangingPunct="1">
-      <a:defRPr sz="1800" kern="1200">
+    <a:lvl6pPr marL="2286000" algn="l" defTabSz="914400" rtl="0" eaLnBrk="1" latinLnBrk="0" hangingPunct="1">
+      <a:defRPr kern="1200">
         <a:solidFill>
           <a:schemeClr val="tx1"/>
         </a:solidFill>
-        <a:latin typeface="+mn-lt"/>
+        <a:latin typeface="Arial" charset="0"/>
         <a:ea typeface="+mn-ea"/>
-        <a:cs typeface="+mn-cs"/>
+        <a:cs typeface="Arial" charset="0"/>
       </a:defRPr>
     </a:lvl6pPr>
-    <a:lvl7pPr marL="2743200" algn="l" defTabSz="457200" rtl="0" eaLnBrk="1" latinLnBrk="0" hangingPunct="1">
-      <a:defRPr sz="1800" kern="1200">
+    <a:lvl7pPr marL="2743200" algn="l" defTabSz="914400" rtl="0" eaLnBrk="1" latinLnBrk="0" hangingPunct="1">
+      <a:defRPr kern="1200">
         <a:solidFill>
           <a:schemeClr val="tx1"/>
         </a:solidFill>
-        <a:latin typeface="+mn-lt"/>
+        <a:latin typeface="Arial" charset="0"/>
         <a:ea typeface="+mn-ea"/>
-        <a:cs typeface="+mn-cs"/>
+        <a:cs typeface="Arial" charset="0"/>
       </a:defRPr>
     </a:lvl7pPr>
-    <a:lvl8pPr marL="3200400" algn="l" defTabSz="457200" rtl="0" eaLnBrk="1" latinLnBrk="0" hangingPunct="1">
-      <a:defRPr sz="1800" kern="1200">
+    <a:lvl8pPr marL="3200400" algn="l" defTabSz="914400" rtl="0" eaLnBrk="1" latinLnBrk="0" hangingPunct="1">
+      <a:defRPr kern="1200">
         <a:solidFill>
           <a:schemeClr val="tx1"/>
         </a:solidFill>
-        <a:latin typeface="+mn-lt"/>
+        <a:latin typeface="Arial" charset="0"/>
         <a:ea typeface="+mn-ea"/>
-        <a:cs typeface="+mn-cs"/>
+        <a:cs typeface="Arial" charset="0"/>
       </a:defRPr>
     </a:lvl8pPr>
-    <a:lvl9pPr marL="3657600" algn="l" defTabSz="457200" rtl="0" eaLnBrk="1" latinLnBrk="0" hangingPunct="1">
-      <a:defRPr sz="1800" kern="1200">
+    <a:lvl9pPr marL="3657600" algn="l" defTabSz="914400" rtl="0" eaLnBrk="1" latinLnBrk="0" hangingPunct="1">
+      <a:defRPr kern="1200">
         <a:solidFill>
           <a:schemeClr val="tx1"/>
         </a:solidFill>
-        <a:latin typeface="+mn-lt"/>
+        <a:latin typeface="Arial" charset="0"/>
         <a:ea typeface="+mn-ea"/>
-        <a:cs typeface="+mn-cs"/>
+        <a:cs typeface="Arial" charset="0"/>
       </a:defRPr>
     </a:lvl9pPr>
   </p:defaultTextStyle>
@@ -291,11 +323,20 @@
         <p:spPr/>
         <p:txBody>
           <a:bodyPr/>
-          <a:lstStyle/>
-          <a:p>
-            <a:fld id="{4804E31C-644C-C14D-AB1A-4B4F1EA69BCD}" type="datetimeFigureOut">
-              <a:rPr lang="en-US" smtClean="0"/>
-              <a:pPr/>
+          <a:lstStyle>
+            <a:lvl1pPr>
+              <a:defRPr/>
+            </a:lvl1pPr>
+          </a:lstStyle>
+          <a:p>
+            <a:pPr>
+              <a:defRPr/>
+            </a:pPr>
+            <a:fld id="{4C38B53E-BB50-4E15-B9F8-951152A6E66F}" type="datetimeFigureOut">
+              <a:rPr lang="en-US"/>
+              <a:pPr>
+                <a:defRPr/>
+              </a:pPr>
               <a:t>11/25/2009</a:t>
             </a:fld>
             <a:endParaRPr lang="en-US"/>
@@ -315,8 +356,15 @@
         <p:spPr/>
         <p:txBody>
           <a:bodyPr/>
-          <a:lstStyle/>
-          <a:p>
+          <a:lstStyle>
+            <a:lvl1pPr>
+              <a:defRPr/>
+            </a:lvl1pPr>
+          </a:lstStyle>
+          <a:p>
+            <a:pPr>
+              <a:defRPr/>
+            </a:pPr>
             <a:endParaRPr lang="en-US"/>
           </a:p>
         </p:txBody>
@@ -334,11 +382,20 @@
         <p:spPr/>
         <p:txBody>
           <a:bodyPr/>
-          <a:lstStyle/>
-          <a:p>
-            <a:fld id="{C41FC688-A7A0-EC4D-912E-391576B3DEE3}" type="slidenum">
-              <a:rPr lang="en-US" smtClean="0"/>
-              <a:pPr/>
+          <a:lstStyle>
+            <a:lvl1pPr>
+              <a:defRPr/>
+            </a:lvl1pPr>
+          </a:lstStyle>
+          <a:p>
+            <a:pPr>
+              <a:defRPr/>
+            </a:pPr>
+            <a:fld id="{FF36961D-AB0B-430E-B93B-F0CD5BAC62F1}" type="slidenum">
+              <a:rPr lang="en-US"/>
+              <a:pPr>
+                <a:defRPr/>
+              </a:pPr>
               <a:t>‹#›</a:t>
             </a:fld>
             <a:endParaRPr lang="en-US"/>
@@ -458,11 +515,20 @@
         <p:spPr/>
         <p:txBody>
           <a:bodyPr/>
-          <a:lstStyle/>
-          <a:p>
-            <a:fld id="{4804E31C-644C-C14D-AB1A-4B4F1EA69BCD}" type="datetimeFigureOut">
-              <a:rPr lang="en-US" smtClean="0"/>
-              <a:pPr/>
+          <a:lstStyle>
+            <a:lvl1pPr>
+              <a:defRPr/>
+            </a:lvl1pPr>
+          </a:lstStyle>
+          <a:p>
+            <a:pPr>
+              <a:defRPr/>
+            </a:pPr>
+            <a:fld id="{405BC6AD-6860-49B3-9A8B-132C2C0FEF83}" type="datetimeFigureOut">
+              <a:rPr lang="en-US"/>
+              <a:pPr>
+                <a:defRPr/>
+              </a:pPr>
               <a:t>11/25/2009</a:t>
             </a:fld>
             <a:endParaRPr lang="en-US"/>
@@ -482,8 +548,15 @@
         <p:spPr/>
         <p:txBody>
           <a:bodyPr/>
-          <a:lstStyle/>
-          <a:p>
+          <a:lstStyle>
+            <a:lvl1pPr>
+              <a:defRPr/>
+            </a:lvl1pPr>
+          </a:lstStyle>
+          <a:p>
+            <a:pPr>
+              <a:defRPr/>
+            </a:pPr>
             <a:endParaRPr lang="en-US"/>
           </a:p>
         </p:txBody>
@@ -501,11 +574,20 @@
         <p:spPr/>
         <p:txBody>
           <a:bodyPr/>
-          <a:lstStyle/>
-          <a:p>
-            <a:fld id="{C41FC688-A7A0-EC4D-912E-391576B3DEE3}" type="slidenum">
-              <a:rPr lang="en-US" smtClean="0"/>
-              <a:pPr/>
+          <a:lstStyle>
+            <a:lvl1pPr>
+              <a:defRPr/>
+            </a:lvl1pPr>
+          </a:lstStyle>
+          <a:p>
+            <a:pPr>
+              <a:defRPr/>
+            </a:pPr>
+            <a:fld id="{4A717255-A4D0-4E6D-A089-9CF141FC2CC2}" type="slidenum">
+              <a:rPr lang="en-US"/>
+              <a:pPr>
+                <a:defRPr/>
+              </a:pPr>
               <a:t>‹#›</a:t>
             </a:fld>
             <a:endParaRPr lang="en-US"/>
@@ -635,11 +717,20 @@
         <p:spPr/>
         <p:txBody>
           <a:bodyPr/>
-          <a:lstStyle/>
-          <a:p>
-            <a:fld id="{4804E31C-644C-C14D-AB1A-4B4F1EA69BCD}" type="datetimeFigureOut">
-              <a:rPr lang="en-US" smtClean="0"/>
-              <a:pPr/>
+          <a:lstStyle>
+            <a:lvl1pPr>
+              <a:defRPr/>
+            </a:lvl1pPr>
+          </a:lstStyle>
+          <a:p>
+            <a:pPr>
+              <a:defRPr/>
+            </a:pPr>
+            <a:fld id="{264BFD65-CB0E-492A-B646-01C4A70F99CC}" type="datetimeFigureOut">
+              <a:rPr lang="en-US"/>
+              <a:pPr>
+                <a:defRPr/>
+              </a:pPr>
               <a:t>11/25/2009</a:t>
             </a:fld>
             <a:endParaRPr lang="en-US"/>
@@ -659,8 +750,15 @@
         <p:spPr/>
         <p:txBody>
           <a:bodyPr/>
-          <a:lstStyle/>
-          <a:p>
+          <a:lstStyle>
+            <a:lvl1pPr>
+              <a:defRPr/>
+            </a:lvl1pPr>
+          </a:lstStyle>
+          <a:p>
+            <a:pPr>
+              <a:defRPr/>
+            </a:pPr>
             <a:endParaRPr lang="en-US"/>
           </a:p>
         </p:txBody>
@@ -678,11 +776,20 @@
         <p:spPr/>
         <p:txBody>
           <a:bodyPr/>
-          <a:lstStyle/>
-          <a:p>
-            <a:fld id="{C41FC688-A7A0-EC4D-912E-391576B3DEE3}" type="slidenum">
-              <a:rPr lang="en-US" smtClean="0"/>
-              <a:pPr/>
+          <a:lstStyle>
+            <a:lvl1pPr>
+              <a:defRPr/>
+            </a:lvl1pPr>
+          </a:lstStyle>
+          <a:p>
+            <a:pPr>
+              <a:defRPr/>
+            </a:pPr>
+            <a:fld id="{DA78191A-A12F-4371-8E36-EF275965C5AC}" type="slidenum">
+              <a:rPr lang="en-US"/>
+              <a:pPr>
+                <a:defRPr/>
+              </a:pPr>
               <a:t>‹#›</a:t>
             </a:fld>
             <a:endParaRPr lang="en-US"/>
@@ -802,11 +909,20 @@
         <p:spPr/>
         <p:txBody>
           <a:bodyPr/>
-          <a:lstStyle/>
-          <a:p>
-            <a:fld id="{4804E31C-644C-C14D-AB1A-4B4F1EA69BCD}" type="datetimeFigureOut">
-              <a:rPr lang="en-US" smtClean="0"/>
-              <a:pPr/>
+          <a:lstStyle>
+            <a:lvl1pPr>
+              <a:defRPr/>
+            </a:lvl1pPr>
+          </a:lstStyle>
+          <a:p>
+            <a:pPr>
+              <a:defRPr/>
+            </a:pPr>
+            <a:fld id="{BF7B6372-9303-4B8E-A7A4-B8260465430A}" type="datetimeFigureOut">
+              <a:rPr lang="en-US"/>
+              <a:pPr>
+                <a:defRPr/>
+              </a:pPr>
               <a:t>11/25/2009</a:t>
             </a:fld>
             <a:endParaRPr lang="en-US"/>
@@ -826,8 +942,15 @@
         <p:spPr/>
         <p:txBody>
           <a:bodyPr/>
-          <a:lstStyle/>
-          <a:p>
+          <a:lstStyle>
+            <a:lvl1pPr>
+              <a:defRPr/>
+            </a:lvl1pPr>
+          </a:lstStyle>
+          <a:p>
+            <a:pPr>
+              <a:defRPr/>
+            </a:pPr>
             <a:endParaRPr lang="en-US"/>
           </a:p>
         </p:txBody>
@@ -845,11 +968,20 @@
         <p:spPr/>
         <p:txBody>
           <a:bodyPr/>
-          <a:lstStyle/>
-          <a:p>
-            <a:fld id="{C41FC688-A7A0-EC4D-912E-391576B3DEE3}" type="slidenum">
-              <a:rPr lang="en-US" smtClean="0"/>
-              <a:pPr/>
+          <a:lstStyle>
+            <a:lvl1pPr>
+              <a:defRPr/>
+            </a:lvl1pPr>
+          </a:lstStyle>
+          <a:p>
+            <a:pPr>
+              <a:defRPr/>
+            </a:pPr>
+            <a:fld id="{2E110E6F-2489-4D4C-B5DE-F0DB1718A36E}" type="slidenum">
+              <a:rPr lang="en-US"/>
+              <a:pPr>
+                <a:defRPr/>
+              </a:pPr>
               <a:t>‹#›</a:t>
             </a:fld>
             <a:endParaRPr lang="en-US"/>
@@ -1045,11 +1177,20 @@
         <p:spPr/>
         <p:txBody>
           <a:bodyPr/>
-          <a:lstStyle/>
-          <a:p>
-            <a:fld id="{4804E31C-644C-C14D-AB1A-4B4F1EA69BCD}" type="datetimeFigureOut">
-              <a:rPr lang="en-US" smtClean="0"/>
-              <a:pPr/>
+          <a:lstStyle>
+            <a:lvl1pPr>
+              <a:defRPr/>
+            </a:lvl1pPr>
+          </a:lstStyle>
+          <a:p>
+            <a:pPr>
+              <a:defRPr/>
+            </a:pPr>
+            <a:fld id="{70ECACC4-CAF6-42D6-94E3-876EEFA5F66D}" type="datetimeFigureOut">
+              <a:rPr lang="en-US"/>
+              <a:pPr>
+                <a:defRPr/>
+              </a:pPr>
               <a:t>11/25/2009</a:t>
             </a:fld>
             <a:endParaRPr lang="en-US"/>
@@ -1069,8 +1210,15 @@
         <p:spPr/>
         <p:txBody>
           <a:bodyPr/>
-          <a:lstStyle/>
-          <a:p>
+          <a:lstStyle>
+            <a:lvl1pPr>
+              <a:defRPr/>
+            </a:lvl1pPr>
+          </a:lstStyle>
+          <a:p>
+            <a:pPr>
+              <a:defRPr/>
+            </a:pPr>
             <a:endParaRPr lang="en-US"/>
           </a:p>
         </p:txBody>
@@ -1088,11 +1236,20 @@
         <p:spPr/>
         <p:txBody>
           <a:bodyPr/>
-          <a:lstStyle/>
-          <a:p>
-            <a:fld id="{C41FC688-A7A0-EC4D-912E-391576B3DEE3}" type="slidenum">
-              <a:rPr lang="en-US" smtClean="0"/>
-              <a:pPr/>
+          <a:lstStyle>
+            <a:lvl1pPr>
+              <a:defRPr/>
+            </a:lvl1pPr>
+          </a:lstStyle>
+          <a:p>
+            <a:pPr>
+              <a:defRPr/>
+            </a:pPr>
+            <a:fld id="{32209DFE-7701-4C18-864A-AC2E43390547}" type="slidenum">
+              <a:rPr lang="en-US"/>
+              <a:pPr>
+                <a:defRPr/>
+              </a:pPr>
               <a:t>‹#›</a:t>
             </a:fld>
             <a:endParaRPr lang="en-US"/>
@@ -1319,7 +1476,7 @@
       </p:sp>
       <p:sp>
         <p:nvSpPr>
-          <p:cNvPr id="5" name="Date Placeholder 4"/>
+          <p:cNvPr id="5" name="Date Placeholder 3"/>
           <p:cNvSpPr>
             <a:spLocks noGrp="1"/>
           </p:cNvSpPr>
@@ -1330,11 +1487,20 @@
         <p:spPr/>
         <p:txBody>
           <a:bodyPr/>
-          <a:lstStyle/>
-          <a:p>
-            <a:fld id="{4804E31C-644C-C14D-AB1A-4B4F1EA69BCD}" type="datetimeFigureOut">
-              <a:rPr lang="en-US" smtClean="0"/>
-              <a:pPr/>
+          <a:lstStyle>
+            <a:lvl1pPr>
+              <a:defRPr/>
+            </a:lvl1pPr>
+          </a:lstStyle>
+          <a:p>
+            <a:pPr>
+              <a:defRPr/>
+            </a:pPr>
+            <a:fld id="{9E687FBB-37AB-4968-8EB8-1032169FDC31}" type="datetimeFigureOut">
+              <a:rPr lang="en-US"/>
+              <a:pPr>
+                <a:defRPr/>
+              </a:pPr>
               <a:t>11/25/2009</a:t>
             </a:fld>
             <a:endParaRPr lang="en-US"/>
@@ -1343,7 +1509,7 @@
       </p:sp>
       <p:sp>
         <p:nvSpPr>
-          <p:cNvPr id="6" name="Footer Placeholder 5"/>
+          <p:cNvPr id="6" name="Footer Placeholder 4"/>
           <p:cNvSpPr>
             <a:spLocks noGrp="1"/>
           </p:cNvSpPr>
@@ -1354,15 +1520,22 @@
         <p:spPr/>
         <p:txBody>
           <a:bodyPr/>
-          <a:lstStyle/>
-          <a:p>
-            <a:endParaRPr lang="en-US"/>
-          </a:p>
-        </p:txBody>
-      </p:sp>
-      <p:sp>
-        <p:nvSpPr>
-          <p:cNvPr id="7" name="Slide Number Placeholder 6"/>
+          <a:lstStyle>
+            <a:lvl1pPr>
+              <a:defRPr/>
+            </a:lvl1pPr>
+          </a:lstStyle>
+          <a:p>
+            <a:pPr>
+              <a:defRPr/>
+            </a:pPr>
+            <a:endParaRPr lang="en-US"/>
+          </a:p>
+        </p:txBody>
+      </p:sp>
+      <p:sp>
+        <p:nvSpPr>
+          <p:cNvPr id="7" name="Slide Number Placeholder 5"/>
           <p:cNvSpPr>
             <a:spLocks noGrp="1"/>
           </p:cNvSpPr>
@@ -1373,11 +1546,20 @@
         <p:spPr/>
         <p:txBody>
           <a:bodyPr/>
-          <a:lstStyle/>
-          <a:p>
-            <a:fld id="{C41FC688-A7A0-EC4D-912E-391576B3DEE3}" type="slidenum">
-              <a:rPr lang="en-US" smtClean="0"/>
-              <a:pPr/>
+          <a:lstStyle>
+            <a:lvl1pPr>
+              <a:defRPr/>
+            </a:lvl1pPr>
+          </a:lstStyle>
+          <a:p>
+            <a:pPr>
+              <a:defRPr/>
+            </a:pPr>
+            <a:fld id="{468BF8FE-8ED5-47C6-A592-4C2E74EBCE10}" type="slidenum">
+              <a:rPr lang="en-US"/>
+              <a:pPr>
+                <a:defRPr/>
+              </a:pPr>
               <a:t>‹#›</a:t>
             </a:fld>
             <a:endParaRPr lang="en-US"/>
@@ -1738,7 +1920,7 @@
       </p:sp>
       <p:sp>
         <p:nvSpPr>
-          <p:cNvPr id="7" name="Date Placeholder 6"/>
+          <p:cNvPr id="7" name="Date Placeholder 3"/>
           <p:cNvSpPr>
             <a:spLocks noGrp="1"/>
           </p:cNvSpPr>
@@ -1749,11 +1931,20 @@
         <p:spPr/>
         <p:txBody>
           <a:bodyPr/>
-          <a:lstStyle/>
-          <a:p>
-            <a:fld id="{4804E31C-644C-C14D-AB1A-4B4F1EA69BCD}" type="datetimeFigureOut">
-              <a:rPr lang="en-US" smtClean="0"/>
-              <a:pPr/>
+          <a:lstStyle>
+            <a:lvl1pPr>
+              <a:defRPr/>
+            </a:lvl1pPr>
+          </a:lstStyle>
+          <a:p>
+            <a:pPr>
+              <a:defRPr/>
+            </a:pPr>
+            <a:fld id="{C8543A23-0641-4488-B566-2D9338073F83}" type="datetimeFigureOut">
+              <a:rPr lang="en-US"/>
+              <a:pPr>
+                <a:defRPr/>
+              </a:pPr>
               <a:t>11/25/2009</a:t>
             </a:fld>
             <a:endParaRPr lang="en-US"/>
@@ -1762,7 +1953,7 @@
       </p:sp>
       <p:sp>
         <p:nvSpPr>
-          <p:cNvPr id="8" name="Footer Placeholder 7"/>
+          <p:cNvPr id="8" name="Footer Placeholder 4"/>
           <p:cNvSpPr>
             <a:spLocks noGrp="1"/>
           </p:cNvSpPr>
@@ -1773,15 +1964,22 @@
         <p:spPr/>
         <p:txBody>
           <a:bodyPr/>
-          <a:lstStyle/>
-          <a:p>
-            <a:endParaRPr lang="en-US"/>
-          </a:p>
-        </p:txBody>
-      </p:sp>
-      <p:sp>
-        <p:nvSpPr>
-          <p:cNvPr id="9" name="Slide Number Placeholder 8"/>
+          <a:lstStyle>
+            <a:lvl1pPr>
+              <a:defRPr/>
+            </a:lvl1pPr>
+          </a:lstStyle>
+          <a:p>
+            <a:pPr>
+              <a:defRPr/>
+            </a:pPr>
+            <a:endParaRPr lang="en-US"/>
+          </a:p>
+        </p:txBody>
+      </p:sp>
+      <p:sp>
+        <p:nvSpPr>
+          <p:cNvPr id="9" name="Slide Number Placeholder 5"/>
           <p:cNvSpPr>
             <a:spLocks noGrp="1"/>
           </p:cNvSpPr>
@@ -1792,11 +1990,20 @@
         <p:spPr/>
         <p:txBody>
           <a:bodyPr/>
-          <a:lstStyle/>
-          <a:p>
-            <a:fld id="{C41FC688-A7A0-EC4D-912E-391576B3DEE3}" type="slidenum">
-              <a:rPr lang="en-US" smtClean="0"/>
-              <a:pPr/>
+          <a:lstStyle>
+            <a:lvl1pPr>
+              <a:defRPr/>
+            </a:lvl1pPr>
+          </a:lstStyle>
+          <a:p>
+            <a:pPr>
+              <a:defRPr/>
+            </a:pPr>
+            <a:fld id="{315CD9D5-45EB-4129-9FD3-C2D06B4CC452}" type="slidenum">
+              <a:rPr lang="en-US"/>
+              <a:pPr>
+                <a:defRPr/>
+              </a:pPr>
               <a:t>‹#›</a:t>
             </a:fld>
             <a:endParaRPr lang="en-US"/>
@@ -1853,7 +2060,7 @@
       </p:sp>
       <p:sp>
         <p:nvSpPr>
-          <p:cNvPr id="3" name="Date Placeholder 2"/>
+          <p:cNvPr id="3" name="Date Placeholder 3"/>
           <p:cNvSpPr>
             <a:spLocks noGrp="1"/>
           </p:cNvSpPr>
@@ -1864,11 +2071,20 @@
         <p:spPr/>
         <p:txBody>
           <a:bodyPr/>
-          <a:lstStyle/>
-          <a:p>
-            <a:fld id="{4804E31C-644C-C14D-AB1A-4B4F1EA69BCD}" type="datetimeFigureOut">
-              <a:rPr lang="en-US" smtClean="0"/>
-              <a:pPr/>
+          <a:lstStyle>
+            <a:lvl1pPr>
+              <a:defRPr/>
+            </a:lvl1pPr>
+          </a:lstStyle>
+          <a:p>
+            <a:pPr>
+              <a:defRPr/>
+            </a:pPr>
+            <a:fld id="{18E2F3B4-77B0-424A-886C-6BBB33A70A5A}" type="datetimeFigureOut">
+              <a:rPr lang="en-US"/>
+              <a:pPr>
+                <a:defRPr/>
+              </a:pPr>
               <a:t>11/25/2009</a:t>
             </a:fld>
             <a:endParaRPr lang="en-US"/>
@@ -1877,7 +2093,7 @@
       </p:sp>
       <p:sp>
         <p:nvSpPr>
-          <p:cNvPr id="4" name="Footer Placeholder 3"/>
+          <p:cNvPr id="4" name="Footer Placeholder 4"/>
           <p:cNvSpPr>
             <a:spLocks noGrp="1"/>
           </p:cNvSpPr>
@@ -1888,15 +2104,22 @@
         <p:spPr/>
         <p:txBody>
           <a:bodyPr/>
-          <a:lstStyle/>
-          <a:p>
-            <a:endParaRPr lang="en-US"/>
-          </a:p>
-        </p:txBody>
-      </p:sp>
-      <p:sp>
-        <p:nvSpPr>
-          <p:cNvPr id="5" name="Slide Number Placeholder 4"/>
+          <a:lstStyle>
+            <a:lvl1pPr>
+              <a:defRPr/>
+            </a:lvl1pPr>
+          </a:lstStyle>
+          <a:p>
+            <a:pPr>
+              <a:defRPr/>
+            </a:pPr>
+            <a:endParaRPr lang="en-US"/>
+          </a:p>
+        </p:txBody>
+      </p:sp>
+      <p:sp>
+        <p:nvSpPr>
+          <p:cNvPr id="5" name="Slide Number Placeholder 5"/>
           <p:cNvSpPr>
             <a:spLocks noGrp="1"/>
           </p:cNvSpPr>
@@ -1907,11 +2130,20 @@
         <p:spPr/>
         <p:txBody>
           <a:bodyPr/>
-          <a:lstStyle/>
-          <a:p>
-            <a:fld id="{C41FC688-A7A0-EC4D-912E-391576B3DEE3}" type="slidenum">
-              <a:rPr lang="en-US" smtClean="0"/>
-              <a:pPr/>
+          <a:lstStyle>
+            <a:lvl1pPr>
+              <a:defRPr/>
+            </a:lvl1pPr>
+          </a:lstStyle>
+          <a:p>
+            <a:pPr>
+              <a:defRPr/>
+            </a:pPr>
+            <a:fld id="{6CB1BB68-A6E7-4B1A-8434-806A13F55648}" type="slidenum">
+              <a:rPr lang="en-US"/>
+              <a:pPr>
+                <a:defRPr/>
+              </a:pPr>
               <a:t>‹#›</a:t>
             </a:fld>
             <a:endParaRPr lang="en-US"/>
@@ -1945,7 +2177,7 @@
       </p:grpSpPr>
       <p:sp>
         <p:nvSpPr>
-          <p:cNvPr id="2" name="Date Placeholder 1"/>
+          <p:cNvPr id="2" name="Date Placeholder 3"/>
           <p:cNvSpPr>
             <a:spLocks noGrp="1"/>
           </p:cNvSpPr>
@@ -1956,11 +2188,20 @@
         <p:spPr/>
         <p:txBody>
           <a:bodyPr/>
-          <a:lstStyle/>
-          <a:p>
-            <a:fld id="{4804E31C-644C-C14D-AB1A-4B4F1EA69BCD}" type="datetimeFigureOut">
-              <a:rPr lang="en-US" smtClean="0"/>
-              <a:pPr/>
+          <a:lstStyle>
+            <a:lvl1pPr>
+              <a:defRPr/>
+            </a:lvl1pPr>
+          </a:lstStyle>
+          <a:p>
+            <a:pPr>
+              <a:defRPr/>
+            </a:pPr>
+            <a:fld id="{4A2C5E32-A612-4027-BF96-BCB4B300730C}" type="datetimeFigureOut">
+              <a:rPr lang="en-US"/>
+              <a:pPr>
+                <a:defRPr/>
+              </a:pPr>
               <a:t>11/25/2009</a:t>
             </a:fld>
             <a:endParaRPr lang="en-US"/>
@@ -1969,7 +2210,7 @@
       </p:sp>
       <p:sp>
         <p:nvSpPr>
-          <p:cNvPr id="3" name="Footer Placeholder 2"/>
+          <p:cNvPr id="3" name="Footer Placeholder 4"/>
           <p:cNvSpPr>
             <a:spLocks noGrp="1"/>
           </p:cNvSpPr>
@@ -1980,15 +2221,22 @@
         <p:spPr/>
         <p:txBody>
           <a:bodyPr/>
-          <a:lstStyle/>
-          <a:p>
-            <a:endParaRPr lang="en-US"/>
-          </a:p>
-        </p:txBody>
-      </p:sp>
-      <p:sp>
-        <p:nvSpPr>
-          <p:cNvPr id="4" name="Slide Number Placeholder 3"/>
+          <a:lstStyle>
+            <a:lvl1pPr>
+              <a:defRPr/>
+            </a:lvl1pPr>
+          </a:lstStyle>
+          <a:p>
+            <a:pPr>
+              <a:defRPr/>
+            </a:pPr>
+            <a:endParaRPr lang="en-US"/>
+          </a:p>
+        </p:txBody>
+      </p:sp>
+      <p:sp>
+        <p:nvSpPr>
+          <p:cNvPr id="4" name="Slide Number Placeholder 5"/>
           <p:cNvSpPr>
             <a:spLocks noGrp="1"/>
           </p:cNvSpPr>
@@ -1999,11 +2247,20 @@
         <p:spPr/>
         <p:txBody>
           <a:bodyPr/>
-          <a:lstStyle/>
-          <a:p>
-            <a:fld id="{C41FC688-A7A0-EC4D-912E-391576B3DEE3}" type="slidenum">
-              <a:rPr lang="en-US" smtClean="0"/>
-              <a:pPr/>
+          <a:lstStyle>
+            <a:lvl1pPr>
+              <a:defRPr/>
+            </a:lvl1pPr>
+          </a:lstStyle>
+          <a:p>
+            <a:pPr>
+              <a:defRPr/>
+            </a:pPr>
+            <a:fld id="{A391B649-7F95-4BE0-85D7-EA48C29DAA96}" type="slidenum">
+              <a:rPr lang="en-US"/>
+              <a:pPr>
+                <a:defRPr/>
+              </a:pPr>
               <a:t>‹#›</a:t>
             </a:fld>
             <a:endParaRPr lang="en-US"/>
@@ -2219,7 +2476,7 @@
       </p:sp>
       <p:sp>
         <p:nvSpPr>
-          <p:cNvPr id="5" name="Date Placeholder 4"/>
+          <p:cNvPr id="5" name="Date Placeholder 3"/>
           <p:cNvSpPr>
             <a:spLocks noGrp="1"/>
           </p:cNvSpPr>
@@ -2230,11 +2487,20 @@
         <p:spPr/>
         <p:txBody>
           <a:bodyPr/>
-          <a:lstStyle/>
-          <a:p>
-            <a:fld id="{4804E31C-644C-C14D-AB1A-4B4F1EA69BCD}" type="datetimeFigureOut">
-              <a:rPr lang="en-US" smtClean="0"/>
-              <a:pPr/>
+          <a:lstStyle>
+            <a:lvl1pPr>
+              <a:defRPr/>
+            </a:lvl1pPr>
+          </a:lstStyle>
+          <a:p>
+            <a:pPr>
+              <a:defRPr/>
+            </a:pPr>
+            <a:fld id="{4DFCCA90-17BA-40D5-AEB9-AC9B0138C73D}" type="datetimeFigureOut">
+              <a:rPr lang="en-US"/>
+              <a:pPr>
+                <a:defRPr/>
+              </a:pPr>
               <a:t>11/25/2009</a:t>
             </a:fld>
             <a:endParaRPr lang="en-US"/>
@@ -2243,7 +2509,7 @@
       </p:sp>
       <p:sp>
         <p:nvSpPr>
-          <p:cNvPr id="6" name="Footer Placeholder 5"/>
+          <p:cNvPr id="6" name="Footer Placeholder 4"/>
           <p:cNvSpPr>
             <a:spLocks noGrp="1"/>
           </p:cNvSpPr>
@@ -2254,15 +2520,22 @@
         <p:spPr/>
         <p:txBody>
           <a:bodyPr/>
-          <a:lstStyle/>
-          <a:p>
-            <a:endParaRPr lang="en-US"/>
-          </a:p>
-        </p:txBody>
-      </p:sp>
-      <p:sp>
-        <p:nvSpPr>
-          <p:cNvPr id="7" name="Slide Number Placeholder 6"/>
+          <a:lstStyle>
+            <a:lvl1pPr>
+              <a:defRPr/>
+            </a:lvl1pPr>
+          </a:lstStyle>
+          <a:p>
+            <a:pPr>
+              <a:defRPr/>
+            </a:pPr>
+            <a:endParaRPr lang="en-US"/>
+          </a:p>
+        </p:txBody>
+      </p:sp>
+      <p:sp>
+        <p:nvSpPr>
+          <p:cNvPr id="7" name="Slide Number Placeholder 5"/>
           <p:cNvSpPr>
             <a:spLocks noGrp="1"/>
           </p:cNvSpPr>
@@ -2273,11 +2546,20 @@
         <p:spPr/>
         <p:txBody>
           <a:bodyPr/>
-          <a:lstStyle/>
-          <a:p>
-            <a:fld id="{C41FC688-A7A0-EC4D-912E-391576B3DEE3}" type="slidenum">
-              <a:rPr lang="en-US" smtClean="0"/>
-              <a:pPr/>
+          <a:lstStyle>
+            <a:lvl1pPr>
+              <a:defRPr/>
+            </a:lvl1pPr>
+          </a:lstStyle>
+          <a:p>
+            <a:pPr>
+              <a:defRPr/>
+            </a:pPr>
+            <a:fld id="{AE996FB6-9F87-4ECD-934C-A2B4B8BECB12}" type="slidenum">
+              <a:rPr lang="en-US"/>
+              <a:pPr>
+                <a:defRPr/>
+              </a:pPr>
               <a:t>‹#›</a:t>
             </a:fld>
             <a:endParaRPr lang="en-US"/>
@@ -2358,7 +2640,9 @@
           </a:xfrm>
         </p:spPr>
         <p:txBody>
-          <a:bodyPr/>
+          <a:bodyPr rtlCol="0">
+            <a:normAutofit/>
+          </a:bodyPr>
           <a:lstStyle>
             <a:lvl1pPr marL="0" indent="0">
               <a:buNone/>
@@ -2398,7 +2682,8 @@
             </a:lvl9pPr>
           </a:lstStyle>
           <a:p>
-            <a:endParaRPr lang="en-US"/>
+            <a:pPr lvl="0"/>
+            <a:endParaRPr lang="en-US" noProof="0"/>
           </a:p>
         </p:txBody>
       </p:sp>
@@ -2469,7 +2754,7 @@
       </p:sp>
       <p:sp>
         <p:nvSpPr>
-          <p:cNvPr id="5" name="Date Placeholder 4"/>
+          <p:cNvPr id="5" name="Date Placeholder 3"/>
           <p:cNvSpPr>
             <a:spLocks noGrp="1"/>
           </p:cNvSpPr>
@@ -2480,11 +2765,20 @@
         <p:spPr/>
         <p:txBody>
           <a:bodyPr/>
-          <a:lstStyle/>
-          <a:p>
-            <a:fld id="{4804E31C-644C-C14D-AB1A-4B4F1EA69BCD}" type="datetimeFigureOut">
-              <a:rPr lang="en-US" smtClean="0"/>
-              <a:pPr/>
+          <a:lstStyle>
+            <a:lvl1pPr>
+              <a:defRPr/>
+            </a:lvl1pPr>
+          </a:lstStyle>
+          <a:p>
+            <a:pPr>
+              <a:defRPr/>
+            </a:pPr>
+            <a:fld id="{EFF82B08-68DA-4BE2-A739-FBB17D532FB8}" type="datetimeFigureOut">
+              <a:rPr lang="en-US"/>
+              <a:pPr>
+                <a:defRPr/>
+              </a:pPr>
               <a:t>11/25/2009</a:t>
             </a:fld>
             <a:endParaRPr lang="en-US"/>
@@ -2493,7 +2787,7 @@
       </p:sp>
       <p:sp>
         <p:nvSpPr>
-          <p:cNvPr id="6" name="Footer Placeholder 5"/>
+          <p:cNvPr id="6" name="Footer Placeholder 4"/>
           <p:cNvSpPr>
             <a:spLocks noGrp="1"/>
           </p:cNvSpPr>
@@ -2504,15 +2798,22 @@
         <p:spPr/>
         <p:txBody>
           <a:bodyPr/>
-          <a:lstStyle/>
-          <a:p>
-            <a:endParaRPr lang="en-US"/>
-          </a:p>
-        </p:txBody>
-      </p:sp>
-      <p:sp>
-        <p:nvSpPr>
-          <p:cNvPr id="7" name="Slide Number Placeholder 6"/>
+          <a:lstStyle>
+            <a:lvl1pPr>
+              <a:defRPr/>
+            </a:lvl1pPr>
+          </a:lstStyle>
+          <a:p>
+            <a:pPr>
+              <a:defRPr/>
+            </a:pPr>
+            <a:endParaRPr lang="en-US"/>
+          </a:p>
+        </p:txBody>
+      </p:sp>
+      <p:sp>
+        <p:nvSpPr>
+          <p:cNvPr id="7" name="Slide Number Placeholder 5"/>
           <p:cNvSpPr>
             <a:spLocks noGrp="1"/>
           </p:cNvSpPr>
@@ -2523,11 +2824,20 @@
         <p:spPr/>
         <p:txBody>
           <a:bodyPr/>
-          <a:lstStyle/>
-          <a:p>
-            <a:fld id="{C41FC688-A7A0-EC4D-912E-391576B3DEE3}" type="slidenum">
-              <a:rPr lang="en-US" smtClean="0"/>
-              <a:pPr/>
+          <a:lstStyle>
+            <a:lvl1pPr>
+              <a:defRPr/>
+            </a:lvl1pPr>
+          </a:lstStyle>
+          <a:p>
+            <a:pPr>
+              <a:defRPr/>
+            </a:pPr>
+            <a:fld id="{4310EC16-3EA2-400F-A994-25349EA412A6}" type="slidenum">
+              <a:rPr lang="en-US"/>
+              <a:pPr>
+                <a:defRPr/>
+              </a:pPr>
               <a:t>‹#›</a:t>
             </a:fld>
             <a:endParaRPr lang="en-US"/>
@@ -2566,7 +2876,7 @@
       </p:grpSpPr>
       <p:sp>
         <p:nvSpPr>
-          <p:cNvPr id="2" name="Title Placeholder 1"/>
+          <p:cNvPr id="1026" name="Title Placeholder 1"/>
           <p:cNvSpPr>
             <a:spLocks noGrp="1"/>
           </p:cNvSpPr>
@@ -2574,7 +2884,7 @@
             <p:ph type="title"/>
           </p:nvPr>
         </p:nvSpPr>
-        <p:spPr>
+        <p:spPr bwMode="auto">
           <a:xfrm>
             <a:off x="457200" y="274638"/>
             <a:ext cx="8229600" cy="1143000"/>
@@ -2582,24 +2892,33 @@
           <a:prstGeom prst="rect">
             <a:avLst/>
           </a:prstGeom>
+          <a:noFill/>
+          <a:ln w="9525">
+            <a:noFill/>
+            <a:miter lim="800000"/>
+            <a:headEnd/>
+            <a:tailEnd/>
+          </a:ln>
         </p:spPr>
         <p:txBody>
-          <a:bodyPr vert="horz" lIns="91440" tIns="45720" rIns="91440" bIns="45720" rtlCol="0" anchor="ctr">
-            <a:normAutofit/>
+          <a:bodyPr vert="horz" wrap="square" lIns="91440" tIns="45720" rIns="91440" bIns="45720" numCol="1" anchor="ctr" anchorCtr="0" compatLnSpc="1">
+            <a:prstTxWarp prst="textNoShape">
+              <a:avLst/>
+            </a:prstTxWarp>
           </a:bodyPr>
           <a:lstStyle/>
           <a:p>
+            <a:pPr lvl="0"/>
             <a:r>
               <a:rPr lang="en-US" smtClean="0"/>
               <a:t>Click to edit Master title style</a:t>
             </a:r>
-            <a:endParaRPr lang="en-US"/>
-          </a:p>
-        </p:txBody>
-      </p:sp>
-      <p:sp>
-        <p:nvSpPr>
-          <p:cNvPr id="3" name="Text Placeholder 2"/>
+          </a:p>
+        </p:txBody>
+      </p:sp>
+      <p:sp>
+        <p:nvSpPr>
+          <p:cNvPr id="1027" name="Text Placeholder 2"/>
           <p:cNvSpPr>
             <a:spLocks noGrp="1"/>
           </p:cNvSpPr>
@@ -2607,7 +2926,7 @@
             <p:ph type="body" idx="1"/>
           </p:nvPr>
         </p:nvSpPr>
-        <p:spPr>
+        <p:spPr bwMode="auto">
           <a:xfrm>
             <a:off x="457200" y="1600200"/>
             <a:ext cx="8229600" cy="4525963"/>
@@ -2615,10 +2934,19 @@
           <a:prstGeom prst="rect">
             <a:avLst/>
           </a:prstGeom>
+          <a:noFill/>
+          <a:ln w="9525">
+            <a:noFill/>
+            <a:miter lim="800000"/>
+            <a:headEnd/>
+            <a:tailEnd/>
+          </a:ln>
         </p:spPr>
         <p:txBody>
-          <a:bodyPr vert="horz" lIns="91440" tIns="45720" rIns="91440" bIns="45720" rtlCol="0">
-            <a:normAutofit/>
+          <a:bodyPr vert="horz" wrap="square" lIns="91440" tIns="45720" rIns="91440" bIns="45720" numCol="1" anchor="t" anchorCtr="0" compatLnSpc="1">
+            <a:prstTxWarp prst="textNoShape">
+              <a:avLst/>
+            </a:prstTxWarp>
           </a:bodyPr>
           <a:lstStyle/>
           <a:p>
@@ -2655,7 +2983,6 @@
               <a:rPr lang="en-US" smtClean="0"/>
               <a:t>Fifth level</a:t>
             </a:r>
-            <a:endParaRPr lang="en-US"/>
           </a:p>
         </p:txBody>
       </p:sp>
@@ -2681,20 +3008,33 @@
         <p:txBody>
           <a:bodyPr vert="horz" lIns="91440" tIns="45720" rIns="91440" bIns="45720" rtlCol="0" anchor="ctr"/>
           <a:lstStyle>
-            <a:lvl1pPr algn="l">
-              <a:defRPr sz="1200">
+            <a:lvl1pPr algn="l" fontAlgn="auto">
+              <a:spcBef>
+                <a:spcPts val="0"/>
+              </a:spcBef>
+              <a:spcAft>
+                <a:spcPts val="0"/>
+              </a:spcAft>
+              <a:defRPr sz="1200" smtClean="0">
                 <a:solidFill>
                   <a:schemeClr val="tx1">
                     <a:tint val="75000"/>
                   </a:schemeClr>
                 </a:solidFill>
+                <a:latin typeface="+mn-lt"/>
+                <a:cs typeface="+mn-cs"/>
               </a:defRPr>
             </a:lvl1pPr>
           </a:lstStyle>
           <a:p>
-            <a:fld id="{4804E31C-644C-C14D-AB1A-4B4F1EA69BCD}" type="datetimeFigureOut">
-              <a:rPr lang="en-US" smtClean="0"/>
-              <a:pPr/>
+            <a:pPr>
+              <a:defRPr/>
+            </a:pPr>
+            <a:fld id="{F8473097-6E43-453B-B46F-ED78E5A0C7CB}" type="datetimeFigureOut">
+              <a:rPr lang="en-US"/>
+              <a:pPr>
+                <a:defRPr/>
+              </a:pPr>
               <a:t>11/25/2009</a:t>
             </a:fld>
             <a:endParaRPr lang="en-US"/>
@@ -2723,17 +3063,28 @@
         <p:txBody>
           <a:bodyPr vert="horz" lIns="91440" tIns="45720" rIns="91440" bIns="45720" rtlCol="0" anchor="ctr"/>
           <a:lstStyle>
-            <a:lvl1pPr algn="ctr">
+            <a:lvl1pPr algn="ctr" fontAlgn="auto">
+              <a:spcBef>
+                <a:spcPts val="0"/>
+              </a:spcBef>
+              <a:spcAft>
+                <a:spcPts val="0"/>
+              </a:spcAft>
               <a:defRPr sz="1200">
                 <a:solidFill>
                   <a:schemeClr val="tx1">
                     <a:tint val="75000"/>
                   </a:schemeClr>
                 </a:solidFill>
+                <a:latin typeface="+mn-lt"/>
+                <a:cs typeface="+mn-cs"/>
               </a:defRPr>
             </a:lvl1pPr>
           </a:lstStyle>
           <a:p>
+            <a:pPr>
+              <a:defRPr/>
+            </a:pPr>
             <a:endParaRPr lang="en-US"/>
           </a:p>
         </p:txBody>
@@ -2760,20 +3111,33 @@
         <p:txBody>
           <a:bodyPr vert="horz" lIns="91440" tIns="45720" rIns="91440" bIns="45720" rtlCol="0" anchor="ctr"/>
           <a:lstStyle>
-            <a:lvl1pPr algn="r">
-              <a:defRPr sz="1200">
+            <a:lvl1pPr algn="r" fontAlgn="auto">
+              <a:spcBef>
+                <a:spcPts val="0"/>
+              </a:spcBef>
+              <a:spcAft>
+                <a:spcPts val="0"/>
+              </a:spcAft>
+              <a:defRPr sz="1200" smtClean="0">
                 <a:solidFill>
                   <a:schemeClr val="tx1">
                     <a:tint val="75000"/>
                   </a:schemeClr>
                 </a:solidFill>
+                <a:latin typeface="+mn-lt"/>
+                <a:cs typeface="+mn-cs"/>
               </a:defRPr>
             </a:lvl1pPr>
           </a:lstStyle>
           <a:p>
-            <a:fld id="{C41FC688-A7A0-EC4D-912E-391576B3DEE3}" type="slidenum">
-              <a:rPr lang="en-US" smtClean="0"/>
-              <a:pPr/>
+            <a:pPr>
+              <a:defRPr/>
+            </a:pPr>
+            <a:fld id="{E1339BF3-1035-437C-B3C6-4CBA31400BF5}" type="slidenum">
+              <a:rPr lang="en-US"/>
+              <a:pPr>
+                <a:defRPr/>
+              </a:pPr>
               <a:t>‹#›</a:t>
             </a:fld>
             <a:endParaRPr lang="en-US"/>
@@ -2798,11 +3162,13 @@
   </p:sldLayoutIdLst>
   <p:txStyles>
     <p:titleStyle>
-      <a:lvl1pPr algn="ctr" defTabSz="457200" rtl="0" eaLnBrk="1" latinLnBrk="0" hangingPunct="1">
+      <a:lvl1pPr algn="ctr" defTabSz="457200" rtl="0" fontAlgn="base">
         <a:spcBef>
           <a:spcPct val="0"/>
         </a:spcBef>
-        <a:buNone/>
+        <a:spcAft>
+          <a:spcPct val="0"/>
+        </a:spcAft>
         <a:defRPr sz="4400" kern="1200">
           <a:solidFill>
             <a:schemeClr val="tx1"/>
@@ -2812,13 +3178,128 @@
           <a:cs typeface="+mj-cs"/>
         </a:defRPr>
       </a:lvl1pPr>
+      <a:lvl2pPr algn="ctr" defTabSz="457200" rtl="0" fontAlgn="base">
+        <a:spcBef>
+          <a:spcPct val="0"/>
+        </a:spcBef>
+        <a:spcAft>
+          <a:spcPct val="0"/>
+        </a:spcAft>
+        <a:defRPr sz="4400">
+          <a:solidFill>
+            <a:schemeClr val="tx1"/>
+          </a:solidFill>
+          <a:latin typeface="Calibri" pitchFamily="34" charset="0"/>
+        </a:defRPr>
+      </a:lvl2pPr>
+      <a:lvl3pPr algn="ctr" defTabSz="457200" rtl="0" fontAlgn="base">
+        <a:spcBef>
+          <a:spcPct val="0"/>
+        </a:spcBef>
+        <a:spcAft>
+          <a:spcPct val="0"/>
+        </a:spcAft>
+        <a:defRPr sz="4400">
+          <a:solidFill>
+            <a:schemeClr val="tx1"/>
+          </a:solidFill>
+          <a:latin typeface="Calibri" pitchFamily="34" charset="0"/>
+        </a:defRPr>
+      </a:lvl3pPr>
+      <a:lvl4pPr algn="ctr" defTabSz="457200" rtl="0" fontAlgn="base">
+        <a:spcBef>
+          <a:spcPct val="0"/>
+        </a:spcBef>
+        <a:spcAft>
+          <a:spcPct val="0"/>
+        </a:spcAft>
+        <a:defRPr sz="4400">
+          <a:solidFill>
+            <a:schemeClr val="tx1"/>
+          </a:solidFill>
+          <a:latin typeface="Calibri" pitchFamily="34" charset="0"/>
+        </a:defRPr>
+      </a:lvl4pPr>
+      <a:lvl5pPr algn="ctr" defTabSz="457200" rtl="0" fontAlgn="base">
+        <a:spcBef>
+          <a:spcPct val="0"/>
+        </a:spcBef>
+        <a:spcAft>
+          <a:spcPct val="0"/>
+        </a:spcAft>
+        <a:defRPr sz="4400">
+          <a:solidFill>
+            <a:schemeClr val="tx1"/>
+          </a:solidFill>
+          <a:latin typeface="Calibri" pitchFamily="34" charset="0"/>
+        </a:defRPr>
+      </a:lvl5pPr>
+      <a:lvl6pPr marL="457200" algn="ctr" defTabSz="457200" rtl="0" fontAlgn="base">
+        <a:spcBef>
+          <a:spcPct val="0"/>
+        </a:spcBef>
+        <a:spcAft>
+          <a:spcPct val="0"/>
+        </a:spcAft>
+        <a:defRPr sz="4400">
+          <a:solidFill>
+            <a:schemeClr val="tx1"/>
+          </a:solidFill>
+          <a:latin typeface="Calibri" pitchFamily="34" charset="0"/>
+        </a:defRPr>
+      </a:lvl6pPr>
+      <a:lvl7pPr marL="914400" algn="ctr" defTabSz="457200" rtl="0" fontAlgn="base">
+        <a:spcBef>
+          <a:spcPct val="0"/>
+        </a:spcBef>
+        <a:spcAft>
+          <a:spcPct val="0"/>
+        </a:spcAft>
+        <a:defRPr sz="4400">
+          <a:solidFill>
+            <a:schemeClr val="tx1"/>
+          </a:solidFill>
+          <a:latin typeface="Calibri" pitchFamily="34" charset="0"/>
+        </a:defRPr>
+      </a:lvl7pPr>
+      <a:lvl8pPr marL="1371600" algn="ctr" defTabSz="457200" rtl="0" fontAlgn="base">
+        <a:spcBef>
+          <a:spcPct val="0"/>
+        </a:spcBef>
+        <a:spcAft>
+          <a:spcPct val="0"/>
+        </a:spcAft>
+        <a:defRPr sz="4400">
+          <a:solidFill>
+            <a:schemeClr val="tx1"/>
+          </a:solidFill>
+          <a:latin typeface="Calibri" pitchFamily="34" charset="0"/>
+        </a:defRPr>
+      </a:lvl8pPr>
+      <a:lvl9pPr marL="1828800" algn="ctr" defTabSz="457200" rtl="0" fontAlgn="base">
+        <a:spcBef>
+          <a:spcPct val="0"/>
+        </a:spcBef>
+        <a:spcAft>
+          <a:spcPct val="0"/>
+        </a:spcAft>
+        <a:defRPr sz="4400">
+          <a:solidFill>
+            <a:schemeClr val="tx1"/>
+          </a:solidFill>
+          <a:latin typeface="Calibri" pitchFamily="34" charset="0"/>
+        </a:defRPr>
+      </a:lvl9pPr>
     </p:titleStyle>
     <p:bodyStyle>
-      <a:lvl1pPr marL="342900" indent="-342900" algn="l" defTabSz="457200" rtl="0" eaLnBrk="1" latinLnBrk="0" hangingPunct="1">
+      <a:lvl1pPr marL="342900" indent="-342900" algn="l" defTabSz="457200" rtl="0" fontAlgn="base">
         <a:spcBef>
           <a:spcPct val="20000"/>
         </a:spcBef>
-        <a:buFont typeface="Arial"/>
+        <a:spcAft>
+          <a:spcPct val="0"/>
+        </a:spcAft>
+        <a:buFont typeface="Arial" charset="0"/>
         <a:buChar char="•"/>
         <a:defRPr sz="3200" kern="1200">
           <a:solidFill>
@@ -2829,11 +3310,14 @@
           <a:cs typeface="+mn-cs"/>
         </a:defRPr>
       </a:lvl1pPr>
-      <a:lvl2pPr marL="742950" indent="-285750" algn="l" defTabSz="457200" rtl="0" eaLnBrk="1" latinLnBrk="0" hangingPunct="1">
+      <a:lvl2pPr marL="742950" indent="-285750" algn="l" defTabSz="457200" rtl="0" fontAlgn="base">
         <a:spcBef>
           <a:spcPct val="20000"/>
         </a:spcBef>
-        <a:buFont typeface="Arial"/>
+        <a:spcAft>
+          <a:spcPct val="0"/>
+        </a:spcAft>
+        <a:buFont typeface="Arial" charset="0"/>
         <a:buChar char="–"/>
         <a:defRPr sz="2800" kern="1200">
           <a:solidFill>
@@ -2844,11 +3328,14 @@
           <a:cs typeface="+mn-cs"/>
         </a:defRPr>
       </a:lvl2pPr>
-      <a:lvl3pPr marL="1143000" indent="-228600" algn="l" defTabSz="457200" rtl="0" eaLnBrk="1" latinLnBrk="0" hangingPunct="1">
+      <a:lvl3pPr marL="1143000" indent="-228600" algn="l" defTabSz="457200" rtl="0" fontAlgn="base">
         <a:spcBef>
           <a:spcPct val="20000"/>
         </a:spcBef>
-        <a:buFont typeface="Arial"/>
+        <a:spcAft>
+          <a:spcPct val="0"/>
+        </a:spcAft>
+        <a:buFont typeface="Arial" charset="0"/>
         <a:buChar char="•"/>
         <a:defRPr sz="2400" kern="1200">
           <a:solidFill>
@@ -2859,11 +3346,14 @@
           <a:cs typeface="+mn-cs"/>
         </a:defRPr>
       </a:lvl3pPr>
-      <a:lvl4pPr marL="1600200" indent="-228600" algn="l" defTabSz="457200" rtl="0" eaLnBrk="1" latinLnBrk="0" hangingPunct="1">
+      <a:lvl4pPr marL="1600200" indent="-228600" algn="l" defTabSz="457200" rtl="0" fontAlgn="base">
         <a:spcBef>
           <a:spcPct val="20000"/>
         </a:spcBef>
-        <a:buFont typeface="Arial"/>
+        <a:spcAft>
+          <a:spcPct val="0"/>
+        </a:spcAft>
+        <a:buFont typeface="Arial" charset="0"/>
         <a:buChar char="–"/>
         <a:defRPr sz="2000" kern="1200">
           <a:solidFill>
@@ -2874,11 +3364,14 @@
           <a:cs typeface="+mn-cs"/>
         </a:defRPr>
       </a:lvl4pPr>
-      <a:lvl5pPr marL="2057400" indent="-228600" algn="l" defTabSz="457200" rtl="0" eaLnBrk="1" latinLnBrk="0" hangingPunct="1">
+      <a:lvl5pPr marL="2057400" indent="-228600" algn="l" defTabSz="457200" rtl="0" fontAlgn="base">
         <a:spcBef>
           <a:spcPct val="20000"/>
         </a:spcBef>
-        <a:buFont typeface="Arial"/>
+        <a:spcAft>
+          <a:spcPct val="0"/>
+        </a:spcAft>
+        <a:buFont typeface="Arial" charset="0"/>
         <a:buChar char="»"/>
         <a:defRPr sz="2000" kern="1200">
           <a:solidFill>
@@ -3068,7 +3561,7 @@
       </p:grpSpPr>
       <p:sp>
         <p:nvSpPr>
-          <p:cNvPr id="7" name="Title 6"/>
+          <p:cNvPr id="13313" name="Title 6"/>
           <p:cNvSpPr>
             <a:spLocks noGrp="1"/>
           </p:cNvSpPr>
@@ -3082,16 +3575,15 @@
           <a:lstStyle/>
           <a:p>
             <a:r>
-              <a:rPr lang="en-US" dirty="0" smtClean="0"/>
+              <a:rPr lang="en-US" smtClean="0"/>
               <a:t>Frames Theme</a:t>
             </a:r>
-            <a:endParaRPr lang="en-US" dirty="0"/>
-          </a:p>
-        </p:txBody>
-      </p:sp>
-      <p:sp>
-        <p:nvSpPr>
-          <p:cNvPr id="8" name="Content Placeholder 7"/>
+          </a:p>
+        </p:txBody>
+      </p:sp>
+      <p:sp>
+        <p:nvSpPr>
+          <p:cNvPr id="13314" name="Content Placeholder 7"/>
           <p:cNvSpPr>
             <a:spLocks noGrp="1"/>
           </p:cNvSpPr>
@@ -3105,13 +3597,13 @@
           <a:lstStyle/>
           <a:p>
             <a:r>
-              <a:rPr lang="en-US" dirty="0" smtClean="0"/>
+              <a:rPr lang="en-US" smtClean="0"/>
               <a:t>Functionality/Design</a:t>
             </a:r>
           </a:p>
           <a:p>
             <a:r>
-              <a:rPr lang="en-US" dirty="0" smtClean="0"/>
+              <a:rPr lang="en-US" smtClean="0"/>
               <a:t>Implementation</a:t>
             </a:r>
           </a:p>
@@ -3122,6 +3614,668 @@
   <p:clrMapOvr>
     <a:masterClrMapping/>
   </p:clrMapOvr>
+</p:sld>
+</file>
+
+<file path=ppt/slides/slide10.xml><?xml version="1.0" encoding="utf-8"?>
+<p:sld xmlns:a="http://schemas.openxmlformats.org/drawingml/2006/main" xmlns:r="http://schemas.openxmlformats.org/officeDocument/2006/relationships" xmlns:p="http://schemas.openxmlformats.org/presentationml/2006/main">
+  <p:cSld>
+    <p:spTree>
+      <p:nvGrpSpPr>
+        <p:cNvPr id="1" name=""/>
+        <p:cNvGrpSpPr/>
+        <p:nvPr/>
+      </p:nvGrpSpPr>
+      <p:grpSpPr>
+        <a:xfrm>
+          <a:off x="0" y="0"/>
+          <a:ext cx="0" cy="0"/>
+          <a:chOff x="0" y="0"/>
+          <a:chExt cx="0" cy="0"/>
+        </a:xfrm>
+      </p:grpSpPr>
+      <p:sp>
+        <p:nvSpPr>
+          <p:cNvPr id="4" name="Title 1"/>
+          <p:cNvSpPr txBox="1">
+            <a:spLocks/>
+          </p:cNvSpPr>
+          <p:nvPr/>
+        </p:nvSpPr>
+        <p:spPr>
+          <a:xfrm>
+            <a:off x="609600" y="0"/>
+            <a:ext cx="7772400" cy="1219200"/>
+          </a:xfrm>
+          <a:prstGeom prst="rect">
+            <a:avLst/>
+          </a:prstGeom>
+        </p:spPr>
+        <p:txBody>
+          <a:bodyPr anchor="ctr">
+            <a:normAutofit/>
+          </a:bodyPr>
+          <a:lstStyle/>
+          <a:p>
+            <a:pPr algn="ctr" fontAlgn="auto">
+              <a:spcAft>
+                <a:spcPts val="0"/>
+              </a:spcAft>
+              <a:defRPr/>
+            </a:pPr>
+            <a:r>
+              <a:rPr lang="en-US" sz="4400">
+                <a:latin typeface="+mj-lt"/>
+                <a:ea typeface="+mj-ea"/>
+                <a:cs typeface="+mj-cs"/>
+              </a:rPr>
+              <a:t>Child access links screenshots</a:t>
+            </a:r>
+            <a:endParaRPr lang="en-US" sz="4400" dirty="0">
+              <a:latin typeface="+mj-lt"/>
+              <a:ea typeface="+mj-ea"/>
+              <a:cs typeface="+mj-cs"/>
+            </a:endParaRPr>
+          </a:p>
+        </p:txBody>
+      </p:sp>
+      <p:pic>
+        <p:nvPicPr>
+          <p:cNvPr id="20482" name="Picture 4" descr="demo.jpg"/>
+          <p:cNvPicPr>
+            <a:picLocks noChangeAspect="1"/>
+          </p:cNvPicPr>
+          <p:nvPr/>
+        </p:nvPicPr>
+        <p:blipFill>
+          <a:blip r:embed="rId2"/>
+          <a:srcRect l="20833" t="13538" r="21667" b="6274"/>
+          <a:stretch>
+            <a:fillRect/>
+          </a:stretch>
+        </p:blipFill>
+        <p:spPr bwMode="auto">
+          <a:xfrm>
+            <a:off x="4451350" y="2819400"/>
+            <a:ext cx="4398963" cy="3835400"/>
+          </a:xfrm>
+          <a:prstGeom prst="rect">
+            <a:avLst/>
+          </a:prstGeom>
+          <a:noFill/>
+          <a:ln w="9525">
+            <a:noFill/>
+            <a:miter lim="800000"/>
+            <a:headEnd/>
+            <a:tailEnd/>
+          </a:ln>
+        </p:spPr>
+      </p:pic>
+      <p:pic>
+        <p:nvPicPr>
+          <p:cNvPr id="20483" name="Picture 5" descr="demo2.jpg"/>
+          <p:cNvPicPr>
+            <a:picLocks noChangeAspect="1"/>
+          </p:cNvPicPr>
+          <p:nvPr/>
+        </p:nvPicPr>
+        <p:blipFill>
+          <a:blip r:embed="rId3"/>
+          <a:srcRect l="21667" t="11333" r="21667" b="4668"/>
+          <a:stretch>
+            <a:fillRect/>
+          </a:stretch>
+        </p:blipFill>
+        <p:spPr bwMode="auto">
+          <a:xfrm>
+            <a:off x="228600" y="2819400"/>
+            <a:ext cx="4138613" cy="3835400"/>
+          </a:xfrm>
+          <a:prstGeom prst="rect">
+            <a:avLst/>
+          </a:prstGeom>
+          <a:noFill/>
+          <a:ln w="9525">
+            <a:noFill/>
+            <a:miter lim="800000"/>
+            <a:headEnd/>
+            <a:tailEnd/>
+          </a:ln>
+        </p:spPr>
+      </p:pic>
+      <p:sp>
+        <p:nvSpPr>
+          <p:cNvPr id="20484" name="TextBox 6"/>
+          <p:cNvSpPr txBox="1">
+            <a:spLocks noChangeArrowheads="1"/>
+          </p:cNvSpPr>
+          <p:nvPr/>
+        </p:nvSpPr>
+        <p:spPr bwMode="auto">
+          <a:xfrm>
+            <a:off x="1676400" y="2209800"/>
+            <a:ext cx="803275" cy="369888"/>
+          </a:xfrm>
+          <a:prstGeom prst="rect">
+            <a:avLst/>
+          </a:prstGeom>
+          <a:noFill/>
+          <a:ln w="9525">
+            <a:noFill/>
+            <a:miter lim="800000"/>
+            <a:headEnd/>
+            <a:tailEnd/>
+          </a:ln>
+        </p:spPr>
+        <p:txBody>
+          <a:bodyPr wrap="none">
+            <a:spAutoFit/>
+          </a:bodyPr>
+          <a:lstStyle/>
+          <a:p>
+            <a:r>
+              <a:rPr lang="en-US">
+                <a:latin typeface="Calibri" pitchFamily="34" charset="0"/>
+              </a:rPr>
+              <a:t>Before</a:t>
+            </a:r>
+          </a:p>
+        </p:txBody>
+      </p:sp>
+      <p:sp>
+        <p:nvSpPr>
+          <p:cNvPr id="20485" name="TextBox 7"/>
+          <p:cNvSpPr txBox="1">
+            <a:spLocks noChangeArrowheads="1"/>
+          </p:cNvSpPr>
+          <p:nvPr/>
+        </p:nvSpPr>
+        <p:spPr bwMode="auto">
+          <a:xfrm>
+            <a:off x="6400800" y="2133600"/>
+            <a:ext cx="658813" cy="369888"/>
+          </a:xfrm>
+          <a:prstGeom prst="rect">
+            <a:avLst/>
+          </a:prstGeom>
+          <a:noFill/>
+          <a:ln w="9525">
+            <a:noFill/>
+            <a:miter lim="800000"/>
+            <a:headEnd/>
+            <a:tailEnd/>
+          </a:ln>
+        </p:spPr>
+        <p:txBody>
+          <a:bodyPr wrap="none">
+            <a:spAutoFit/>
+          </a:bodyPr>
+          <a:lstStyle/>
+          <a:p>
+            <a:r>
+              <a:rPr lang="en-US">
+                <a:latin typeface="Calibri" pitchFamily="34" charset="0"/>
+              </a:rPr>
+              <a:t>After</a:t>
+            </a:r>
+          </a:p>
+        </p:txBody>
+      </p:sp>
+      <p:sp>
+        <p:nvSpPr>
+          <p:cNvPr id="9" name="Rectangle 8"/>
+          <p:cNvSpPr/>
+          <p:nvPr/>
+        </p:nvSpPr>
+        <p:spPr>
+          <a:xfrm>
+            <a:off x="228600" y="4208463"/>
+            <a:ext cx="762000" cy="152400"/>
+          </a:xfrm>
+          <a:prstGeom prst="rect">
+            <a:avLst/>
+          </a:prstGeom>
+          <a:noFill/>
+          <a:ln>
+            <a:solidFill>
+              <a:srgbClr val="FF0000"/>
+            </a:solidFill>
+          </a:ln>
+        </p:spPr>
+        <p:style>
+          <a:lnRef idx="2">
+            <a:schemeClr val="accent1">
+              <a:shade val="50000"/>
+            </a:schemeClr>
+          </a:lnRef>
+          <a:fillRef idx="1">
+            <a:schemeClr val="accent1"/>
+          </a:fillRef>
+          <a:effectRef idx="0">
+            <a:schemeClr val="accent1"/>
+          </a:effectRef>
+          <a:fontRef idx="minor">
+            <a:schemeClr val="lt1"/>
+          </a:fontRef>
+        </p:style>
+        <p:txBody>
+          <a:bodyPr anchor="ctr"/>
+          <a:lstStyle/>
+          <a:p>
+            <a:pPr algn="ctr" fontAlgn="auto">
+              <a:spcBef>
+                <a:spcPts val="0"/>
+              </a:spcBef>
+              <a:spcAft>
+                <a:spcPts val="0"/>
+              </a:spcAft>
+              <a:defRPr/>
+            </a:pPr>
+            <a:endParaRPr lang="en-US"/>
+          </a:p>
+        </p:txBody>
+      </p:sp>
+      <p:cxnSp>
+        <p:nvCxnSpPr>
+          <p:cNvPr id="10" name="Straight Arrow Connector 9"/>
+          <p:cNvCxnSpPr/>
+          <p:nvPr/>
+        </p:nvCxnSpPr>
+        <p:spPr>
+          <a:xfrm rot="10800000" flipV="1">
+            <a:off x="990600" y="3979863"/>
+            <a:ext cx="304800" cy="228600"/>
+          </a:xfrm>
+          <a:prstGeom prst="straightConnector1">
+            <a:avLst/>
+          </a:prstGeom>
+          <a:ln>
+            <a:solidFill>
+              <a:srgbClr val="FF0000"/>
+            </a:solidFill>
+            <a:tailEnd type="arrow"/>
+          </a:ln>
+        </p:spPr>
+        <p:style>
+          <a:lnRef idx="1">
+            <a:schemeClr val="accent1"/>
+          </a:lnRef>
+          <a:fillRef idx="0">
+            <a:schemeClr val="accent1"/>
+          </a:fillRef>
+          <a:effectRef idx="0">
+            <a:schemeClr val="accent1"/>
+          </a:effectRef>
+          <a:fontRef idx="minor">
+            <a:schemeClr val="tx1"/>
+          </a:fontRef>
+        </p:style>
+      </p:cxnSp>
+      <p:sp>
+        <p:nvSpPr>
+          <p:cNvPr id="20488" name="TextBox 10"/>
+          <p:cNvSpPr txBox="1">
+            <a:spLocks noChangeArrowheads="1"/>
+          </p:cNvSpPr>
+          <p:nvPr/>
+        </p:nvSpPr>
+        <p:spPr bwMode="auto">
+          <a:xfrm>
+            <a:off x="1219200" y="3827463"/>
+            <a:ext cx="792163" cy="246062"/>
+          </a:xfrm>
+          <a:prstGeom prst="rect">
+            <a:avLst/>
+          </a:prstGeom>
+          <a:noFill/>
+          <a:ln w="9525">
+            <a:noFill/>
+            <a:miter lim="800000"/>
+            <a:headEnd/>
+            <a:tailEnd/>
+          </a:ln>
+        </p:spPr>
+        <p:txBody>
+          <a:bodyPr wrap="none">
+            <a:spAutoFit/>
+          </a:bodyPr>
+          <a:lstStyle/>
+          <a:p>
+            <a:r>
+              <a:rPr lang="en-US" sz="1000">
+                <a:solidFill>
+                  <a:srgbClr val="FF0000"/>
+                </a:solidFill>
+                <a:latin typeface="Calibri" pitchFamily="34" charset="0"/>
+              </a:rPr>
+              <a:t>Parent links</a:t>
+            </a:r>
+          </a:p>
+        </p:txBody>
+      </p:sp>
+      <p:sp>
+        <p:nvSpPr>
+          <p:cNvPr id="12" name="Rectangle 11"/>
+          <p:cNvSpPr/>
+          <p:nvPr/>
+        </p:nvSpPr>
+        <p:spPr>
+          <a:xfrm>
+            <a:off x="4618038" y="4208463"/>
+            <a:ext cx="762000" cy="152400"/>
+          </a:xfrm>
+          <a:prstGeom prst="rect">
+            <a:avLst/>
+          </a:prstGeom>
+          <a:noFill/>
+          <a:ln>
+            <a:solidFill>
+              <a:srgbClr val="FF0000"/>
+            </a:solidFill>
+          </a:ln>
+        </p:spPr>
+        <p:style>
+          <a:lnRef idx="2">
+            <a:schemeClr val="accent1">
+              <a:shade val="50000"/>
+            </a:schemeClr>
+          </a:lnRef>
+          <a:fillRef idx="1">
+            <a:schemeClr val="accent1"/>
+          </a:fillRef>
+          <a:effectRef idx="0">
+            <a:schemeClr val="accent1"/>
+          </a:effectRef>
+          <a:fontRef idx="minor">
+            <a:schemeClr val="lt1"/>
+          </a:fontRef>
+        </p:style>
+        <p:txBody>
+          <a:bodyPr anchor="ctr"/>
+          <a:lstStyle/>
+          <a:p>
+            <a:pPr algn="ctr" fontAlgn="auto">
+              <a:spcBef>
+                <a:spcPts val="0"/>
+              </a:spcBef>
+              <a:spcAft>
+                <a:spcPts val="0"/>
+              </a:spcAft>
+              <a:defRPr/>
+            </a:pPr>
+            <a:endParaRPr lang="en-US"/>
+          </a:p>
+        </p:txBody>
+      </p:sp>
+      <p:cxnSp>
+        <p:nvCxnSpPr>
+          <p:cNvPr id="13" name="Straight Arrow Connector 12"/>
+          <p:cNvCxnSpPr/>
+          <p:nvPr/>
+        </p:nvCxnSpPr>
+        <p:spPr>
+          <a:xfrm rot="10800000" flipV="1">
+            <a:off x="5380038" y="3979863"/>
+            <a:ext cx="304800" cy="228600"/>
+          </a:xfrm>
+          <a:prstGeom prst="straightConnector1">
+            <a:avLst/>
+          </a:prstGeom>
+          <a:ln>
+            <a:solidFill>
+              <a:srgbClr val="FF0000"/>
+            </a:solidFill>
+            <a:tailEnd type="arrow"/>
+          </a:ln>
+        </p:spPr>
+        <p:style>
+          <a:lnRef idx="1">
+            <a:schemeClr val="accent1"/>
+          </a:lnRef>
+          <a:fillRef idx="0">
+            <a:schemeClr val="accent1"/>
+          </a:fillRef>
+          <a:effectRef idx="0">
+            <a:schemeClr val="accent1"/>
+          </a:effectRef>
+          <a:fontRef idx="minor">
+            <a:schemeClr val="tx1"/>
+          </a:fontRef>
+        </p:style>
+      </p:cxnSp>
+      <p:sp>
+        <p:nvSpPr>
+          <p:cNvPr id="20491" name="TextBox 13"/>
+          <p:cNvSpPr txBox="1">
+            <a:spLocks noChangeArrowheads="1"/>
+          </p:cNvSpPr>
+          <p:nvPr/>
+        </p:nvSpPr>
+        <p:spPr bwMode="auto">
+          <a:xfrm>
+            <a:off x="5608638" y="3827463"/>
+            <a:ext cx="792162" cy="246062"/>
+          </a:xfrm>
+          <a:prstGeom prst="rect">
+            <a:avLst/>
+          </a:prstGeom>
+          <a:noFill/>
+          <a:ln w="9525">
+            <a:noFill/>
+            <a:miter lim="800000"/>
+            <a:headEnd/>
+            <a:tailEnd/>
+          </a:ln>
+        </p:spPr>
+        <p:txBody>
+          <a:bodyPr wrap="none">
+            <a:spAutoFit/>
+          </a:bodyPr>
+          <a:lstStyle/>
+          <a:p>
+            <a:r>
+              <a:rPr lang="en-US" sz="1000">
+                <a:solidFill>
+                  <a:srgbClr val="FF0000"/>
+                </a:solidFill>
+                <a:latin typeface="Calibri" pitchFamily="34" charset="0"/>
+              </a:rPr>
+              <a:t>Parent links</a:t>
+            </a:r>
+          </a:p>
+        </p:txBody>
+      </p:sp>
+      <p:sp>
+        <p:nvSpPr>
+          <p:cNvPr id="15" name="Rectangle 14"/>
+          <p:cNvSpPr/>
+          <p:nvPr/>
+        </p:nvSpPr>
+        <p:spPr>
+          <a:xfrm>
+            <a:off x="4702175" y="6172200"/>
+            <a:ext cx="762000" cy="152400"/>
+          </a:xfrm>
+          <a:prstGeom prst="rect">
+            <a:avLst/>
+          </a:prstGeom>
+          <a:noFill/>
+          <a:ln>
+            <a:solidFill>
+              <a:srgbClr val="FF0000"/>
+            </a:solidFill>
+          </a:ln>
+        </p:spPr>
+        <p:style>
+          <a:lnRef idx="2">
+            <a:schemeClr val="accent1">
+              <a:shade val="50000"/>
+            </a:schemeClr>
+          </a:lnRef>
+          <a:fillRef idx="1">
+            <a:schemeClr val="accent1"/>
+          </a:fillRef>
+          <a:effectRef idx="0">
+            <a:schemeClr val="accent1"/>
+          </a:effectRef>
+          <a:fontRef idx="minor">
+            <a:schemeClr val="lt1"/>
+          </a:fontRef>
+        </p:style>
+        <p:txBody>
+          <a:bodyPr anchor="ctr"/>
+          <a:lstStyle/>
+          <a:p>
+            <a:pPr algn="ctr" fontAlgn="auto">
+              <a:spcBef>
+                <a:spcPts val="0"/>
+              </a:spcBef>
+              <a:spcAft>
+                <a:spcPts val="0"/>
+              </a:spcAft>
+              <a:defRPr/>
+            </a:pPr>
+            <a:endParaRPr lang="en-US"/>
+          </a:p>
+        </p:txBody>
+      </p:sp>
+      <p:cxnSp>
+        <p:nvCxnSpPr>
+          <p:cNvPr id="16" name="Straight Arrow Connector 15"/>
+          <p:cNvCxnSpPr/>
+          <p:nvPr/>
+        </p:nvCxnSpPr>
+        <p:spPr>
+          <a:xfrm rot="10800000" flipV="1">
+            <a:off x="5464175" y="5943600"/>
+            <a:ext cx="304800" cy="228600"/>
+          </a:xfrm>
+          <a:prstGeom prst="straightConnector1">
+            <a:avLst/>
+          </a:prstGeom>
+          <a:ln>
+            <a:solidFill>
+              <a:srgbClr val="FF0000"/>
+            </a:solidFill>
+            <a:tailEnd type="arrow"/>
+          </a:ln>
+        </p:spPr>
+        <p:style>
+          <a:lnRef idx="1">
+            <a:schemeClr val="accent1"/>
+          </a:lnRef>
+          <a:fillRef idx="0">
+            <a:schemeClr val="accent1"/>
+          </a:fillRef>
+          <a:effectRef idx="0">
+            <a:schemeClr val="accent1"/>
+          </a:effectRef>
+          <a:fontRef idx="minor">
+            <a:schemeClr val="tx1"/>
+          </a:fontRef>
+        </p:style>
+      </p:cxnSp>
+      <p:sp>
+        <p:nvSpPr>
+          <p:cNvPr id="20494" name="TextBox 16"/>
+          <p:cNvSpPr txBox="1">
+            <a:spLocks noChangeArrowheads="1"/>
+          </p:cNvSpPr>
+          <p:nvPr/>
+        </p:nvSpPr>
+        <p:spPr bwMode="auto">
+          <a:xfrm>
+            <a:off x="5692775" y="5791200"/>
+            <a:ext cx="708025" cy="246063"/>
+          </a:xfrm>
+          <a:prstGeom prst="rect">
+            <a:avLst/>
+          </a:prstGeom>
+          <a:noFill/>
+          <a:ln w="9525">
+            <a:noFill/>
+            <a:miter lim="800000"/>
+            <a:headEnd/>
+            <a:tailEnd/>
+          </a:ln>
+        </p:spPr>
+        <p:txBody>
+          <a:bodyPr wrap="none">
+            <a:spAutoFit/>
+          </a:bodyPr>
+          <a:lstStyle/>
+          <a:p>
+            <a:r>
+              <a:rPr lang="en-US" sz="1000">
+                <a:solidFill>
+                  <a:srgbClr val="FF0000"/>
+                </a:solidFill>
+                <a:latin typeface="Calibri" pitchFamily="34" charset="0"/>
+              </a:rPr>
+              <a:t>Child links</a:t>
+            </a:r>
+          </a:p>
+        </p:txBody>
+      </p:sp>
+      <p:sp>
+        <p:nvSpPr>
+          <p:cNvPr id="20495" name="TextBox 17"/>
+          <p:cNvSpPr txBox="1">
+            <a:spLocks noChangeArrowheads="1"/>
+          </p:cNvSpPr>
+          <p:nvPr/>
+        </p:nvSpPr>
+        <p:spPr bwMode="auto">
+          <a:xfrm>
+            <a:off x="1219200" y="1295400"/>
+            <a:ext cx="6629400" cy="646113"/>
+          </a:xfrm>
+          <a:prstGeom prst="rect">
+            <a:avLst/>
+          </a:prstGeom>
+          <a:noFill/>
+          <a:ln w="9525">
+            <a:noFill/>
+            <a:miter lim="800000"/>
+            <a:headEnd/>
+            <a:tailEnd/>
+          </a:ln>
+        </p:spPr>
+        <p:txBody>
+          <a:bodyPr>
+            <a:spAutoFit/>
+          </a:bodyPr>
+          <a:lstStyle/>
+          <a:p>
+            <a:r>
+              <a:rPr lang="en-US">
+                <a:latin typeface="Calibri" pitchFamily="34" charset="0"/>
+              </a:rPr>
+              <a:t>Before: A page could only access its parents</a:t>
+            </a:r>
+          </a:p>
+          <a:p>
+            <a:r>
+              <a:rPr lang="en-US">
+                <a:latin typeface="Calibri" pitchFamily="34" charset="0"/>
+              </a:rPr>
+              <a:t>After: A page can access can access its parent and its children pages</a:t>
+            </a:r>
+          </a:p>
+        </p:txBody>
+      </p:sp>
+    </p:spTree>
+  </p:cSld>
+  <p:clrMapOvr>
+    <a:masterClrMapping/>
+  </p:clrMapOvr>
+  <p:timing>
+    <p:tnLst>
+      <p:par>
+        <p:cTn id="1" dur="indefinite" restart="never" nodeType="tmRoot"/>
+      </p:par>
+    </p:tnLst>
+  </p:timing>
 </p:sld>
 </file>
 
@@ -3144,12 +4298,12 @@
       </p:grpSpPr>
       <p:sp>
         <p:nvSpPr>
-          <p:cNvPr id="2" name="Title 1"/>
-          <p:cNvSpPr>
-            <a:spLocks noGrp="1"/>
-          </p:cNvSpPr>
-          <p:nvPr>
-            <p:ph type="title"/>
+          <p:cNvPr id="21506" name="Rectangle 2"/>
+          <p:cNvSpPr>
+            <a:spLocks noGrp="1"/>
+          </p:cNvSpPr>
+          <p:nvPr>
+            <p:ph type="title" idx="4294967295"/>
           </p:nvPr>
         </p:nvSpPr>
         <p:spPr/>
@@ -3158,21 +4312,20 @@
           <a:lstStyle/>
           <a:p>
             <a:r>
-              <a:rPr lang="en-US" dirty="0" smtClean="0"/>
-              <a:t>Sidebar Editing</a:t>
-            </a:r>
-            <a:endParaRPr lang="en-US" dirty="0"/>
-          </a:p>
-        </p:txBody>
-      </p:sp>
-      <p:sp>
-        <p:nvSpPr>
-          <p:cNvPr id="3" name="Content Placeholder 2"/>
-          <p:cNvSpPr>
-            <a:spLocks noGrp="1"/>
-          </p:cNvSpPr>
-          <p:nvPr>
-            <p:ph idx="1"/>
+              <a:rPr lang="en-US" smtClean="0"/>
+              <a:t>Theme preview image</a:t>
+            </a:r>
+          </a:p>
+        </p:txBody>
+      </p:sp>
+      <p:sp>
+        <p:nvSpPr>
+          <p:cNvPr id="21507" name="Rectangle 3"/>
+          <p:cNvSpPr>
+            <a:spLocks noGrp="1"/>
+          </p:cNvSpPr>
+          <p:nvPr>
+            <p:ph type="body" idx="4294967295"/>
           </p:nvPr>
         </p:nvSpPr>
         <p:spPr/>
@@ -3181,16 +4334,21 @@
           <a:lstStyle/>
           <a:p>
             <a:r>
-              <a:rPr lang="en-US" dirty="0" smtClean="0"/>
-              <a:t>Motivation: A CMS shouldn’t require users to edit code</a:t>
-            </a:r>
-          </a:p>
-          <a:p>
-            <a:r>
-              <a:rPr lang="en-US" dirty="0" smtClean="0"/>
-              <a:t>Solution: Visually Editable sidebar</a:t>
-            </a:r>
-            <a:endParaRPr lang="en-US" dirty="0"/>
+              <a:rPr lang="en-US" smtClean="0"/>
+              <a:t>Allows user to see a preview image of each theme before making a selection.</a:t>
+            </a:r>
+          </a:p>
+          <a:p>
+            <a:r>
+              <a:rPr lang="en-US" smtClean="0"/>
+              <a:t>Shows an image of the current theme without user having to load the main page to see theme. </a:t>
+            </a:r>
+          </a:p>
+          <a:p>
+            <a:r>
+              <a:rPr lang="en-US" smtClean="0"/>
+              <a:t>(insert image from Software principles: Prototype presentation, if necessary)</a:t>
+            </a:r>
           </a:p>
         </p:txBody>
       </p:sp>
@@ -3199,13 +4357,6 @@
   <p:clrMapOvr>
     <a:masterClrMapping/>
   </p:clrMapOvr>
-  <p:timing>
-    <p:tnLst>
-      <p:par>
-        <p:cTn id="1" dur="indefinite" restart="never" nodeType="tmRoot"/>
-      </p:par>
-    </p:tnLst>
-  </p:timing>
 </p:sld>
 </file>
 
@@ -3228,7 +4379,7 @@
       </p:grpSpPr>
       <p:sp>
         <p:nvSpPr>
-          <p:cNvPr id="2" name="Title 1"/>
+          <p:cNvPr id="14337" name="Title 1"/>
           <p:cNvSpPr>
             <a:spLocks noGrp="1"/>
           </p:cNvSpPr>
@@ -3242,16 +4393,15 @@
           <a:lstStyle/>
           <a:p>
             <a:r>
-              <a:rPr lang="en-US" dirty="0" smtClean="0"/>
-              <a:t>File Upload/Relevant Page Links</a:t>
-            </a:r>
-            <a:endParaRPr lang="en-US" dirty="0"/>
-          </a:p>
-        </p:txBody>
-      </p:sp>
-      <p:sp>
-        <p:nvSpPr>
-          <p:cNvPr id="3" name="Content Placeholder 2"/>
+              <a:rPr lang="en-US" smtClean="0"/>
+              <a:t>Sidebar Editing</a:t>
+            </a:r>
+          </a:p>
+        </p:txBody>
+      </p:sp>
+      <p:sp>
+        <p:nvSpPr>
+          <p:cNvPr id="14338" name="Content Placeholder 2"/>
           <p:cNvSpPr>
             <a:spLocks noGrp="1"/>
           </p:cNvSpPr>
@@ -3265,8 +4415,14 @@
           <a:lstStyle/>
           <a:p>
             <a:r>
-              <a:rPr lang="en-US" dirty="0" smtClean="0"/>
-              <a:t>Benefits: Improved Navigability, attached files can now be accessed, site can be traversed in a logical manner</a:t>
+              <a:rPr lang="en-US" smtClean="0"/>
+              <a:t>Motivation: A CMS shouldn’t require users to edit code</a:t>
+            </a:r>
+          </a:p>
+          <a:p>
+            <a:r>
+              <a:rPr lang="en-US" smtClean="0"/>
+              <a:t>Solution: Visually Editable sidebar</a:t>
             </a:r>
           </a:p>
         </p:txBody>
@@ -3305,7 +4461,7 @@
       </p:grpSpPr>
       <p:sp>
         <p:nvSpPr>
-          <p:cNvPr id="2" name="Title 1"/>
+          <p:cNvPr id="15361" name="Title 1"/>
           <p:cNvSpPr>
             <a:spLocks noGrp="1"/>
           </p:cNvSpPr>
@@ -3319,16 +4475,15 @@
           <a:lstStyle/>
           <a:p>
             <a:r>
-              <a:rPr lang="en-US" dirty="0" smtClean="0"/>
-              <a:t>Page history</a:t>
-            </a:r>
-            <a:endParaRPr lang="en-US" dirty="0"/>
-          </a:p>
-        </p:txBody>
-      </p:sp>
-      <p:sp>
-        <p:nvSpPr>
-          <p:cNvPr id="3" name="Content Placeholder 2"/>
+              <a:rPr lang="en-US" smtClean="0"/>
+              <a:t>File Upload/Relevant Page Links</a:t>
+            </a:r>
+          </a:p>
+        </p:txBody>
+      </p:sp>
+      <p:sp>
+        <p:nvSpPr>
+          <p:cNvPr id="15362" name="Content Placeholder 2"/>
           <p:cNvSpPr>
             <a:spLocks noGrp="1"/>
           </p:cNvSpPr>
@@ -3342,16 +4497,9 @@
           <a:lstStyle/>
           <a:p>
             <a:r>
-              <a:rPr lang="en-US" dirty="0" smtClean="0"/>
-              <a:t>Tracks changes and allows users to revert to them</a:t>
-            </a:r>
-          </a:p>
-          <a:p>
-            <a:r>
-              <a:rPr lang="en-US" dirty="0" smtClean="0"/>
-              <a:t>Users now have the ability to rollback accidental changes</a:t>
-            </a:r>
-            <a:endParaRPr lang="en-US" dirty="0"/>
+              <a:rPr lang="en-US" smtClean="0"/>
+              <a:t>Benefits: Improved Navigability, attached files can now be accessed, site can be traversed in a logical manner</a:t>
+            </a:r>
           </a:p>
         </p:txBody>
       </p:sp>
@@ -3360,6 +4508,13 @@
   <p:clrMapOvr>
     <a:masterClrMapping/>
   </p:clrMapOvr>
+  <p:timing>
+    <p:tnLst>
+      <p:par>
+        <p:cTn id="1" dur="indefinite" restart="never" nodeType="tmRoot"/>
+      </p:par>
+    </p:tnLst>
+  </p:timing>
 </p:sld>
 </file>
 
@@ -3382,7 +4537,7 @@
       </p:grpSpPr>
       <p:sp>
         <p:nvSpPr>
-          <p:cNvPr id="2" name="Title 1"/>
+          <p:cNvPr id="16385" name="Title 1"/>
           <p:cNvSpPr>
             <a:spLocks noGrp="1"/>
           </p:cNvSpPr>
@@ -3396,16 +4551,15 @@
           <a:lstStyle/>
           <a:p>
             <a:r>
-              <a:rPr lang="en-US" dirty="0" smtClean="0"/>
-              <a:t>Bugs/Usability Fixes</a:t>
-            </a:r>
-            <a:endParaRPr lang="en-US" dirty="0"/>
-          </a:p>
-        </p:txBody>
-      </p:sp>
-      <p:sp>
-        <p:nvSpPr>
-          <p:cNvPr id="3" name="Content Placeholder 2"/>
+              <a:rPr lang="en-US" smtClean="0"/>
+              <a:t>Page history</a:t>
+            </a:r>
+          </a:p>
+        </p:txBody>
+      </p:sp>
+      <p:sp>
+        <p:nvSpPr>
+          <p:cNvPr id="16386" name="Content Placeholder 2"/>
           <p:cNvSpPr>
             <a:spLocks noGrp="1"/>
           </p:cNvSpPr>
@@ -3419,16 +4573,15 @@
           <a:lstStyle/>
           <a:p>
             <a:r>
-              <a:rPr lang="en-US" dirty="0" smtClean="0"/>
-              <a:t>List of bugs? E.g., </a:t>
-            </a:r>
-            <a:r>
-              <a:rPr lang="en-US" smtClean="0"/>
-              <a:t>groups editing</a:t>
-            </a:r>
-          </a:p>
-          <a:p>
-            <a:endParaRPr lang="en-US" dirty="0"/>
+              <a:rPr lang="en-US" smtClean="0"/>
+              <a:t>Tracks changes and allows users to revert to them</a:t>
+            </a:r>
+          </a:p>
+          <a:p>
+            <a:r>
+              <a:rPr lang="en-US" smtClean="0"/>
+              <a:t>Users now have the ability to rollback accidental changes</a:t>
+            </a:r>
           </a:p>
         </p:txBody>
       </p:sp>
@@ -3459,240 +4612,48 @@
       </p:grpSpPr>
       <p:sp>
         <p:nvSpPr>
-          <p:cNvPr id="4" name="Title 1"/>
-          <p:cNvSpPr txBox="1">
-            <a:spLocks/>
-          </p:cNvSpPr>
-          <p:nvPr/>
-        </p:nvSpPr>
-        <p:spPr>
-          <a:xfrm>
-            <a:off x="609600" y="427038"/>
-            <a:ext cx="8229600" cy="1143000"/>
-          </a:xfrm>
-          <a:prstGeom prst="rect">
-            <a:avLst/>
-          </a:prstGeom>
-        </p:spPr>
-        <p:txBody>
-          <a:bodyPr vert="horz" lIns="91440" tIns="45720" rIns="91440" bIns="45720" rtlCol="0" anchor="ctr">
-            <a:normAutofit/>
-          </a:bodyPr>
+          <p:cNvPr id="17409" name="Title 1"/>
+          <p:cNvSpPr>
+            <a:spLocks noGrp="1"/>
+          </p:cNvSpPr>
+          <p:nvPr>
+            <p:ph type="title"/>
+          </p:nvPr>
+        </p:nvSpPr>
+        <p:spPr/>
+        <p:txBody>
+          <a:bodyPr/>
           <a:lstStyle/>
           <a:p>
-            <a:pPr marL="0" marR="0" lvl="0" indent="0" algn="ctr" defTabSz="457200" rtl="0" eaLnBrk="1" fontAlgn="auto" latinLnBrk="0" hangingPunct="1">
-              <a:lnSpc>
-                <a:spcPct val="100000"/>
-              </a:lnSpc>
-              <a:spcBef>
-                <a:spcPct val="0"/>
-              </a:spcBef>
-              <a:spcAft>
-                <a:spcPts val="0"/>
-              </a:spcAft>
-              <a:buClrTx/>
-              <a:buSzTx/>
-              <a:buFontTx/>
-              <a:buNone/>
-              <a:tabLst/>
-              <a:defRPr/>
-            </a:pPr>
-            <a:r>
-              <a:rPr kumimoji="0" lang="en-US" sz="4400" b="0" i="0" u="none" strike="noStrike" kern="1200" cap="none" spc="0" normalizeH="0" baseline="0" noProof="0" smtClean="0">
-                <a:ln>
-                  <a:noFill/>
-                </a:ln>
-                <a:solidFill>
-                  <a:schemeClr val="tx1"/>
-                </a:solidFill>
-                <a:effectLst/>
-                <a:uLnTx/>
-                <a:uFillTx/>
-                <a:latin typeface="+mj-lt"/>
-                <a:ea typeface="+mj-ea"/>
-                <a:cs typeface="+mj-cs"/>
-              </a:rPr>
-              <a:t>Child access links</a:t>
-            </a:r>
-            <a:endParaRPr kumimoji="0" lang="en-US" sz="4400" b="0" i="0" u="none" strike="noStrike" kern="1200" cap="none" spc="0" normalizeH="0" baseline="0" noProof="0" dirty="0">
-              <a:ln>
-                <a:noFill/>
-              </a:ln>
-              <a:solidFill>
-                <a:schemeClr val="tx1"/>
-              </a:solidFill>
-              <a:effectLst/>
-              <a:uLnTx/>
-              <a:uFillTx/>
-              <a:latin typeface="+mj-lt"/>
-              <a:ea typeface="+mj-ea"/>
-              <a:cs typeface="+mj-cs"/>
-            </a:endParaRPr>
-          </a:p>
-        </p:txBody>
-      </p:sp>
-      <p:sp>
-        <p:nvSpPr>
-          <p:cNvPr id="5" name="Content Placeholder 2"/>
-          <p:cNvSpPr txBox="1">
-            <a:spLocks/>
-          </p:cNvSpPr>
-          <p:nvPr/>
-        </p:nvSpPr>
-        <p:spPr>
-          <a:xfrm>
-            <a:off x="609600" y="1752600"/>
-            <a:ext cx="8229600" cy="4525963"/>
-          </a:xfrm>
-          <a:prstGeom prst="rect">
-            <a:avLst/>
-          </a:prstGeom>
-        </p:spPr>
-        <p:txBody>
-          <a:bodyPr vert="horz" lIns="91440" tIns="45720" rIns="91440" bIns="45720" rtlCol="0">
-            <a:normAutofit/>
-          </a:bodyPr>
+            <a:r>
+              <a:rPr lang="en-US" smtClean="0"/>
+              <a:t>Bugs/Usability Fixes</a:t>
+            </a:r>
+          </a:p>
+        </p:txBody>
+      </p:sp>
+      <p:sp>
+        <p:nvSpPr>
+          <p:cNvPr id="17410" name="Content Placeholder 2"/>
+          <p:cNvSpPr>
+            <a:spLocks noGrp="1"/>
+          </p:cNvSpPr>
+          <p:nvPr>
+            <p:ph idx="1"/>
+          </p:nvPr>
+        </p:nvSpPr>
+        <p:spPr/>
+        <p:txBody>
+          <a:bodyPr/>
           <a:lstStyle/>
           <a:p>
-            <a:pPr marL="342900" marR="0" lvl="0" indent="-342900" algn="l" defTabSz="457200" rtl="0" eaLnBrk="1" fontAlgn="auto" latinLnBrk="0" hangingPunct="1">
-              <a:lnSpc>
-                <a:spcPct val="100000"/>
-              </a:lnSpc>
-              <a:spcBef>
-                <a:spcPct val="20000"/>
-              </a:spcBef>
-              <a:spcAft>
-                <a:spcPts val="0"/>
-              </a:spcAft>
-              <a:buClrTx/>
-              <a:buSzTx/>
-              <a:buFont typeface="Arial"/>
-              <a:buChar char="•"/>
-              <a:tabLst/>
-              <a:defRPr/>
-            </a:pPr>
-            <a:r>
-              <a:rPr kumimoji="0" lang="en-US" sz="3200" b="0" i="0" u="none" strike="noStrike" kern="1200" cap="none" spc="0" normalizeH="0" baseline="0" noProof="0" smtClean="0">
-                <a:ln>
-                  <a:noFill/>
-                </a:ln>
-                <a:solidFill>
-                  <a:schemeClr val="tx1"/>
-                </a:solidFill>
-                <a:effectLst/>
-                <a:uLnTx/>
-                <a:uFillTx/>
-                <a:latin typeface="+mn-lt"/>
-                <a:ea typeface="+mn-ea"/>
-                <a:cs typeface="+mn-cs"/>
-              </a:rPr>
-              <a:t>In the previous AESC system no access to child pages was automatically given</a:t>
-            </a:r>
-          </a:p>
-          <a:p>
-            <a:pPr marL="342900" marR="0" lvl="0" indent="-342900" algn="l" defTabSz="457200" rtl="0" eaLnBrk="1" fontAlgn="auto" latinLnBrk="0" hangingPunct="1">
-              <a:lnSpc>
-                <a:spcPct val="100000"/>
-              </a:lnSpc>
-              <a:spcBef>
-                <a:spcPct val="20000"/>
-              </a:spcBef>
-              <a:spcAft>
-                <a:spcPts val="0"/>
-              </a:spcAft>
-              <a:buClrTx/>
-              <a:buSzTx/>
-              <a:buFont typeface="Arial"/>
-              <a:buChar char="•"/>
-              <a:tabLst/>
-              <a:defRPr/>
-            </a:pPr>
-            <a:r>
-              <a:rPr kumimoji="0" lang="en-US" sz="3200" b="0" i="0" u="none" strike="noStrike" kern="1200" cap="none" spc="0" normalizeH="0" baseline="0" noProof="0" smtClean="0">
-                <a:ln>
-                  <a:noFill/>
-                </a:ln>
-                <a:solidFill>
-                  <a:schemeClr val="tx1"/>
-                </a:solidFill>
-                <a:effectLst/>
-                <a:uLnTx/>
-                <a:uFillTx/>
-                <a:latin typeface="+mn-lt"/>
-                <a:ea typeface="+mn-ea"/>
-                <a:cs typeface="+mn-cs"/>
-              </a:rPr>
-              <a:t>The class Page has a property called page_children</a:t>
-            </a:r>
-          </a:p>
-          <a:p>
-            <a:pPr marL="342900" marR="0" lvl="0" indent="-342900" algn="l" defTabSz="457200" rtl="0" eaLnBrk="1" fontAlgn="auto" latinLnBrk="0" hangingPunct="1">
-              <a:lnSpc>
-                <a:spcPct val="100000"/>
-              </a:lnSpc>
-              <a:spcBef>
-                <a:spcPct val="20000"/>
-              </a:spcBef>
-              <a:spcAft>
-                <a:spcPts val="0"/>
-              </a:spcAft>
-              <a:buClrTx/>
-              <a:buSzTx/>
-              <a:buFont typeface="Arial"/>
-              <a:buChar char="•"/>
-              <a:tabLst/>
-              <a:defRPr/>
-            </a:pPr>
-            <a:r>
-              <a:rPr kumimoji="0" lang="en-US" sz="3200" b="0" i="0" u="none" strike="noStrike" kern="1200" cap="none" spc="0" normalizeH="0" baseline="0" noProof="0" smtClean="0">
-                <a:ln>
-                  <a:noFill/>
-                </a:ln>
-                <a:solidFill>
-                  <a:schemeClr val="tx1"/>
-                </a:solidFill>
-                <a:effectLst/>
-                <a:uLnTx/>
-                <a:uFillTx/>
-                <a:latin typeface="+mn-lt"/>
-                <a:ea typeface="+mn-ea"/>
-                <a:cs typeface="+mn-cs"/>
-              </a:rPr>
-              <a:t>Cycled through the pages in the list and displayed there paths to the user</a:t>
-            </a:r>
-          </a:p>
-          <a:p>
-            <a:pPr marL="342900" marR="0" lvl="0" indent="-342900" algn="l" defTabSz="457200" rtl="0" eaLnBrk="1" fontAlgn="auto" latinLnBrk="0" hangingPunct="1">
-              <a:lnSpc>
-                <a:spcPct val="100000"/>
-              </a:lnSpc>
-              <a:spcBef>
-                <a:spcPct val="20000"/>
-              </a:spcBef>
-              <a:spcAft>
-                <a:spcPts val="0"/>
-              </a:spcAft>
-              <a:buClrTx/>
-              <a:buSzTx/>
-              <a:buFont typeface="Arial"/>
-              <a:buChar char="•"/>
-              <a:tabLst/>
-              <a:defRPr/>
-            </a:pPr>
-            <a:endParaRPr kumimoji="0" lang="en-US" sz="3200" b="0" i="0" u="none" strike="noStrike" kern="1200" cap="none" spc="0" normalizeH="0" baseline="0" noProof="0" dirty="0">
-              <a:ln>
-                <a:noFill/>
-              </a:ln>
-              <a:solidFill>
-                <a:schemeClr val="tx1"/>
-              </a:solidFill>
-              <a:effectLst/>
-              <a:uLnTx/>
-              <a:uFillTx/>
-              <a:latin typeface="+mn-lt"/>
-              <a:ea typeface="+mn-ea"/>
-              <a:cs typeface="+mn-cs"/>
-            </a:endParaRPr>
+            <a:r>
+              <a:rPr lang="en-US" smtClean="0"/>
+              <a:t>List of bugs? E.g., groups editing</a:t>
+            </a:r>
+          </a:p>
+          <a:p>
+            <a:endParaRPr lang="en-US" smtClean="0"/>
           </a:p>
         </p:txBody>
       </p:sp>
@@ -3723,35 +4684,378 @@
       </p:grpSpPr>
       <p:sp>
         <p:nvSpPr>
+          <p:cNvPr id="22530" name="Rectangle 2"/>
+          <p:cNvSpPr>
+            <a:spLocks noGrp="1"/>
+          </p:cNvSpPr>
+          <p:nvPr>
+            <p:ph type="title" idx="4294967295"/>
+          </p:nvPr>
+        </p:nvSpPr>
+        <p:spPr/>
+        <p:txBody>
+          <a:bodyPr/>
+          <a:lstStyle/>
+          <a:p>
+            <a:r>
+              <a:rPr lang="en-US" smtClean="0"/>
+              <a:t>Bug #53:Adding/Editing Groups</a:t>
+            </a:r>
+          </a:p>
+        </p:txBody>
+      </p:sp>
+      <p:pic>
+        <p:nvPicPr>
+          <p:cNvPr id="22531" name="Picture 24" descr="pic11"/>
+          <p:cNvPicPr>
+            <a:picLocks noChangeAspect="1" noChangeArrowheads="1"/>
+          </p:cNvPicPr>
+          <p:nvPr/>
+        </p:nvPicPr>
+        <p:blipFill>
+          <a:blip r:embed="rId2"/>
+          <a:srcRect/>
+          <a:stretch>
+            <a:fillRect/>
+          </a:stretch>
+        </p:blipFill>
+        <p:spPr bwMode="auto">
+          <a:xfrm>
+            <a:off x="609600" y="3970338"/>
+            <a:ext cx="7924800" cy="2878137"/>
+          </a:xfrm>
+          <a:prstGeom prst="rect">
+            <a:avLst/>
+          </a:prstGeom>
+          <a:noFill/>
+          <a:ln w="9525">
+            <a:noFill/>
+            <a:miter lim="800000"/>
+            <a:headEnd/>
+            <a:tailEnd/>
+          </a:ln>
+        </p:spPr>
+      </p:pic>
+      <p:pic>
+        <p:nvPicPr>
+          <p:cNvPr id="22532" name="Picture 26" descr="pic22"/>
+          <p:cNvPicPr>
+            <a:picLocks noChangeAspect="1" noChangeArrowheads="1"/>
+          </p:cNvPicPr>
+          <p:nvPr/>
+        </p:nvPicPr>
+        <p:blipFill>
+          <a:blip r:embed="rId3"/>
+          <a:srcRect/>
+          <a:stretch>
+            <a:fillRect/>
+          </a:stretch>
+        </p:blipFill>
+        <p:spPr bwMode="auto">
+          <a:xfrm>
+            <a:off x="609600" y="1181100"/>
+            <a:ext cx="7924800" cy="2819400"/>
+          </a:xfrm>
+          <a:prstGeom prst="rect">
+            <a:avLst/>
+          </a:prstGeom>
+          <a:noFill/>
+          <a:ln w="9525">
+            <a:noFill/>
+            <a:miter lim="800000"/>
+            <a:headEnd/>
+            <a:tailEnd/>
+          </a:ln>
+        </p:spPr>
+      </p:pic>
+      <p:sp>
+        <p:nvSpPr>
+          <p:cNvPr id="22533" name="Rectangle 28"/>
+          <p:cNvSpPr>
+            <a:spLocks/>
+          </p:cNvSpPr>
+          <p:nvPr/>
+        </p:nvSpPr>
+        <p:spPr bwMode="auto">
+          <a:xfrm>
+            <a:off x="4724400" y="2286000"/>
+            <a:ext cx="2438400" cy="304800"/>
+          </a:xfrm>
+          <a:prstGeom prst="rect">
+            <a:avLst/>
+          </a:prstGeom>
+          <a:noFill/>
+          <a:ln w="9525">
+            <a:noFill/>
+            <a:miter lim="800000"/>
+            <a:headEnd/>
+            <a:tailEnd/>
+          </a:ln>
+        </p:spPr>
+        <p:txBody>
+          <a:bodyPr anchor="ctr"/>
+          <a:lstStyle/>
+          <a:p>
+            <a:pPr algn="ctr"/>
+            <a:r>
+              <a:rPr lang="en-US" sz="2000">
+                <a:solidFill>
+                  <a:srgbClr val="CC0000"/>
+                </a:solidFill>
+                <a:latin typeface="Calibri" pitchFamily="34" charset="0"/>
+              </a:rPr>
+              <a:t>Creating a new group</a:t>
+            </a:r>
+          </a:p>
+        </p:txBody>
+      </p:sp>
+      <p:sp>
+        <p:nvSpPr>
+          <p:cNvPr id="22534" name="Rectangle 29"/>
+          <p:cNvSpPr>
+            <a:spLocks/>
+          </p:cNvSpPr>
+          <p:nvPr/>
+        </p:nvSpPr>
+        <p:spPr bwMode="auto">
+          <a:xfrm>
+            <a:off x="4343400" y="5181600"/>
+            <a:ext cx="1676400" cy="304800"/>
+          </a:xfrm>
+          <a:prstGeom prst="rect">
+            <a:avLst/>
+          </a:prstGeom>
+          <a:noFill/>
+          <a:ln w="9525">
+            <a:noFill/>
+            <a:miter lim="800000"/>
+            <a:headEnd/>
+            <a:tailEnd/>
+          </a:ln>
+        </p:spPr>
+        <p:txBody>
+          <a:bodyPr anchor="ctr"/>
+          <a:lstStyle/>
+          <a:p>
+            <a:pPr algn="ctr"/>
+            <a:r>
+              <a:rPr lang="en-US" sz="2000">
+                <a:solidFill>
+                  <a:srgbClr val="CC0000"/>
+                </a:solidFill>
+                <a:latin typeface="Calibri" pitchFamily="34" charset="0"/>
+              </a:rPr>
+              <a:t>List of groups</a:t>
+            </a:r>
+          </a:p>
+        </p:txBody>
+      </p:sp>
+    </p:spTree>
+  </p:cSld>
+  <p:clrMapOvr>
+    <a:masterClrMapping/>
+  </p:clrMapOvr>
+</p:sld>
+</file>
+
+<file path=ppt/slides/slide8.xml><?xml version="1.0" encoding="utf-8"?>
+<p:sld xmlns:a="http://schemas.openxmlformats.org/drawingml/2006/main" xmlns:r="http://schemas.openxmlformats.org/officeDocument/2006/relationships" xmlns:p="http://schemas.openxmlformats.org/presentationml/2006/main">
+  <p:cSld>
+    <p:spTree>
+      <p:nvGrpSpPr>
+        <p:cNvPr id="1" name=""/>
+        <p:cNvGrpSpPr/>
+        <p:nvPr/>
+      </p:nvGrpSpPr>
+      <p:grpSpPr>
+        <a:xfrm>
+          <a:off x="0" y="0"/>
+          <a:ext cx="0" cy="0"/>
+          <a:chOff x="0" y="0"/>
+          <a:chExt cx="0" cy="0"/>
+        </a:xfrm>
+      </p:grpSpPr>
+      <p:sp>
+        <p:nvSpPr>
           <p:cNvPr id="4" name="Title 1"/>
-          <p:cNvSpPr>
-            <a:spLocks noGrp="1"/>
-          </p:cNvSpPr>
-          <p:nvPr>
-            <p:ph type="title"/>
-          </p:nvPr>
+          <p:cNvSpPr txBox="1">
+            <a:spLocks/>
+          </p:cNvSpPr>
+          <p:nvPr/>
         </p:nvSpPr>
         <p:spPr>
           <a:xfrm>
-            <a:off x="457200" y="274638"/>
+            <a:off x="609600" y="427038"/>
             <a:ext cx="8229600" cy="1143000"/>
           </a:xfrm>
+          <a:prstGeom prst="rect">
+            <a:avLst/>
+          </a:prstGeom>
         </p:spPr>
         <p:txBody>
-          <a:bodyPr/>
+          <a:bodyPr anchor="ctr">
+            <a:normAutofit/>
+          </a:bodyPr>
           <a:lstStyle/>
           <a:p>
-            <a:r>
-              <a:rPr lang="en-US" dirty="0" smtClean="0"/>
+            <a:pPr algn="ctr" fontAlgn="auto">
+              <a:spcAft>
+                <a:spcPts val="0"/>
+              </a:spcAft>
+              <a:defRPr/>
+            </a:pPr>
+            <a:r>
+              <a:rPr lang="en-US" sz="4400">
+                <a:latin typeface="+mj-lt"/>
+                <a:ea typeface="+mj-ea"/>
+                <a:cs typeface="+mj-cs"/>
+              </a:rPr>
+              <a:t>Child access links</a:t>
+            </a:r>
+            <a:endParaRPr lang="en-US" sz="4400" dirty="0">
+              <a:latin typeface="+mj-lt"/>
+              <a:ea typeface="+mj-ea"/>
+              <a:cs typeface="+mj-cs"/>
+            </a:endParaRPr>
+          </a:p>
+        </p:txBody>
+      </p:sp>
+      <p:sp>
+        <p:nvSpPr>
+          <p:cNvPr id="18434" name="Content Placeholder 2"/>
+          <p:cNvSpPr txBox="1">
+            <a:spLocks/>
+          </p:cNvSpPr>
+          <p:nvPr/>
+        </p:nvSpPr>
+        <p:spPr bwMode="auto">
+          <a:xfrm>
+            <a:off x="609600" y="1752600"/>
+            <a:ext cx="8229600" cy="4525963"/>
+          </a:xfrm>
+          <a:prstGeom prst="rect">
+            <a:avLst/>
+          </a:prstGeom>
+          <a:noFill/>
+          <a:ln w="9525">
+            <a:noFill/>
+            <a:miter lim="800000"/>
+            <a:headEnd/>
+            <a:tailEnd/>
+          </a:ln>
+        </p:spPr>
+        <p:txBody>
+          <a:bodyPr/>
+          <a:lstStyle/>
+          <a:p>
+            <a:pPr marL="342900" indent="-342900">
+              <a:spcBef>
+                <a:spcPct val="20000"/>
+              </a:spcBef>
+              <a:buFont typeface="Arial" charset="0"/>
+              <a:buChar char="•"/>
+            </a:pPr>
+            <a:r>
+              <a:rPr lang="en-US" sz="3200">
+                <a:latin typeface="Calibri" pitchFamily="34" charset="0"/>
+              </a:rPr>
+              <a:t>In the previous AESC system no access to child pages was automatically given</a:t>
+            </a:r>
+          </a:p>
+          <a:p>
+            <a:pPr marL="342900" indent="-342900">
+              <a:spcBef>
+                <a:spcPct val="20000"/>
+              </a:spcBef>
+              <a:buFont typeface="Arial" charset="0"/>
+              <a:buChar char="•"/>
+            </a:pPr>
+            <a:r>
+              <a:rPr lang="en-US" sz="3200">
+                <a:latin typeface="Calibri" pitchFamily="34" charset="0"/>
+              </a:rPr>
+              <a:t>The class Page has a property called page_children</a:t>
+            </a:r>
+          </a:p>
+          <a:p>
+            <a:pPr marL="342900" indent="-342900">
+              <a:spcBef>
+                <a:spcPct val="20000"/>
+              </a:spcBef>
+              <a:buFont typeface="Arial" charset="0"/>
+              <a:buChar char="•"/>
+            </a:pPr>
+            <a:r>
+              <a:rPr lang="en-US" sz="3200">
+                <a:latin typeface="Calibri" pitchFamily="34" charset="0"/>
+              </a:rPr>
+              <a:t>Cycled through the pages in the list and displayed there paths to the user</a:t>
+            </a:r>
+          </a:p>
+          <a:p>
+            <a:pPr marL="342900" indent="-342900">
+              <a:spcBef>
+                <a:spcPct val="20000"/>
+              </a:spcBef>
+              <a:buFont typeface="Arial" charset="0"/>
+              <a:buChar char="•"/>
+            </a:pPr>
+            <a:endParaRPr lang="en-US" sz="3200">
+              <a:latin typeface="Calibri" pitchFamily="34" charset="0"/>
+            </a:endParaRPr>
+          </a:p>
+        </p:txBody>
+      </p:sp>
+    </p:spTree>
+  </p:cSld>
+  <p:clrMapOvr>
+    <a:masterClrMapping/>
+  </p:clrMapOvr>
+</p:sld>
+</file>
+
+<file path=ppt/slides/slide9.xml><?xml version="1.0" encoding="utf-8"?>
+<p:sld xmlns:a="http://schemas.openxmlformats.org/drawingml/2006/main" xmlns:r="http://schemas.openxmlformats.org/officeDocument/2006/relationships" xmlns:p="http://schemas.openxmlformats.org/presentationml/2006/main">
+  <p:cSld>
+    <p:spTree>
+      <p:nvGrpSpPr>
+        <p:cNvPr id="1" name=""/>
+        <p:cNvGrpSpPr/>
+        <p:nvPr/>
+      </p:nvGrpSpPr>
+      <p:grpSpPr>
+        <a:xfrm>
+          <a:off x="0" y="0"/>
+          <a:ext cx="0" cy="0"/>
+          <a:chOff x="0" y="0"/>
+          <a:chExt cx="0" cy="0"/>
+        </a:xfrm>
+      </p:grpSpPr>
+      <p:sp>
+        <p:nvSpPr>
+          <p:cNvPr id="19457" name="Title 1"/>
+          <p:cNvSpPr>
+            <a:spLocks noGrp="1"/>
+          </p:cNvSpPr>
+          <p:nvPr>
+            <p:ph type="title"/>
+          </p:nvPr>
+        </p:nvSpPr>
+        <p:spPr/>
+        <p:txBody>
+          <a:bodyPr/>
+          <a:lstStyle/>
+          <a:p>
+            <a:r>
+              <a:rPr lang="en-US" smtClean="0"/>
               <a:t>Child access links code</a:t>
             </a:r>
-            <a:endParaRPr lang="en-US" dirty="0"/>
           </a:p>
         </p:txBody>
       </p:sp>
       <p:pic>
         <p:nvPicPr>
-          <p:cNvPr id="5" name="Content Placeholder 3" descr="code.jpg"/>
+          <p:cNvPr id="19458" name="Content Placeholder 3" descr="code.jpg"/>
           <p:cNvPicPr>
             <a:picLocks noGrp="1" noChangeAspect="1"/>
           </p:cNvPicPr>
@@ -3760,7 +5064,7 @@
           </p:nvPr>
         </p:nvPicPr>
         <p:blipFill>
-          <a:blip r:embed="rId2" cstate="print"/>
+          <a:blip r:embed="rId2"/>
           <a:srcRect t="13469" b="2350"/>
           <a:stretch>
             <a:fillRect/>
@@ -3768,8 +5072,8 @@
         </p:blipFill>
         <p:spPr>
           <a:xfrm>
-            <a:off x="576274" y="2133600"/>
-            <a:ext cx="8110526" cy="4267200"/>
+            <a:off x="576263" y="2133600"/>
+            <a:ext cx="8110537" cy="4267200"/>
           </a:xfrm>
         </p:spPr>
       </p:pic>
@@ -3809,10 +5113,18 @@
           </a:fontRef>
         </p:style>
         <p:txBody>
-          <a:bodyPr rtlCol="0" anchor="ctr"/>
+          <a:bodyPr anchor="ctr"/>
           <a:lstStyle/>
           <a:p>
-            <a:pPr algn="ctr"/>
+            <a:pPr algn="ctr" fontAlgn="auto">
+              <a:spcBef>
+                <a:spcPts val="0"/>
+              </a:spcBef>
+              <a:spcAft>
+                <a:spcPts val="0"/>
+              </a:spcAft>
+              <a:defRPr/>
+            </a:pPr>
             <a:endParaRPr lang="en-US"/>
           </a:p>
         </p:txBody>
@@ -3855,705 +5167,110 @@
       </p:cxnSp>
       <p:sp>
         <p:nvSpPr>
-          <p:cNvPr id="9" name="TextBox 8"/>
-          <p:cNvSpPr txBox="1"/>
+          <p:cNvPr id="19461" name="TextBox 8"/>
+          <p:cNvSpPr txBox="1">
+            <a:spLocks noChangeArrowheads="1"/>
+          </p:cNvSpPr>
           <p:nvPr/>
         </p:nvSpPr>
-        <p:spPr>
+        <p:spPr bwMode="auto">
           <a:xfrm>
-            <a:off x="3508647" y="2587823"/>
-            <a:ext cx="1059906" cy="307777"/>
+            <a:off x="3508375" y="2587625"/>
+            <a:ext cx="1060450" cy="307975"/>
           </a:xfrm>
           <a:prstGeom prst="rect">
             <a:avLst/>
           </a:prstGeom>
           <a:noFill/>
+          <a:ln w="9525">
+            <a:noFill/>
+            <a:miter lim="800000"/>
+            <a:headEnd/>
+            <a:tailEnd/>
+          </a:ln>
         </p:spPr>
         <p:txBody>
-          <a:bodyPr wrap="none" rtlCol="0">
+          <a:bodyPr wrap="none">
             <a:spAutoFit/>
           </a:bodyPr>
           <a:lstStyle/>
           <a:p>
             <a:r>
-              <a:rPr lang="en-US" sz="1400" dirty="0" smtClean="0">
+              <a:rPr lang="en-US" sz="1400">
                 <a:solidFill>
                   <a:srgbClr val="FF0000"/>
                 </a:solidFill>
+                <a:latin typeface="Calibri" pitchFamily="34" charset="0"/>
               </a:rPr>
               <a:t>Code added</a:t>
             </a:r>
-            <a:endParaRPr lang="en-US" sz="1400" dirty="0">
-              <a:solidFill>
-                <a:srgbClr val="FF0000"/>
-              </a:solidFill>
-            </a:endParaRPr>
-          </a:p>
-        </p:txBody>
-      </p:sp>
-      <p:sp>
-        <p:nvSpPr>
-          <p:cNvPr id="10" name="TextBox 9"/>
-          <p:cNvSpPr txBox="1"/>
+          </a:p>
+        </p:txBody>
+      </p:sp>
+      <p:sp>
+        <p:nvSpPr>
+          <p:cNvPr id="19462" name="TextBox 9"/>
+          <p:cNvSpPr txBox="1">
+            <a:spLocks noChangeArrowheads="1"/>
+          </p:cNvSpPr>
           <p:nvPr/>
         </p:nvSpPr>
-        <p:spPr>
+        <p:spPr bwMode="auto">
           <a:xfrm>
-            <a:off x="576274" y="1210270"/>
-            <a:ext cx="7509685" cy="923330"/>
+            <a:off x="576263" y="1209675"/>
+            <a:ext cx="7510462" cy="923925"/>
           </a:xfrm>
           <a:prstGeom prst="rect">
             <a:avLst/>
           </a:prstGeom>
           <a:noFill/>
+          <a:ln w="9525">
+            <a:noFill/>
+            <a:miter lim="800000"/>
+            <a:headEnd/>
+            <a:tailEnd/>
+          </a:ln>
         </p:spPr>
         <p:txBody>
-          <a:bodyPr wrap="none" rtlCol="0">
+          <a:bodyPr wrap="none">
             <a:spAutoFit/>
           </a:bodyPr>
           <a:lstStyle/>
           <a:p>
             <a:pPr>
-              <a:buFont typeface="Arial" pitchFamily="34" charset="0"/>
+              <a:buFont typeface="Arial" charset="0"/>
               <a:buChar char="•"/>
             </a:pPr>
             <a:r>
-              <a:rPr lang="en-US" dirty="0" smtClean="0"/>
+              <a:rPr lang="en-US">
+                <a:latin typeface="Calibri" pitchFamily="34" charset="0"/>
+              </a:rPr>
               <a:t> First: looks through all children of the current page</a:t>
             </a:r>
           </a:p>
           <a:p>
             <a:pPr>
-              <a:buFont typeface="Arial" pitchFamily="34" charset="0"/>
+              <a:buFont typeface="Arial" charset="0"/>
               <a:buChar char="•"/>
             </a:pPr>
             <a:r>
-              <a:rPr lang="en-US" dirty="0" smtClean="0"/>
+              <a:rPr lang="en-US">
+                <a:latin typeface="Calibri" pitchFamily="34" charset="0"/>
+              </a:rPr>
               <a:t>Second: Checks to see if page is an empty page (‘New Page’)</a:t>
             </a:r>
           </a:p>
           <a:p>
             <a:pPr>
-              <a:buFont typeface="Arial" pitchFamily="34" charset="0"/>
+              <a:buFont typeface="Arial" charset="0"/>
               <a:buChar char="•"/>
             </a:pPr>
             <a:r>
-              <a:rPr lang="en-US" dirty="0" smtClean="0"/>
+              <a:rPr lang="en-US">
+                <a:latin typeface="Calibri" pitchFamily="34" charset="0"/>
+              </a:rPr>
               <a:t>Third: Creates link for all non-empty pages at the bottom of the current page</a:t>
             </a:r>
-            <a:endParaRPr lang="en-US" dirty="0"/>
-          </a:p>
-        </p:txBody>
-      </p:sp>
-    </p:spTree>
-  </p:cSld>
-  <p:clrMapOvr>
-    <a:masterClrMapping/>
-  </p:clrMapOvr>
-  <p:timing>
-    <p:tnLst>
-      <p:par>
-        <p:cTn id="1" dur="indefinite" restart="never" nodeType="tmRoot"/>
-      </p:par>
-    </p:tnLst>
-  </p:timing>
-</p:sld>
-</file>
-
-<file path=ppt/slides/slide8.xml><?xml version="1.0" encoding="utf-8"?>
-<p:sld xmlns:a="http://schemas.openxmlformats.org/drawingml/2006/main" xmlns:r="http://schemas.openxmlformats.org/officeDocument/2006/relationships" xmlns:p="http://schemas.openxmlformats.org/presentationml/2006/main">
-  <p:cSld>
-    <p:spTree>
-      <p:nvGrpSpPr>
-        <p:cNvPr id="1" name=""/>
-        <p:cNvGrpSpPr/>
-        <p:nvPr/>
-      </p:nvGrpSpPr>
-      <p:grpSpPr>
-        <a:xfrm>
-          <a:off x="0" y="0"/>
-          <a:ext cx="0" cy="0"/>
-          <a:chOff x="0" y="0"/>
-          <a:chExt cx="0" cy="0"/>
-        </a:xfrm>
-      </p:grpSpPr>
-      <p:sp>
-        <p:nvSpPr>
-          <p:cNvPr id="4" name="Title 1"/>
-          <p:cNvSpPr txBox="1">
-            <a:spLocks/>
-          </p:cNvSpPr>
-          <p:nvPr/>
-        </p:nvSpPr>
-        <p:spPr>
-          <a:xfrm>
-            <a:off x="609600" y="1"/>
-            <a:ext cx="7772400" cy="1219200"/>
-          </a:xfrm>
-          <a:prstGeom prst="rect">
-            <a:avLst/>
-          </a:prstGeom>
-        </p:spPr>
-        <p:txBody>
-          <a:bodyPr vert="horz" lIns="91440" tIns="45720" rIns="91440" bIns="45720" rtlCol="0" anchor="ctr">
-            <a:normAutofit/>
-          </a:bodyPr>
-          <a:lstStyle/>
-          <a:p>
-            <a:pPr marL="0" marR="0" lvl="0" indent="0" algn="ctr" defTabSz="457200" rtl="0" eaLnBrk="1" fontAlgn="auto" latinLnBrk="0" hangingPunct="1">
-              <a:lnSpc>
-                <a:spcPct val="100000"/>
-              </a:lnSpc>
-              <a:spcBef>
-                <a:spcPct val="0"/>
-              </a:spcBef>
-              <a:spcAft>
-                <a:spcPts val="0"/>
-              </a:spcAft>
-              <a:buClrTx/>
-              <a:buSzTx/>
-              <a:buFontTx/>
-              <a:buNone/>
-              <a:tabLst/>
-              <a:defRPr/>
-            </a:pPr>
-            <a:r>
-              <a:rPr kumimoji="0" lang="en-US" sz="4400" b="0" i="0" u="none" strike="noStrike" kern="1200" cap="none" spc="0" normalizeH="0" baseline="0" noProof="0" smtClean="0">
-                <a:ln>
-                  <a:noFill/>
-                </a:ln>
-                <a:solidFill>
-                  <a:schemeClr val="tx1"/>
-                </a:solidFill>
-                <a:effectLst/>
-                <a:uLnTx/>
-                <a:uFillTx/>
-                <a:latin typeface="+mj-lt"/>
-                <a:ea typeface="+mj-ea"/>
-                <a:cs typeface="+mj-cs"/>
-              </a:rPr>
-              <a:t>Child access links screenshots</a:t>
-            </a:r>
-            <a:endParaRPr kumimoji="0" lang="en-US" sz="4400" b="0" i="0" u="none" strike="noStrike" kern="1200" cap="none" spc="0" normalizeH="0" baseline="0" noProof="0" dirty="0">
-              <a:ln>
-                <a:noFill/>
-              </a:ln>
-              <a:solidFill>
-                <a:schemeClr val="tx1"/>
-              </a:solidFill>
-              <a:effectLst/>
-              <a:uLnTx/>
-              <a:uFillTx/>
-              <a:latin typeface="+mj-lt"/>
-              <a:ea typeface="+mj-ea"/>
-              <a:cs typeface="+mj-cs"/>
-            </a:endParaRPr>
-          </a:p>
-        </p:txBody>
-      </p:sp>
-      <p:pic>
-        <p:nvPicPr>
-          <p:cNvPr id="5" name="Picture 4" descr="demo.jpg"/>
-          <p:cNvPicPr>
-            <a:picLocks noChangeAspect="1"/>
-          </p:cNvPicPr>
-          <p:nvPr/>
-        </p:nvPicPr>
-        <p:blipFill>
-          <a:blip r:embed="rId2" cstate="print"/>
-          <a:srcRect l="20833" t="13538" r="21667" b="6274"/>
-          <a:stretch>
-            <a:fillRect/>
-          </a:stretch>
-        </p:blipFill>
-        <p:spPr>
-          <a:xfrm>
-            <a:off x="4451083" y="2819400"/>
-            <a:ext cx="4399524" cy="3834653"/>
-          </a:xfrm>
-          <a:prstGeom prst="rect">
-            <a:avLst/>
-          </a:prstGeom>
-        </p:spPr>
-      </p:pic>
-      <p:pic>
-        <p:nvPicPr>
-          <p:cNvPr id="6" name="Picture 5" descr="demo2.jpg"/>
-          <p:cNvPicPr>
-            <a:picLocks noChangeAspect="1"/>
-          </p:cNvPicPr>
-          <p:nvPr/>
-        </p:nvPicPr>
-        <p:blipFill>
-          <a:blip r:embed="rId3" cstate="print"/>
-          <a:srcRect l="21667" t="11333" r="21667" b="4667"/>
-          <a:stretch>
-            <a:fillRect/>
-          </a:stretch>
-        </p:blipFill>
-        <p:spPr>
-          <a:xfrm>
-            <a:off x="228599" y="2819400"/>
-            <a:ext cx="4138991" cy="3834653"/>
-          </a:xfrm>
-          <a:prstGeom prst="rect">
-            <a:avLst/>
-          </a:prstGeom>
-        </p:spPr>
-      </p:pic>
-      <p:sp>
-        <p:nvSpPr>
-          <p:cNvPr id="7" name="TextBox 6"/>
-          <p:cNvSpPr txBox="1"/>
-          <p:nvPr/>
-        </p:nvSpPr>
-        <p:spPr>
-          <a:xfrm>
-            <a:off x="1676400" y="2209800"/>
-            <a:ext cx="803105" cy="369332"/>
-          </a:xfrm>
-          <a:prstGeom prst="rect">
-            <a:avLst/>
-          </a:prstGeom>
-          <a:noFill/>
-        </p:spPr>
-        <p:txBody>
-          <a:bodyPr wrap="none" rtlCol="0">
-            <a:spAutoFit/>
-          </a:bodyPr>
-          <a:lstStyle/>
-          <a:p>
-            <a:r>
-              <a:rPr lang="en-US" dirty="0" smtClean="0"/>
-              <a:t>Before</a:t>
-            </a:r>
-            <a:endParaRPr lang="en-US" dirty="0"/>
-          </a:p>
-        </p:txBody>
-      </p:sp>
-      <p:sp>
-        <p:nvSpPr>
-          <p:cNvPr id="8" name="TextBox 7"/>
-          <p:cNvSpPr txBox="1"/>
-          <p:nvPr/>
-        </p:nvSpPr>
-        <p:spPr>
-          <a:xfrm>
-            <a:off x="6400800" y="2133600"/>
-            <a:ext cx="658257" cy="369332"/>
-          </a:xfrm>
-          <a:prstGeom prst="rect">
-            <a:avLst/>
-          </a:prstGeom>
-          <a:noFill/>
-        </p:spPr>
-        <p:txBody>
-          <a:bodyPr wrap="none" rtlCol="0">
-            <a:spAutoFit/>
-          </a:bodyPr>
-          <a:lstStyle/>
-          <a:p>
-            <a:r>
-              <a:rPr lang="en-US" dirty="0" smtClean="0"/>
-              <a:t>After</a:t>
-            </a:r>
-            <a:endParaRPr lang="en-US" dirty="0"/>
-          </a:p>
-        </p:txBody>
-      </p:sp>
-      <p:sp>
-        <p:nvSpPr>
-          <p:cNvPr id="9" name="Rectangle 8"/>
-          <p:cNvSpPr/>
-          <p:nvPr/>
-        </p:nvSpPr>
-        <p:spPr>
-          <a:xfrm>
-            <a:off x="228599" y="4208622"/>
-            <a:ext cx="762000" cy="152400"/>
-          </a:xfrm>
-          <a:prstGeom prst="rect">
-            <a:avLst/>
-          </a:prstGeom>
-          <a:noFill/>
-          <a:ln>
-            <a:solidFill>
-              <a:srgbClr val="FF0000"/>
-            </a:solidFill>
-          </a:ln>
-        </p:spPr>
-        <p:style>
-          <a:lnRef idx="2">
-            <a:schemeClr val="accent1">
-              <a:shade val="50000"/>
-            </a:schemeClr>
-          </a:lnRef>
-          <a:fillRef idx="1">
-            <a:schemeClr val="accent1"/>
-          </a:fillRef>
-          <a:effectRef idx="0">
-            <a:schemeClr val="accent1"/>
-          </a:effectRef>
-          <a:fontRef idx="minor">
-            <a:schemeClr val="lt1"/>
-          </a:fontRef>
-        </p:style>
-        <p:txBody>
-          <a:bodyPr rtlCol="0" anchor="ctr"/>
-          <a:lstStyle/>
-          <a:p>
-            <a:pPr algn="ctr"/>
-            <a:endParaRPr lang="en-US"/>
-          </a:p>
-        </p:txBody>
-      </p:sp>
-      <p:cxnSp>
-        <p:nvCxnSpPr>
-          <p:cNvPr id="10" name="Straight Arrow Connector 9"/>
-          <p:cNvCxnSpPr/>
-          <p:nvPr/>
-        </p:nvCxnSpPr>
-        <p:spPr>
-          <a:xfrm rot="10800000" flipV="1">
-            <a:off x="990599" y="3980022"/>
-            <a:ext cx="304800" cy="228600"/>
-          </a:xfrm>
-          <a:prstGeom prst="straightConnector1">
-            <a:avLst/>
-          </a:prstGeom>
-          <a:ln>
-            <a:solidFill>
-              <a:srgbClr val="FF0000"/>
-            </a:solidFill>
-            <a:tailEnd type="arrow"/>
-          </a:ln>
-        </p:spPr>
-        <p:style>
-          <a:lnRef idx="1">
-            <a:schemeClr val="accent1"/>
-          </a:lnRef>
-          <a:fillRef idx="0">
-            <a:schemeClr val="accent1"/>
-          </a:fillRef>
-          <a:effectRef idx="0">
-            <a:schemeClr val="accent1"/>
-          </a:effectRef>
-          <a:fontRef idx="minor">
-            <a:schemeClr val="tx1"/>
-          </a:fontRef>
-        </p:style>
-      </p:cxnSp>
-      <p:sp>
-        <p:nvSpPr>
-          <p:cNvPr id="11" name="TextBox 10"/>
-          <p:cNvSpPr txBox="1"/>
-          <p:nvPr/>
-        </p:nvSpPr>
-        <p:spPr>
-          <a:xfrm>
-            <a:off x="1219199" y="3827622"/>
-            <a:ext cx="792205" cy="246221"/>
-          </a:xfrm>
-          <a:prstGeom prst="rect">
-            <a:avLst/>
-          </a:prstGeom>
-          <a:noFill/>
-        </p:spPr>
-        <p:txBody>
-          <a:bodyPr wrap="none" rtlCol="0">
-            <a:spAutoFit/>
-          </a:bodyPr>
-          <a:lstStyle/>
-          <a:p>
-            <a:r>
-              <a:rPr lang="en-US" sz="1000" dirty="0" smtClean="0">
-                <a:solidFill>
-                  <a:srgbClr val="FF0000"/>
-                </a:solidFill>
-              </a:rPr>
-              <a:t>Parent links</a:t>
-            </a:r>
-            <a:endParaRPr lang="en-US" sz="1000" dirty="0">
-              <a:solidFill>
-                <a:srgbClr val="FF0000"/>
-              </a:solidFill>
-            </a:endParaRPr>
-          </a:p>
-        </p:txBody>
-      </p:sp>
-      <p:sp>
-        <p:nvSpPr>
-          <p:cNvPr id="12" name="Rectangle 11"/>
-          <p:cNvSpPr/>
-          <p:nvPr/>
-        </p:nvSpPr>
-        <p:spPr>
-          <a:xfrm>
-            <a:off x="4617995" y="4208622"/>
-            <a:ext cx="762000" cy="152400"/>
-          </a:xfrm>
-          <a:prstGeom prst="rect">
-            <a:avLst/>
-          </a:prstGeom>
-          <a:noFill/>
-          <a:ln>
-            <a:solidFill>
-              <a:srgbClr val="FF0000"/>
-            </a:solidFill>
-          </a:ln>
-        </p:spPr>
-        <p:style>
-          <a:lnRef idx="2">
-            <a:schemeClr val="accent1">
-              <a:shade val="50000"/>
-            </a:schemeClr>
-          </a:lnRef>
-          <a:fillRef idx="1">
-            <a:schemeClr val="accent1"/>
-          </a:fillRef>
-          <a:effectRef idx="0">
-            <a:schemeClr val="accent1"/>
-          </a:effectRef>
-          <a:fontRef idx="minor">
-            <a:schemeClr val="lt1"/>
-          </a:fontRef>
-        </p:style>
-        <p:txBody>
-          <a:bodyPr rtlCol="0" anchor="ctr"/>
-          <a:lstStyle/>
-          <a:p>
-            <a:pPr algn="ctr"/>
-            <a:endParaRPr lang="en-US"/>
-          </a:p>
-        </p:txBody>
-      </p:sp>
-      <p:cxnSp>
-        <p:nvCxnSpPr>
-          <p:cNvPr id="13" name="Straight Arrow Connector 12"/>
-          <p:cNvCxnSpPr/>
-          <p:nvPr/>
-        </p:nvCxnSpPr>
-        <p:spPr>
-          <a:xfrm rot="10800000" flipV="1">
-            <a:off x="5379995" y="3980022"/>
-            <a:ext cx="304800" cy="228600"/>
-          </a:xfrm>
-          <a:prstGeom prst="straightConnector1">
-            <a:avLst/>
-          </a:prstGeom>
-          <a:ln>
-            <a:solidFill>
-              <a:srgbClr val="FF0000"/>
-            </a:solidFill>
-            <a:tailEnd type="arrow"/>
-          </a:ln>
-        </p:spPr>
-        <p:style>
-          <a:lnRef idx="1">
-            <a:schemeClr val="accent1"/>
-          </a:lnRef>
-          <a:fillRef idx="0">
-            <a:schemeClr val="accent1"/>
-          </a:fillRef>
-          <a:effectRef idx="0">
-            <a:schemeClr val="accent1"/>
-          </a:effectRef>
-          <a:fontRef idx="minor">
-            <a:schemeClr val="tx1"/>
-          </a:fontRef>
-        </p:style>
-      </p:cxnSp>
-      <p:sp>
-        <p:nvSpPr>
-          <p:cNvPr id="14" name="TextBox 13"/>
-          <p:cNvSpPr txBox="1"/>
-          <p:nvPr/>
-        </p:nvSpPr>
-        <p:spPr>
-          <a:xfrm>
-            <a:off x="5608595" y="3827622"/>
-            <a:ext cx="792205" cy="246221"/>
-          </a:xfrm>
-          <a:prstGeom prst="rect">
-            <a:avLst/>
-          </a:prstGeom>
-          <a:noFill/>
-        </p:spPr>
-        <p:txBody>
-          <a:bodyPr wrap="none" rtlCol="0">
-            <a:spAutoFit/>
-          </a:bodyPr>
-          <a:lstStyle/>
-          <a:p>
-            <a:r>
-              <a:rPr lang="en-US" sz="1000" dirty="0" smtClean="0">
-                <a:solidFill>
-                  <a:srgbClr val="FF0000"/>
-                </a:solidFill>
-              </a:rPr>
-              <a:t>Parent links</a:t>
-            </a:r>
-            <a:endParaRPr lang="en-US" sz="1000" dirty="0">
-              <a:solidFill>
-                <a:srgbClr val="FF0000"/>
-              </a:solidFill>
-            </a:endParaRPr>
-          </a:p>
-        </p:txBody>
-      </p:sp>
-      <p:sp>
-        <p:nvSpPr>
-          <p:cNvPr id="15" name="Rectangle 14"/>
-          <p:cNvSpPr/>
-          <p:nvPr/>
-        </p:nvSpPr>
-        <p:spPr>
-          <a:xfrm>
-            <a:off x="4702955" y="6172201"/>
-            <a:ext cx="762000" cy="152400"/>
-          </a:xfrm>
-          <a:prstGeom prst="rect">
-            <a:avLst/>
-          </a:prstGeom>
-          <a:noFill/>
-          <a:ln>
-            <a:solidFill>
-              <a:srgbClr val="FF0000"/>
-            </a:solidFill>
-          </a:ln>
-        </p:spPr>
-        <p:style>
-          <a:lnRef idx="2">
-            <a:schemeClr val="accent1">
-              <a:shade val="50000"/>
-            </a:schemeClr>
-          </a:lnRef>
-          <a:fillRef idx="1">
-            <a:schemeClr val="accent1"/>
-          </a:fillRef>
-          <a:effectRef idx="0">
-            <a:schemeClr val="accent1"/>
-          </a:effectRef>
-          <a:fontRef idx="minor">
-            <a:schemeClr val="lt1"/>
-          </a:fontRef>
-        </p:style>
-        <p:txBody>
-          <a:bodyPr rtlCol="0" anchor="ctr"/>
-          <a:lstStyle/>
-          <a:p>
-            <a:pPr algn="ctr"/>
-            <a:endParaRPr lang="en-US"/>
-          </a:p>
-        </p:txBody>
-      </p:sp>
-      <p:cxnSp>
-        <p:nvCxnSpPr>
-          <p:cNvPr id="16" name="Straight Arrow Connector 15"/>
-          <p:cNvCxnSpPr/>
-          <p:nvPr/>
-        </p:nvCxnSpPr>
-        <p:spPr>
-          <a:xfrm rot="10800000" flipV="1">
-            <a:off x="5464955" y="5943601"/>
-            <a:ext cx="304800" cy="228600"/>
-          </a:xfrm>
-          <a:prstGeom prst="straightConnector1">
-            <a:avLst/>
-          </a:prstGeom>
-          <a:ln>
-            <a:solidFill>
-              <a:srgbClr val="FF0000"/>
-            </a:solidFill>
-            <a:tailEnd type="arrow"/>
-          </a:ln>
-        </p:spPr>
-        <p:style>
-          <a:lnRef idx="1">
-            <a:schemeClr val="accent1"/>
-          </a:lnRef>
-          <a:fillRef idx="0">
-            <a:schemeClr val="accent1"/>
-          </a:fillRef>
-          <a:effectRef idx="0">
-            <a:schemeClr val="accent1"/>
-          </a:effectRef>
-          <a:fontRef idx="minor">
-            <a:schemeClr val="tx1"/>
-          </a:fontRef>
-        </p:style>
-      </p:cxnSp>
-      <p:sp>
-        <p:nvSpPr>
-          <p:cNvPr id="17" name="TextBox 16"/>
-          <p:cNvSpPr txBox="1"/>
-          <p:nvPr/>
-        </p:nvSpPr>
-        <p:spPr>
-          <a:xfrm>
-            <a:off x="5693555" y="5791201"/>
-            <a:ext cx="707245" cy="246221"/>
-          </a:xfrm>
-          <a:prstGeom prst="rect">
-            <a:avLst/>
-          </a:prstGeom>
-          <a:noFill/>
-        </p:spPr>
-        <p:txBody>
-          <a:bodyPr wrap="none" rtlCol="0">
-            <a:spAutoFit/>
-          </a:bodyPr>
-          <a:lstStyle/>
-          <a:p>
-            <a:r>
-              <a:rPr lang="en-US" sz="1000" dirty="0" smtClean="0">
-                <a:solidFill>
-                  <a:srgbClr val="FF0000"/>
-                </a:solidFill>
-              </a:rPr>
-              <a:t>Child links</a:t>
-            </a:r>
-            <a:endParaRPr lang="en-US" sz="1000" dirty="0">
-              <a:solidFill>
-                <a:srgbClr val="FF0000"/>
-              </a:solidFill>
-            </a:endParaRPr>
-          </a:p>
-        </p:txBody>
-      </p:sp>
-      <p:sp>
-        <p:nvSpPr>
-          <p:cNvPr id="18" name="TextBox 17"/>
-          <p:cNvSpPr txBox="1"/>
-          <p:nvPr/>
-        </p:nvSpPr>
-        <p:spPr>
-          <a:xfrm>
-            <a:off x="1219200" y="1295400"/>
-            <a:ext cx="6629400" cy="646331"/>
-          </a:xfrm>
-          <a:prstGeom prst="rect">
-            <a:avLst/>
-          </a:prstGeom>
-          <a:noFill/>
-        </p:spPr>
-        <p:txBody>
-          <a:bodyPr wrap="square" rtlCol="0">
-            <a:spAutoFit/>
-          </a:bodyPr>
-          <a:lstStyle/>
-          <a:p>
-            <a:r>
-              <a:rPr lang="en-US" dirty="0" smtClean="0"/>
-              <a:t>Before: A page could only access its parents</a:t>
-            </a:r>
-          </a:p>
-          <a:p>
-            <a:r>
-              <a:rPr lang="en-US" dirty="0" smtClean="0"/>
-              <a:t>After: A page can access can access its parent and its children pages</a:t>
-            </a:r>
-            <a:endParaRPr lang="en-US" dirty="0"/>
           </a:p>
         </p:txBody>
       </p:sp>

</xml_diff>